<commit_message>
Update `Developer Guide` to show UML diagram between `Address` and `Block` `Street` `Unit` `Postal code`
</commit_message>
<xml_diff>
--- a/doc/Diagrams.pptx
+++ b/doc/Diagrams.pptx
@@ -9,7 +9,7 @@
     <p:sldId id="257" r:id="rId3"/>
     <p:sldId id="258" r:id="rId4"/>
   </p:sldIdLst>
-  <p:sldSz cx="9144000" cy="6858000" type="screen4x3"/>
+  <p:sldSz cx="9899650" cy="6858000"/>
   <p:notesSz cx="6858000" cy="9144000"/>
   <p:defaultTextStyle>
     <a:defPPr>
@@ -106,6 +106,22 @@
       </a:defRPr>
     </a:lvl9pPr>
   </p:defaultTextStyle>
+  <p:extLst>
+    <p:ext uri="{EFAFB233-063F-42B5-8137-9DF3F51BA10A}">
+      <p15:sldGuideLst xmlns:p15="http://schemas.microsoft.com/office/powerpoint/2012/main">
+        <p15:guide id="1" orient="horz" pos="2160" userDrawn="1">
+          <p15:clr>
+            <a:srgbClr val="A4A3A4"/>
+          </p15:clr>
+        </p15:guide>
+        <p15:guide id="2" pos="3118" userDrawn="1">
+          <p15:clr>
+            <a:srgbClr val="A4A3A4"/>
+          </p15:clr>
+        </p15:guide>
+      </p15:sldGuideLst>
+    </p:ext>
+  </p:extLst>
 </p:presentation>
 </file>
 
@@ -138,8 +154,8 @@
         </p:nvSpPr>
         <p:spPr>
           <a:xfrm>
-            <a:off x="685800" y="2130425"/>
-            <a:ext cx="7772400" cy="1470025"/>
+            <a:off x="742474" y="2130427"/>
+            <a:ext cx="8414703" cy="1470025"/>
           </a:xfrm>
         </p:spPr>
         <p:txBody>
@@ -166,8 +182,8 @@
         </p:nvSpPr>
         <p:spPr>
           <a:xfrm>
-            <a:off x="1371600" y="3886200"/>
-            <a:ext cx="6400800" cy="1752600"/>
+            <a:off x="1484948" y="3886200"/>
+            <a:ext cx="6929755" cy="1752600"/>
           </a:xfrm>
         </p:spPr>
         <p:txBody>
@@ -290,7 +306,7 @@
           <a:p>
             <a:fld id="{78C97017-6FC3-485B-9764-EAC9E56C1D49}" type="datetimeFigureOut">
               <a:rPr lang="en-US" smtClean="0"/>
-              <a:t>8/28/2016</a:t>
+              <a:t>8/29/16</a:t>
             </a:fld>
             <a:endParaRPr lang="en-US"/>
           </a:p>
@@ -460,7 +476,7 @@
           <a:p>
             <a:fld id="{78C97017-6FC3-485B-9764-EAC9E56C1D49}" type="datetimeFigureOut">
               <a:rPr lang="en-US" smtClean="0"/>
-              <a:t>8/28/2016</a:t>
+              <a:t>8/29/16</a:t>
             </a:fld>
             <a:endParaRPr lang="en-US"/>
           </a:p>
@@ -550,8 +566,8 @@
         </p:nvSpPr>
         <p:spPr>
           <a:xfrm>
-            <a:off x="6629400" y="274638"/>
-            <a:ext cx="2057400" cy="5851525"/>
+            <a:off x="7177246" y="274640"/>
+            <a:ext cx="2227422" cy="5851525"/>
           </a:xfrm>
         </p:spPr>
         <p:txBody>
@@ -578,8 +594,8 @@
         </p:nvSpPr>
         <p:spPr>
           <a:xfrm>
-            <a:off x="457200" y="274638"/>
-            <a:ext cx="6019800" cy="5851525"/>
+            <a:off x="494982" y="274640"/>
+            <a:ext cx="6517270" cy="5851525"/>
           </a:xfrm>
         </p:spPr>
         <p:txBody>
@@ -640,7 +656,7 @@
           <a:p>
             <a:fld id="{78C97017-6FC3-485B-9764-EAC9E56C1D49}" type="datetimeFigureOut">
               <a:rPr lang="en-US" smtClean="0"/>
-              <a:t>8/28/2016</a:t>
+              <a:t>8/29/16</a:t>
             </a:fld>
             <a:endParaRPr lang="en-US"/>
           </a:p>
@@ -810,7 +826,7 @@
           <a:p>
             <a:fld id="{78C97017-6FC3-485B-9764-EAC9E56C1D49}" type="datetimeFigureOut">
               <a:rPr lang="en-US" smtClean="0"/>
-              <a:t>8/28/2016</a:t>
+              <a:t>8/29/16</a:t>
             </a:fld>
             <a:endParaRPr lang="en-US"/>
           </a:p>
@@ -900,8 +916,8 @@
         </p:nvSpPr>
         <p:spPr>
           <a:xfrm>
-            <a:off x="722313" y="4406900"/>
-            <a:ext cx="7772400" cy="1362075"/>
+            <a:off x="782005" y="4406902"/>
+            <a:ext cx="8414703" cy="1362075"/>
           </a:xfrm>
         </p:spPr>
         <p:txBody>
@@ -932,8 +948,8 @@
         </p:nvSpPr>
         <p:spPr>
           <a:xfrm>
-            <a:off x="722313" y="2906713"/>
-            <a:ext cx="7772400" cy="1500187"/>
+            <a:off x="782005" y="2906713"/>
+            <a:ext cx="8414703" cy="1500187"/>
           </a:xfrm>
         </p:spPr>
         <p:txBody>
@@ -1056,7 +1072,7 @@
           <a:p>
             <a:fld id="{78C97017-6FC3-485B-9764-EAC9E56C1D49}" type="datetimeFigureOut">
               <a:rPr lang="en-US" smtClean="0"/>
-              <a:t>8/28/2016</a:t>
+              <a:t>8/29/16</a:t>
             </a:fld>
             <a:endParaRPr lang="en-US"/>
           </a:p>
@@ -1169,8 +1185,8 @@
         </p:nvSpPr>
         <p:spPr>
           <a:xfrm>
-            <a:off x="457200" y="1600200"/>
-            <a:ext cx="4038600" cy="4525963"/>
+            <a:off x="494983" y="1600202"/>
+            <a:ext cx="4372345" cy="4525963"/>
           </a:xfrm>
         </p:spPr>
         <p:txBody>
@@ -1254,8 +1270,8 @@
         </p:nvSpPr>
         <p:spPr>
           <a:xfrm>
-            <a:off x="4648200" y="1600200"/>
-            <a:ext cx="4038600" cy="4525963"/>
+            <a:off x="5032323" y="1600202"/>
+            <a:ext cx="4372345" cy="4525963"/>
           </a:xfrm>
         </p:spPr>
         <p:txBody>
@@ -1344,7 +1360,7 @@
           <a:p>
             <a:fld id="{78C97017-6FC3-485B-9764-EAC9E56C1D49}" type="datetimeFigureOut">
               <a:rPr lang="en-US" smtClean="0"/>
-              <a:t>8/28/2016</a:t>
+              <a:t>8/29/16</a:t>
             </a:fld>
             <a:endParaRPr lang="en-US"/>
           </a:p>
@@ -1461,8 +1477,8 @@
         </p:nvSpPr>
         <p:spPr>
           <a:xfrm>
-            <a:off x="457200" y="1535113"/>
-            <a:ext cx="4040188" cy="639762"/>
+            <a:off x="494983" y="1535113"/>
+            <a:ext cx="4374065" cy="639762"/>
           </a:xfrm>
         </p:spPr>
         <p:txBody>
@@ -1526,8 +1542,8 @@
         </p:nvSpPr>
         <p:spPr>
           <a:xfrm>
-            <a:off x="457200" y="2174875"/>
-            <a:ext cx="4040188" cy="3951288"/>
+            <a:off x="494983" y="2174875"/>
+            <a:ext cx="4374065" cy="3951288"/>
           </a:xfrm>
         </p:spPr>
         <p:txBody>
@@ -1611,8 +1627,8 @@
         </p:nvSpPr>
         <p:spPr>
           <a:xfrm>
-            <a:off x="4645025" y="1535113"/>
-            <a:ext cx="4041775" cy="639762"/>
+            <a:off x="5028885" y="1535113"/>
+            <a:ext cx="4375783" cy="639762"/>
           </a:xfrm>
         </p:spPr>
         <p:txBody>
@@ -1676,8 +1692,8 @@
         </p:nvSpPr>
         <p:spPr>
           <a:xfrm>
-            <a:off x="4645025" y="2174875"/>
-            <a:ext cx="4041775" cy="3951288"/>
+            <a:off x="5028885" y="2174875"/>
+            <a:ext cx="4375783" cy="3951288"/>
           </a:xfrm>
         </p:spPr>
         <p:txBody>
@@ -1766,7 +1782,7 @@
           <a:p>
             <a:fld id="{78C97017-6FC3-485B-9764-EAC9E56C1D49}" type="datetimeFigureOut">
               <a:rPr lang="en-US" smtClean="0"/>
-              <a:t>8/28/2016</a:t>
+              <a:t>8/29/16</a:t>
             </a:fld>
             <a:endParaRPr lang="en-US"/>
           </a:p>
@@ -1884,7 +1900,7 @@
           <a:p>
             <a:fld id="{78C97017-6FC3-485B-9764-EAC9E56C1D49}" type="datetimeFigureOut">
               <a:rPr lang="en-US" smtClean="0"/>
-              <a:t>8/28/2016</a:t>
+              <a:t>8/29/16</a:t>
             </a:fld>
             <a:endParaRPr lang="en-US"/>
           </a:p>
@@ -1979,7 +1995,7 @@
           <a:p>
             <a:fld id="{78C97017-6FC3-485B-9764-EAC9E56C1D49}" type="datetimeFigureOut">
               <a:rPr lang="en-US" smtClean="0"/>
-              <a:t>8/28/2016</a:t>
+              <a:t>8/29/16</a:t>
             </a:fld>
             <a:endParaRPr lang="en-US"/>
           </a:p>
@@ -2069,8 +2085,8 @@
         </p:nvSpPr>
         <p:spPr>
           <a:xfrm>
-            <a:off x="457200" y="273050"/>
-            <a:ext cx="3008313" cy="1162050"/>
+            <a:off x="494983" y="273050"/>
+            <a:ext cx="3256917" cy="1162050"/>
           </a:xfrm>
         </p:spPr>
         <p:txBody>
@@ -2101,8 +2117,8 @@
         </p:nvSpPr>
         <p:spPr>
           <a:xfrm>
-            <a:off x="3575050" y="273050"/>
-            <a:ext cx="5111750" cy="5853113"/>
+            <a:off x="3870488" y="273052"/>
+            <a:ext cx="5534180" cy="5853113"/>
           </a:xfrm>
         </p:spPr>
         <p:txBody>
@@ -2186,8 +2202,8 @@
         </p:nvSpPr>
         <p:spPr>
           <a:xfrm>
-            <a:off x="457200" y="1435100"/>
-            <a:ext cx="3008313" cy="4691063"/>
+            <a:off x="494983" y="1435102"/>
+            <a:ext cx="3256917" cy="4691063"/>
           </a:xfrm>
         </p:spPr>
         <p:txBody>
@@ -2256,7 +2272,7 @@
           <a:p>
             <a:fld id="{78C97017-6FC3-485B-9764-EAC9E56C1D49}" type="datetimeFigureOut">
               <a:rPr lang="en-US" smtClean="0"/>
-              <a:t>8/28/2016</a:t>
+              <a:t>8/29/16</a:t>
             </a:fld>
             <a:endParaRPr lang="en-US"/>
           </a:p>
@@ -2346,8 +2362,8 @@
         </p:nvSpPr>
         <p:spPr>
           <a:xfrm>
-            <a:off x="1792288" y="4800600"/>
-            <a:ext cx="5486400" cy="566738"/>
+            <a:off x="1940401" y="4800600"/>
+            <a:ext cx="5939790" cy="566738"/>
           </a:xfrm>
         </p:spPr>
         <p:txBody>
@@ -2378,8 +2394,8 @@
         </p:nvSpPr>
         <p:spPr>
           <a:xfrm>
-            <a:off x="1792288" y="612775"/>
-            <a:ext cx="5486400" cy="4114800"/>
+            <a:off x="1940401" y="612775"/>
+            <a:ext cx="5939790" cy="4114800"/>
           </a:xfrm>
         </p:spPr>
         <p:txBody>
@@ -2439,8 +2455,8 @@
         </p:nvSpPr>
         <p:spPr>
           <a:xfrm>
-            <a:off x="1792288" y="5367338"/>
-            <a:ext cx="5486400" cy="804862"/>
+            <a:off x="1940401" y="5367338"/>
+            <a:ext cx="5939790" cy="804862"/>
           </a:xfrm>
         </p:spPr>
         <p:txBody>
@@ -2509,7 +2525,7 @@
           <a:p>
             <a:fld id="{78C97017-6FC3-485B-9764-EAC9E56C1D49}" type="datetimeFigureOut">
               <a:rPr lang="en-US" smtClean="0"/>
-              <a:t>8/28/2016</a:t>
+              <a:t>8/29/16</a:t>
             </a:fld>
             <a:endParaRPr lang="en-US"/>
           </a:p>
@@ -2604,8 +2620,8 @@
         </p:nvSpPr>
         <p:spPr>
           <a:xfrm>
-            <a:off x="457200" y="274638"/>
-            <a:ext cx="8229600" cy="1143000"/>
+            <a:off x="494983" y="274638"/>
+            <a:ext cx="8909685" cy="1143000"/>
           </a:xfrm>
           <a:prstGeom prst="rect">
             <a:avLst/>
@@ -2637,8 +2653,8 @@
         </p:nvSpPr>
         <p:spPr>
           <a:xfrm>
-            <a:off x="457200" y="1600200"/>
-            <a:ext cx="8229600" cy="4525963"/>
+            <a:off x="494983" y="1600202"/>
+            <a:ext cx="8909685" cy="4525963"/>
           </a:xfrm>
           <a:prstGeom prst="rect">
             <a:avLst/>
@@ -2699,8 +2715,8 @@
         </p:nvSpPr>
         <p:spPr>
           <a:xfrm>
-            <a:off x="457200" y="6356350"/>
-            <a:ext cx="2133600" cy="365125"/>
+            <a:off x="494983" y="6356352"/>
+            <a:ext cx="2309919" cy="365125"/>
           </a:xfrm>
           <a:prstGeom prst="rect">
             <a:avLst/>
@@ -2722,7 +2738,7 @@
           <a:p>
             <a:fld id="{78C97017-6FC3-485B-9764-EAC9E56C1D49}" type="datetimeFigureOut">
               <a:rPr lang="en-US" smtClean="0"/>
-              <a:t>8/28/2016</a:t>
+              <a:t>8/29/16</a:t>
             </a:fld>
             <a:endParaRPr lang="en-US"/>
           </a:p>
@@ -2740,8 +2756,8 @@
         </p:nvSpPr>
         <p:spPr>
           <a:xfrm>
-            <a:off x="3124200" y="6356350"/>
-            <a:ext cx="2895600" cy="365125"/>
+            <a:off x="3382381" y="6356352"/>
+            <a:ext cx="3134889" cy="365125"/>
           </a:xfrm>
           <a:prstGeom prst="rect">
             <a:avLst/>
@@ -2777,8 +2793,8 @@
         </p:nvSpPr>
         <p:spPr>
           <a:xfrm>
-            <a:off x="6553200" y="6356350"/>
-            <a:ext cx="2133600" cy="365125"/>
+            <a:off x="7094749" y="6356352"/>
+            <a:ext cx="2309919" cy="365125"/>
           </a:xfrm>
           <a:prstGeom prst="rect">
             <a:avLst/>
@@ -3185,7 +3201,7 @@
         </p:nvSpPr>
         <p:spPr>
           <a:xfrm>
-            <a:off x="761999" y="5141640"/>
+            <a:off x="1139824" y="5141640"/>
             <a:ext cx="929296" cy="346760"/>
           </a:xfrm>
           <a:prstGeom prst="rect">
@@ -3214,7 +3230,7 @@
           <a:p>
             <a:pPr algn="ctr"/>
             <a:r>
-              <a:rPr lang="en-US" sz="1050" dirty="0" err="1" smtClean="0"/>
+              <a:rPr lang="en-US" sz="1050" dirty="0" err="1"/>
               <a:t>TextUi</a:t>
             </a:r>
             <a:endParaRPr lang="en-SG" sz="1050" dirty="0"/>
@@ -3229,7 +3245,7 @@
         </p:nvSpPr>
         <p:spPr>
           <a:xfrm>
-            <a:off x="762000" y="3747060"/>
+            <a:off x="1139825" y="3747060"/>
             <a:ext cx="929296" cy="346760"/>
           </a:xfrm>
           <a:prstGeom prst="rect">
@@ -3265,7 +3281,7 @@
           <a:p>
             <a:pPr algn="ctr"/>
             <a:r>
-              <a:rPr lang="en-US" sz="1050" dirty="0" smtClean="0">
+              <a:rPr lang="en-US" sz="1050" dirty="0">
                 <a:solidFill>
                   <a:schemeClr val="bg1"/>
                 </a:solidFill>
@@ -3288,7 +3304,7 @@
         </p:nvSpPr>
         <p:spPr>
           <a:xfrm>
-            <a:off x="2064848" y="3747060"/>
+            <a:off x="2442673" y="3747060"/>
             <a:ext cx="929296" cy="346760"/>
           </a:xfrm>
           <a:prstGeom prst="rect">
@@ -3332,7 +3348,7 @@
         </p:nvSpPr>
         <p:spPr>
           <a:xfrm>
-            <a:off x="1447800" y="3006040"/>
+            <a:off x="1825627" y="3006040"/>
             <a:ext cx="634723" cy="346760"/>
           </a:xfrm>
           <a:prstGeom prst="rect">
@@ -3361,7 +3377,7 @@
           <a:p>
             <a:pPr algn="ctr"/>
             <a:r>
-              <a:rPr lang="en-US" sz="1050" dirty="0" smtClean="0"/>
+              <a:rPr lang="en-US" sz="1050" dirty="0"/>
               <a:t>Parser</a:t>
             </a:r>
             <a:endParaRPr lang="en-SG" sz="1050" dirty="0"/>
@@ -3376,7 +3392,7 @@
         </p:nvSpPr>
         <p:spPr>
           <a:xfrm>
-            <a:off x="3681046" y="3032560"/>
+            <a:off x="4058871" y="3032560"/>
             <a:ext cx="929296" cy="346760"/>
           </a:xfrm>
           <a:prstGeom prst="rect">
@@ -3405,14 +3421,14 @@
           <a:p>
             <a:pPr algn="ctr"/>
             <a:r>
-              <a:rPr lang="en-US" sz="1050" dirty="0" smtClean="0"/>
+              <a:rPr lang="en-US" sz="1050" dirty="0"/>
               <a:t>Unique</a:t>
             </a:r>
             <a:br>
-              <a:rPr lang="en-US" sz="1050" dirty="0" smtClean="0"/>
+              <a:rPr lang="en-US" sz="1050" dirty="0"/>
             </a:br>
             <a:r>
-              <a:rPr lang="en-US" sz="1050" dirty="0" err="1" smtClean="0"/>
+              <a:rPr lang="en-US" sz="1050" dirty="0" err="1"/>
               <a:t>TagList</a:t>
             </a:r>
             <a:endParaRPr lang="en-SG" sz="1050" dirty="0"/>
@@ -3427,7 +3443,7 @@
         </p:nvSpPr>
         <p:spPr>
           <a:xfrm>
-            <a:off x="3654669" y="4352685"/>
+            <a:off x="4032494" y="4352685"/>
             <a:ext cx="929296" cy="346760"/>
           </a:xfrm>
           <a:prstGeom prst="rect">
@@ -3456,14 +3472,14 @@
           <a:p>
             <a:pPr algn="ctr"/>
             <a:r>
-              <a:rPr lang="en-US" sz="1050" dirty="0" smtClean="0"/>
+              <a:rPr lang="en-US" sz="1050" dirty="0"/>
               <a:t>Unique</a:t>
             </a:r>
             <a:br>
-              <a:rPr lang="en-US" sz="1050" dirty="0" smtClean="0"/>
+              <a:rPr lang="en-US" sz="1050" dirty="0"/>
             </a:br>
             <a:r>
-              <a:rPr lang="en-US" sz="1050" dirty="0" err="1" smtClean="0"/>
+              <a:rPr lang="en-US" sz="1050" dirty="0" err="1"/>
               <a:t>PersonList</a:t>
             </a:r>
             <a:endParaRPr lang="en-SG" sz="1050" dirty="0"/>
@@ -3478,7 +3494,7 @@
         </p:nvSpPr>
         <p:spPr>
           <a:xfrm>
-            <a:off x="5219458" y="4352685"/>
+            <a:off x="5597283" y="4352685"/>
             <a:ext cx="929296" cy="346760"/>
           </a:xfrm>
           <a:prstGeom prst="rect">
@@ -3507,7 +3523,7 @@
           <a:p>
             <a:pPr algn="ctr"/>
             <a:r>
-              <a:rPr lang="en-US" sz="1050" dirty="0" smtClean="0"/>
+              <a:rPr lang="en-US" sz="1050" dirty="0"/>
               <a:t>Person</a:t>
             </a:r>
             <a:endParaRPr lang="en-SG" sz="1050" dirty="0"/>
@@ -3522,7 +3538,7 @@
         </p:nvSpPr>
         <p:spPr>
           <a:xfrm>
-            <a:off x="6781800" y="4036277"/>
+            <a:off x="7159625" y="4036277"/>
             <a:ext cx="929296" cy="346760"/>
           </a:xfrm>
           <a:prstGeom prst="rect">
@@ -3551,7 +3567,7 @@
           <a:p>
             <a:pPr algn="ctr"/>
             <a:r>
-              <a:rPr lang="en-US" sz="1050" dirty="0" smtClean="0"/>
+              <a:rPr lang="en-US" sz="1050" dirty="0"/>
               <a:t>Phone</a:t>
             </a:r>
             <a:endParaRPr lang="en-SG" sz="1050" dirty="0"/>
@@ -3566,7 +3582,7 @@
         </p:nvSpPr>
         <p:spPr>
           <a:xfrm>
-            <a:off x="6796454" y="4495800"/>
+            <a:off x="7174279" y="4495800"/>
             <a:ext cx="929296" cy="346760"/>
           </a:xfrm>
           <a:prstGeom prst="rect">
@@ -3595,7 +3611,7 @@
           <a:p>
             <a:pPr algn="ctr"/>
             <a:r>
-              <a:rPr lang="en-US" sz="1050" dirty="0" smtClean="0"/>
+              <a:rPr lang="en-US" sz="1050" dirty="0"/>
               <a:t>Email</a:t>
             </a:r>
             <a:endParaRPr lang="en-SG" sz="1050" dirty="0"/>
@@ -3610,7 +3626,7 @@
         </p:nvSpPr>
         <p:spPr>
           <a:xfrm>
-            <a:off x="6796454" y="4953000"/>
+            <a:off x="7174279" y="4953000"/>
             <a:ext cx="929296" cy="346760"/>
           </a:xfrm>
           <a:prstGeom prst="rect">
@@ -3639,7 +3655,7 @@
           <a:p>
             <a:pPr algn="ctr"/>
             <a:r>
-              <a:rPr lang="en-US" sz="1050" dirty="0" smtClean="0"/>
+              <a:rPr lang="en-US" sz="1050" dirty="0"/>
               <a:t>Address</a:t>
             </a:r>
             <a:endParaRPr lang="en-SG" sz="1050" dirty="0"/>
@@ -3654,7 +3670,7 @@
         </p:nvSpPr>
         <p:spPr>
           <a:xfrm>
-            <a:off x="1153227" y="4460471"/>
+            <a:off x="1531052" y="4460471"/>
             <a:ext cx="929296" cy="346760"/>
           </a:xfrm>
           <a:prstGeom prst="rect">
@@ -3683,7 +3699,7 @@
           <a:p>
             <a:pPr algn="ctr"/>
             <a:r>
-              <a:rPr lang="en-US" sz="1050" dirty="0" err="1" smtClean="0"/>
+              <a:rPr lang="en-US" sz="1050" dirty="0" err="1"/>
               <a:t>StorageFile</a:t>
             </a:r>
             <a:endParaRPr lang="en-SG" sz="1050" dirty="0"/>
@@ -3698,7 +3714,7 @@
         </p:nvCxnSpPr>
         <p:spPr>
           <a:xfrm rot="5400000">
-            <a:off x="321738" y="4617731"/>
+            <a:off x="699563" y="4617733"/>
             <a:ext cx="1047820" cy="1"/>
           </a:xfrm>
           <a:prstGeom prst="bentConnector3">
@@ -3741,7 +3757,7 @@
         </p:nvCxnSpPr>
         <p:spPr>
           <a:xfrm rot="5400000" flipH="1" flipV="1">
-            <a:off x="1053404" y="3352664"/>
+            <a:off x="1431229" y="3352664"/>
             <a:ext cx="567640" cy="221152"/>
           </a:xfrm>
           <a:prstGeom prst="bentConnector2">
@@ -3780,7 +3796,7 @@
         </p:nvCxnSpPr>
         <p:spPr>
           <a:xfrm rot="16200000" flipH="1">
-            <a:off x="809847" y="4297627"/>
+            <a:off x="1187672" y="4297629"/>
             <a:ext cx="530702" cy="141745"/>
           </a:xfrm>
           <a:prstGeom prst="bentConnector2">
@@ -3821,7 +3837,7 @@
         </p:nvCxnSpPr>
         <p:spPr>
           <a:xfrm flipV="1">
-            <a:off x="3230192" y="3205940"/>
+            <a:off x="3608017" y="3205940"/>
             <a:ext cx="450854" cy="712546"/>
           </a:xfrm>
           <a:prstGeom prst="bentConnector3">
@@ -3859,7 +3875,7 @@
         </p:nvCxnSpPr>
         <p:spPr>
           <a:xfrm>
-            <a:off x="3230192" y="3918486"/>
+            <a:off x="3608019" y="3918488"/>
             <a:ext cx="424477" cy="607579"/>
           </a:xfrm>
           <a:prstGeom prst="bentConnector3">
@@ -3899,7 +3915,7 @@
         </p:nvCxnSpPr>
         <p:spPr>
           <a:xfrm rot="5400000" flipH="1" flipV="1">
-            <a:off x="5197424" y="3866003"/>
+            <a:off x="5575251" y="3866003"/>
             <a:ext cx="973365" cy="12700"/>
           </a:xfrm>
           <a:prstGeom prst="bentConnector3">
@@ -3939,7 +3955,7 @@
         </p:nvCxnSpPr>
         <p:spPr>
           <a:xfrm flipV="1">
-            <a:off x="6384802" y="4209657"/>
+            <a:off x="6762627" y="4209657"/>
             <a:ext cx="396998" cy="312434"/>
           </a:xfrm>
           <a:prstGeom prst="bentConnector3">
@@ -3979,7 +3995,7 @@
         </p:nvCxnSpPr>
         <p:spPr>
           <a:xfrm>
-            <a:off x="6384802" y="4522091"/>
+            <a:off x="6762627" y="4522093"/>
             <a:ext cx="411652" cy="147089"/>
           </a:xfrm>
           <a:prstGeom prst="bentConnector3">
@@ -4019,7 +4035,7 @@
         </p:nvCxnSpPr>
         <p:spPr>
           <a:xfrm>
-            <a:off x="6384802" y="4522091"/>
+            <a:off x="6762627" y="4522093"/>
             <a:ext cx="411652" cy="604289"/>
           </a:xfrm>
           <a:prstGeom prst="bentConnector3">
@@ -4056,7 +4072,7 @@
         </p:nvSpPr>
         <p:spPr>
           <a:xfrm>
-            <a:off x="5219458" y="3032560"/>
+            <a:off x="5597283" y="3032560"/>
             <a:ext cx="929296" cy="346760"/>
           </a:xfrm>
           <a:prstGeom prst="rect">
@@ -4100,7 +4116,7 @@
         </p:nvSpPr>
         <p:spPr>
           <a:xfrm>
-            <a:off x="6148754" y="4435401"/>
+            <a:off x="6526579" y="4435401"/>
             <a:ext cx="236048" cy="173380"/>
           </a:xfrm>
           <a:prstGeom prst="flowChartDecision">
@@ -4131,11 +4147,7 @@
           <a:lstStyle/>
           <a:p>
             <a:pPr algn="ctr"/>
-            <a:endParaRPr lang="en-US" sz="1050">
-              <a:solidFill>
-                <a:schemeClr val="dk1"/>
-              </a:solidFill>
-            </a:endParaRPr>
+            <a:endParaRPr lang="en-US" sz="1050"/>
           </a:p>
         </p:txBody>
       </p:sp>
@@ -4147,7 +4159,7 @@
         </p:nvSpPr>
         <p:spPr>
           <a:xfrm>
-            <a:off x="4610342" y="3131950"/>
+            <a:off x="4988167" y="3131950"/>
             <a:ext cx="236048" cy="173380"/>
           </a:xfrm>
           <a:prstGeom prst="flowChartDecision">
@@ -4188,7 +4200,7 @@
         </p:nvSpPr>
         <p:spPr>
           <a:xfrm>
-            <a:off x="4573941" y="4439375"/>
+            <a:off x="4951766" y="4439375"/>
             <a:ext cx="236048" cy="173380"/>
           </a:xfrm>
           <a:prstGeom prst="flowChartDecision">
@@ -4229,7 +4241,7 @@
         </p:nvSpPr>
         <p:spPr>
           <a:xfrm>
-            <a:off x="2994144" y="3831796"/>
+            <a:off x="3371969" y="3831796"/>
             <a:ext cx="236048" cy="173380"/>
           </a:xfrm>
           <a:prstGeom prst="flowChartDecision">
@@ -4275,7 +4287,7 @@
         </p:nvCxnSpPr>
         <p:spPr>
           <a:xfrm flipV="1">
-            <a:off x="4846390" y="3205940"/>
+            <a:off x="5224215" y="3205940"/>
             <a:ext cx="373068" cy="12700"/>
           </a:xfrm>
           <a:prstGeom prst="straightConnector1">
@@ -4313,7 +4325,7 @@
         </p:nvCxnSpPr>
         <p:spPr>
           <a:xfrm>
-            <a:off x="4809989" y="4526065"/>
+            <a:off x="5187816" y="4526065"/>
             <a:ext cx="409469" cy="0"/>
           </a:xfrm>
           <a:prstGeom prst="straightConnector1">
@@ -4351,7 +4363,7 @@
         </p:nvCxnSpPr>
         <p:spPr>
           <a:xfrm>
-            <a:off x="1691296" y="3920440"/>
+            <a:off x="2069121" y="3920440"/>
             <a:ext cx="373552" cy="0"/>
           </a:xfrm>
           <a:prstGeom prst="straightConnector1">
@@ -4389,7 +4401,7 @@
         </p:nvSpPr>
         <p:spPr>
           <a:xfrm>
-            <a:off x="2258278" y="5140408"/>
+            <a:off x="2636103" y="5140408"/>
             <a:ext cx="1408598" cy="346760"/>
           </a:xfrm>
           <a:prstGeom prst="rect">
@@ -4418,14 +4430,14 @@
           <a:p>
             <a:pPr algn="ctr"/>
             <a:r>
-              <a:rPr lang="en-US" sz="1050" dirty="0" smtClean="0"/>
+              <a:rPr lang="en-US" sz="1050" dirty="0"/>
               <a:t>&lt;&lt;interface&gt;&gt;</a:t>
             </a:r>
           </a:p>
           <a:p>
             <a:pPr algn="ctr"/>
             <a:r>
-              <a:rPr lang="en-US" sz="1050" dirty="0" err="1" smtClean="0"/>
+              <a:rPr lang="en-US" sz="1050" dirty="0" err="1"/>
               <a:t>ReadOnlyPerson</a:t>
             </a:r>
             <a:endParaRPr lang="en-SG" sz="1050" dirty="0"/>
@@ -4443,7 +4455,7 @@
         </p:nvCxnSpPr>
         <p:spPr>
           <a:xfrm flipV="1">
-            <a:off x="1691295" y="5313788"/>
+            <a:off x="2069122" y="5313788"/>
             <a:ext cx="566983" cy="1232"/>
           </a:xfrm>
           <a:prstGeom prst="bentConnector3">
@@ -4484,7 +4496,7 @@
         </p:nvSpPr>
         <p:spPr>
           <a:xfrm rot="16200000">
-            <a:off x="3619386" y="5226026"/>
+            <a:off x="3997211" y="5226028"/>
             <a:ext cx="270504" cy="175523"/>
           </a:xfrm>
           <a:prstGeom prst="triangle">
@@ -4527,7 +4539,7 @@
         </p:nvCxnSpPr>
         <p:spPr>
           <a:xfrm rot="5400000">
-            <a:off x="4456082" y="4085763"/>
+            <a:off x="4833909" y="4085763"/>
             <a:ext cx="614343" cy="1841706"/>
           </a:xfrm>
           <a:prstGeom prst="bentConnector2">
@@ -4563,7 +4575,7 @@
         </p:nvSpPr>
         <p:spPr>
           <a:xfrm>
-            <a:off x="2566828" y="1356188"/>
+            <a:off x="2944655" y="1356188"/>
             <a:ext cx="1611867" cy="444640"/>
           </a:xfrm>
           <a:prstGeom prst="rect">
@@ -4614,7 +4626,7 @@
         </p:nvSpPr>
         <p:spPr>
           <a:xfrm flipH="1">
-            <a:off x="4724400" y="1059080"/>
+            <a:off x="5102227" y="1059080"/>
             <a:ext cx="1404109" cy="346760"/>
           </a:xfrm>
           <a:prstGeom prst="rect">
@@ -4658,7 +4670,7 @@
         </p:nvSpPr>
         <p:spPr>
           <a:xfrm flipH="1">
-            <a:off x="4724400" y="1454067"/>
+            <a:off x="5102227" y="1454067"/>
             <a:ext cx="1404109" cy="346760"/>
           </a:xfrm>
           <a:prstGeom prst="rect">
@@ -4702,7 +4714,7 @@
         </p:nvSpPr>
         <p:spPr>
           <a:xfrm flipH="1">
-            <a:off x="4724400" y="1849054"/>
+            <a:off x="5102227" y="1849054"/>
             <a:ext cx="1404109" cy="346760"/>
           </a:xfrm>
           <a:prstGeom prst="rect">
@@ -4746,7 +4758,7 @@
         </p:nvSpPr>
         <p:spPr>
           <a:xfrm rot="16200000">
-            <a:off x="4131203" y="1571491"/>
+            <a:off x="4509028" y="1571493"/>
             <a:ext cx="270504" cy="175523"/>
           </a:xfrm>
           <a:prstGeom prst="triangle">
@@ -4789,7 +4801,7 @@
         </p:nvCxnSpPr>
         <p:spPr>
           <a:xfrm flipV="1">
-            <a:off x="4354217" y="1627447"/>
+            <a:off x="4732044" y="1627447"/>
             <a:ext cx="370183" cy="31806"/>
           </a:xfrm>
           <a:prstGeom prst="bentConnector3">
@@ -4827,7 +4839,7 @@
         </p:nvCxnSpPr>
         <p:spPr>
           <a:xfrm flipV="1">
-            <a:off x="4354217" y="1232460"/>
+            <a:off x="4732044" y="1232462"/>
             <a:ext cx="370183" cy="426793"/>
           </a:xfrm>
           <a:prstGeom prst="bentConnector3">
@@ -4865,7 +4877,7 @@
         </p:nvCxnSpPr>
         <p:spPr>
           <a:xfrm>
-            <a:off x="4354217" y="1659253"/>
+            <a:off x="4732044" y="1659255"/>
             <a:ext cx="370183" cy="363181"/>
           </a:xfrm>
           <a:prstGeom prst="bentConnector3">
@@ -4900,7 +4912,7 @@
         </p:nvSpPr>
         <p:spPr>
           <a:xfrm flipH="1">
-            <a:off x="4724400" y="2244040"/>
+            <a:off x="5102227" y="2244040"/>
             <a:ext cx="1404109" cy="346760"/>
           </a:xfrm>
           <a:prstGeom prst="rect">
@@ -4929,7 +4941,7 @@
           <a:p>
             <a:pPr algn="ctr"/>
             <a:r>
-              <a:rPr lang="en-US" sz="1050" dirty="0" smtClean="0"/>
+              <a:rPr lang="en-US" sz="1050" dirty="0"/>
               <a:t>…Command</a:t>
             </a:r>
             <a:endParaRPr lang="en-SG" sz="1050" dirty="0"/>
@@ -4947,7 +4959,7 @@
         </p:nvCxnSpPr>
         <p:spPr>
           <a:xfrm>
-            <a:off x="4354217" y="1659253"/>
+            <a:off x="4732044" y="1659255"/>
             <a:ext cx="370183" cy="758167"/>
           </a:xfrm>
           <a:prstGeom prst="bentConnector3">
@@ -4985,7 +4997,7 @@
         </p:nvCxnSpPr>
         <p:spPr>
           <a:xfrm rot="5400000" flipH="1" flipV="1">
-            <a:off x="1452229" y="1891441"/>
+            <a:off x="1830054" y="1891441"/>
             <a:ext cx="1427532" cy="801666"/>
           </a:xfrm>
           <a:prstGeom prst="bentConnector2">
@@ -5021,7 +5033,7 @@
         </p:nvCxnSpPr>
         <p:spPr>
           <a:xfrm rot="5400000" flipH="1" flipV="1">
-            <a:off x="632132" y="1812364"/>
+            <a:off x="1009957" y="1812366"/>
             <a:ext cx="2293164" cy="1576229"/>
           </a:xfrm>
           <a:prstGeom prst="bentConnector3">
@@ -5062,7 +5074,7 @@
         </p:nvCxnSpPr>
         <p:spPr>
           <a:xfrm rot="5400000">
-            <a:off x="1795164" y="2790743"/>
+            <a:off x="2172989" y="2790743"/>
             <a:ext cx="1889726" cy="6348"/>
           </a:xfrm>
           <a:prstGeom prst="bentConnector3">
@@ -5103,7 +5115,7 @@
         </p:nvSpPr>
         <p:spPr>
           <a:xfrm flipH="1">
-            <a:off x="1219200" y="720040"/>
+            <a:off x="1597027" y="720040"/>
             <a:ext cx="1404109" cy="346760"/>
           </a:xfrm>
           <a:prstGeom prst="rect">
@@ -5150,7 +5162,7 @@
         </p:nvCxnSpPr>
         <p:spPr>
           <a:xfrm rot="16200000" flipV="1">
-            <a:off x="2766652" y="750077"/>
+            <a:off x="3144477" y="750079"/>
             <a:ext cx="462768" cy="749453"/>
           </a:xfrm>
           <a:prstGeom prst="bentConnector2">
@@ -5191,7 +5203,7 @@
         </p:nvCxnSpPr>
         <p:spPr>
           <a:xfrm rot="5400000" flipH="1" flipV="1">
-            <a:off x="-394396" y="2133468"/>
+            <a:off x="-16570" y="2133470"/>
             <a:ext cx="2853643" cy="373549"/>
           </a:xfrm>
           <a:prstGeom prst="bentConnector2">
@@ -5230,7 +5242,7 @@
         </p:nvSpPr>
         <p:spPr>
           <a:xfrm>
-            <a:off x="6781800" y="3539440"/>
+            <a:off x="7159625" y="3539440"/>
             <a:ext cx="929296" cy="346760"/>
           </a:xfrm>
           <a:prstGeom prst="rect">
@@ -5277,7 +5289,7 @@
         </p:nvCxnSpPr>
         <p:spPr>
           <a:xfrm flipV="1">
-            <a:off x="6384802" y="3712820"/>
+            <a:off x="6762627" y="3712822"/>
             <a:ext cx="396998" cy="809271"/>
           </a:xfrm>
           <a:prstGeom prst="bentConnector3">
@@ -5314,7 +5326,7 @@
         </p:nvSpPr>
         <p:spPr>
           <a:xfrm>
-            <a:off x="6384802" y="874142"/>
+            <a:off x="6762627" y="874142"/>
             <a:ext cx="929296" cy="346760"/>
           </a:xfrm>
           <a:prstGeom prst="rect">
@@ -5343,7 +5355,7 @@
           <a:p>
             <a:pPr algn="ctr"/>
             <a:r>
-              <a:rPr lang="en-US" sz="1050" dirty="0" smtClean="0"/>
+              <a:rPr lang="en-US" sz="1050" dirty="0"/>
               <a:t>Messages</a:t>
             </a:r>
             <a:endParaRPr lang="en-SG" sz="1050" dirty="0"/>
@@ -5358,7 +5370,7 @@
         </p:nvSpPr>
         <p:spPr>
           <a:xfrm>
-            <a:off x="7592520" y="874142"/>
+            <a:off x="7970345" y="874142"/>
             <a:ext cx="929296" cy="346760"/>
           </a:xfrm>
           <a:prstGeom prst="rect">
@@ -5387,7 +5399,7 @@
           <a:p>
             <a:pPr algn="ctr"/>
             <a:r>
-              <a:rPr lang="en-US" sz="1050" dirty="0" err="1" smtClean="0"/>
+              <a:rPr lang="en-US" sz="1050" dirty="0" err="1"/>
               <a:t>Utils</a:t>
             </a:r>
             <a:endParaRPr lang="en-SG" sz="1050" dirty="0"/>
@@ -5402,7 +5414,7 @@
         </p:nvSpPr>
         <p:spPr>
           <a:xfrm>
-            <a:off x="3666876" y="3710497"/>
+            <a:off x="4044701" y="3710497"/>
             <a:ext cx="929296" cy="346760"/>
           </a:xfrm>
           <a:prstGeom prst="rect">
@@ -5446,7 +5458,7 @@
         </p:nvSpPr>
         <p:spPr>
           <a:xfrm>
-            <a:off x="2356763" y="4455640"/>
+            <a:off x="2734588" y="4455640"/>
             <a:ext cx="929296" cy="346760"/>
           </a:xfrm>
           <a:prstGeom prst="rect">
@@ -5475,7 +5487,7 @@
           <a:p>
             <a:pPr algn="ctr"/>
             <a:r>
-              <a:rPr lang="en-US" sz="1050" dirty="0" smtClean="0"/>
+              <a:rPr lang="en-US" sz="1050" dirty="0"/>
               <a:t>Adapted…</a:t>
             </a:r>
             <a:endParaRPr lang="en-SG" sz="1050" dirty="0"/>
@@ -5493,7 +5505,7 @@
         </p:nvCxnSpPr>
         <p:spPr>
           <a:xfrm flipV="1">
-            <a:off x="2082523" y="4629020"/>
+            <a:off x="2460348" y="4629022"/>
             <a:ext cx="274240" cy="4831"/>
           </a:xfrm>
           <a:prstGeom prst="bentConnector3">
@@ -5534,7 +5546,7 @@
         </p:nvCxnSpPr>
         <p:spPr>
           <a:xfrm flipV="1">
-            <a:off x="6689603" y="1199445"/>
+            <a:off x="7067428" y="1199445"/>
             <a:ext cx="0" cy="304800"/>
           </a:xfrm>
           <a:prstGeom prst="straightConnector1">
@@ -5573,7 +5585,7 @@
         </p:nvCxnSpPr>
         <p:spPr>
           <a:xfrm flipV="1">
-            <a:off x="6842003" y="1199445"/>
+            <a:off x="7219828" y="1199445"/>
             <a:ext cx="0" cy="304800"/>
           </a:xfrm>
           <a:prstGeom prst="straightConnector1">
@@ -5612,7 +5624,7 @@
         </p:nvCxnSpPr>
         <p:spPr>
           <a:xfrm flipV="1">
-            <a:off x="6994403" y="1199445"/>
+            <a:off x="7372228" y="1199445"/>
             <a:ext cx="0" cy="304800"/>
           </a:xfrm>
           <a:prstGeom prst="straightConnector1">
@@ -5651,7 +5663,7 @@
         </p:nvCxnSpPr>
         <p:spPr>
           <a:xfrm flipV="1">
-            <a:off x="7864446" y="1199445"/>
+            <a:off x="8242271" y="1199445"/>
             <a:ext cx="0" cy="304800"/>
           </a:xfrm>
           <a:prstGeom prst="straightConnector1">
@@ -5690,7 +5702,7 @@
         </p:nvCxnSpPr>
         <p:spPr>
           <a:xfrm flipV="1">
-            <a:off x="8016846" y="1199445"/>
+            <a:off x="8394671" y="1199445"/>
             <a:ext cx="0" cy="304800"/>
           </a:xfrm>
           <a:prstGeom prst="straightConnector1">
@@ -5729,7 +5741,7 @@
         </p:nvCxnSpPr>
         <p:spPr>
           <a:xfrm flipV="1">
-            <a:off x="8169246" y="1199445"/>
+            <a:off x="8547071" y="1199445"/>
             <a:ext cx="0" cy="304800"/>
           </a:xfrm>
           <a:prstGeom prst="straightConnector1">
@@ -5754,6 +5766,385 @@
           </a:fillRef>
           <a:effectRef idx="1">
             <a:schemeClr val="accent2"/>
+          </a:effectRef>
+          <a:fontRef idx="minor">
+            <a:schemeClr val="dk1"/>
+          </a:fontRef>
+        </p:style>
+      </p:cxnSp>
+      <p:sp>
+        <p:nvSpPr>
+          <p:cNvPr id="78" name="Rectangle 21"/>
+          <p:cNvSpPr/>
+          <p:nvPr/>
+        </p:nvSpPr>
+        <p:spPr>
+          <a:xfrm>
+            <a:off x="8766779" y="5557289"/>
+            <a:ext cx="929296" cy="346760"/>
+          </a:xfrm>
+          <a:prstGeom prst="rect">
+            <a:avLst/>
+          </a:prstGeom>
+          <a:ln w="19050"/>
+          <a:effectLst/>
+        </p:spPr>
+        <p:style>
+          <a:lnRef idx="1">
+            <a:schemeClr val="accent4"/>
+          </a:lnRef>
+          <a:fillRef idx="2">
+            <a:schemeClr val="accent4"/>
+          </a:fillRef>
+          <a:effectRef idx="1">
+            <a:schemeClr val="accent4"/>
+          </a:effectRef>
+          <a:fontRef idx="minor">
+            <a:schemeClr val="dk1"/>
+          </a:fontRef>
+        </p:style>
+        <p:txBody>
+          <a:bodyPr rtlCol="0" anchor="ctr"/>
+          <a:lstStyle/>
+          <a:p>
+            <a:pPr algn="ctr"/>
+            <a:r>
+              <a:rPr lang="en-US" sz="1050" dirty="0"/>
+              <a:t>Unit</a:t>
+            </a:r>
+            <a:endParaRPr lang="en-SG" sz="1050" dirty="0"/>
+          </a:p>
+        </p:txBody>
+      </p:sp>
+      <p:cxnSp>
+        <p:nvCxnSpPr>
+          <p:cNvPr id="80" name="Elbow Connector 70"/>
+          <p:cNvCxnSpPr>
+            <a:stCxn id="85" idx="3"/>
+            <a:endCxn id="80" idx="1"/>
+          </p:cNvCxnSpPr>
+          <p:nvPr/>
+        </p:nvCxnSpPr>
+        <p:spPr>
+          <a:xfrm>
+            <a:off x="8355127" y="5126382"/>
+            <a:ext cx="411652" cy="604289"/>
+          </a:xfrm>
+          <a:prstGeom prst="bentConnector3">
+            <a:avLst>
+              <a:gd name="adj1" fmla="val 50000"/>
+            </a:avLst>
+          </a:prstGeom>
+          <a:ln w="19050">
+            <a:headEnd type="none" w="med" len="med"/>
+            <a:tailEnd type="arrow" w="med" len="med"/>
+          </a:ln>
+          <a:effectLst/>
+        </p:spPr>
+        <p:style>
+          <a:lnRef idx="1">
+            <a:schemeClr val="accent4"/>
+          </a:lnRef>
+          <a:fillRef idx="2">
+            <a:schemeClr val="accent4"/>
+          </a:fillRef>
+          <a:effectRef idx="1">
+            <a:schemeClr val="accent4"/>
+          </a:effectRef>
+          <a:fontRef idx="minor">
+            <a:schemeClr val="dk1"/>
+          </a:fontRef>
+        </p:style>
+      </p:cxnSp>
+      <p:sp>
+        <p:nvSpPr>
+          <p:cNvPr id="83" name="Flowchart: Decision 89"/>
+          <p:cNvSpPr/>
+          <p:nvPr/>
+        </p:nvSpPr>
+        <p:spPr>
+          <a:xfrm>
+            <a:off x="8119079" y="5039690"/>
+            <a:ext cx="236048" cy="173380"/>
+          </a:xfrm>
+          <a:prstGeom prst="flowChartDecision">
+            <a:avLst/>
+          </a:prstGeom>
+          <a:solidFill>
+            <a:schemeClr val="accent4"/>
+          </a:solidFill>
+          <a:ln w="19050"/>
+          <a:effectLst/>
+        </p:spPr>
+        <p:style>
+          <a:lnRef idx="1">
+            <a:schemeClr val="accent4"/>
+          </a:lnRef>
+          <a:fillRef idx="2">
+            <a:schemeClr val="accent4"/>
+          </a:fillRef>
+          <a:effectRef idx="1">
+            <a:schemeClr val="accent4"/>
+          </a:effectRef>
+          <a:fontRef idx="minor">
+            <a:schemeClr val="dk1"/>
+          </a:fontRef>
+        </p:style>
+        <p:txBody>
+          <a:bodyPr rtlCol="0" anchor="ctr"/>
+          <a:lstStyle/>
+          <a:p>
+            <a:pPr algn="ctr"/>
+            <a:endParaRPr lang="en-US" sz="1050"/>
+          </a:p>
+        </p:txBody>
+      </p:sp>
+      <p:sp>
+        <p:nvSpPr>
+          <p:cNvPr id="85" name="Rectangle 21"/>
+          <p:cNvSpPr/>
+          <p:nvPr/>
+        </p:nvSpPr>
+        <p:spPr>
+          <a:xfrm>
+            <a:off x="8766779" y="6056449"/>
+            <a:ext cx="929296" cy="346760"/>
+          </a:xfrm>
+          <a:prstGeom prst="rect">
+            <a:avLst/>
+          </a:prstGeom>
+          <a:ln w="19050"/>
+          <a:effectLst/>
+        </p:spPr>
+        <p:style>
+          <a:lnRef idx="1">
+            <a:schemeClr val="accent4"/>
+          </a:lnRef>
+          <a:fillRef idx="2">
+            <a:schemeClr val="accent4"/>
+          </a:fillRef>
+          <a:effectRef idx="1">
+            <a:schemeClr val="accent4"/>
+          </a:effectRef>
+          <a:fontRef idx="minor">
+            <a:schemeClr val="dk1"/>
+          </a:fontRef>
+        </p:style>
+        <p:txBody>
+          <a:bodyPr rtlCol="0" anchor="ctr"/>
+          <a:lstStyle/>
+          <a:p>
+            <a:pPr algn="ctr"/>
+            <a:r>
+              <a:rPr lang="en-US" sz="1050" dirty="0"/>
+              <a:t>Postal code</a:t>
+            </a:r>
+            <a:endParaRPr lang="en-SG" sz="1050" dirty="0"/>
+          </a:p>
+        </p:txBody>
+      </p:sp>
+      <p:sp>
+        <p:nvSpPr>
+          <p:cNvPr id="86" name="Rectangle 21"/>
+          <p:cNvSpPr/>
+          <p:nvPr/>
+        </p:nvSpPr>
+        <p:spPr>
+          <a:xfrm>
+            <a:off x="8766779" y="5039690"/>
+            <a:ext cx="929296" cy="346760"/>
+          </a:xfrm>
+          <a:prstGeom prst="rect">
+            <a:avLst/>
+          </a:prstGeom>
+          <a:ln w="19050"/>
+          <a:effectLst/>
+        </p:spPr>
+        <p:style>
+          <a:lnRef idx="1">
+            <a:schemeClr val="accent4"/>
+          </a:lnRef>
+          <a:fillRef idx="2">
+            <a:schemeClr val="accent4"/>
+          </a:fillRef>
+          <a:effectRef idx="1">
+            <a:schemeClr val="accent4"/>
+          </a:effectRef>
+          <a:fontRef idx="minor">
+            <a:schemeClr val="dk1"/>
+          </a:fontRef>
+        </p:style>
+        <p:txBody>
+          <a:bodyPr rtlCol="0" anchor="ctr"/>
+          <a:lstStyle/>
+          <a:p>
+            <a:pPr algn="ctr"/>
+            <a:r>
+              <a:rPr lang="en-US" sz="1050" dirty="0"/>
+              <a:t>Street</a:t>
+            </a:r>
+            <a:endParaRPr lang="en-SG" sz="1050" dirty="0"/>
+          </a:p>
+        </p:txBody>
+      </p:sp>
+      <p:sp>
+        <p:nvSpPr>
+          <p:cNvPr id="88" name="Rectangle 21"/>
+          <p:cNvSpPr/>
+          <p:nvPr/>
+        </p:nvSpPr>
+        <p:spPr>
+          <a:xfrm>
+            <a:off x="8766779" y="4495800"/>
+            <a:ext cx="929296" cy="346760"/>
+          </a:xfrm>
+          <a:prstGeom prst="rect">
+            <a:avLst/>
+          </a:prstGeom>
+          <a:ln w="19050"/>
+          <a:effectLst/>
+        </p:spPr>
+        <p:style>
+          <a:lnRef idx="1">
+            <a:schemeClr val="accent4"/>
+          </a:lnRef>
+          <a:fillRef idx="2">
+            <a:schemeClr val="accent4"/>
+          </a:fillRef>
+          <a:effectRef idx="1">
+            <a:schemeClr val="accent4"/>
+          </a:effectRef>
+          <a:fontRef idx="minor">
+            <a:schemeClr val="dk1"/>
+          </a:fontRef>
+        </p:style>
+        <p:txBody>
+          <a:bodyPr rtlCol="0" anchor="ctr"/>
+          <a:lstStyle/>
+          <a:p>
+            <a:pPr algn="ctr"/>
+            <a:r>
+              <a:rPr lang="en-US" sz="1050" dirty="0"/>
+              <a:t>Block</a:t>
+            </a:r>
+            <a:endParaRPr lang="en-SG" sz="1050" dirty="0"/>
+          </a:p>
+        </p:txBody>
+      </p:sp>
+      <p:cxnSp>
+        <p:nvCxnSpPr>
+          <p:cNvPr id="89" name="Elbow Connector 70"/>
+          <p:cNvCxnSpPr>
+            <a:stCxn id="85" idx="3"/>
+            <a:endCxn id="89" idx="1"/>
+          </p:cNvCxnSpPr>
+          <p:nvPr/>
+        </p:nvCxnSpPr>
+        <p:spPr>
+          <a:xfrm flipV="1">
+            <a:off x="8355127" y="4669180"/>
+            <a:ext cx="411652" cy="457200"/>
+          </a:xfrm>
+          <a:prstGeom prst="bentConnector3">
+            <a:avLst>
+              <a:gd name="adj1" fmla="val 50000"/>
+            </a:avLst>
+          </a:prstGeom>
+          <a:ln w="19050">
+            <a:headEnd type="none" w="med" len="med"/>
+            <a:tailEnd type="arrow" w="med" len="med"/>
+          </a:ln>
+          <a:effectLst/>
+        </p:spPr>
+        <p:style>
+          <a:lnRef idx="1">
+            <a:schemeClr val="accent4"/>
+          </a:lnRef>
+          <a:fillRef idx="2">
+            <a:schemeClr val="accent4"/>
+          </a:fillRef>
+          <a:effectRef idx="1">
+            <a:schemeClr val="accent4"/>
+          </a:effectRef>
+          <a:fontRef idx="minor">
+            <a:schemeClr val="dk1"/>
+          </a:fontRef>
+        </p:style>
+      </p:cxnSp>
+      <p:cxnSp>
+        <p:nvCxnSpPr>
+          <p:cNvPr id="91" name="Elbow Connector 70"/>
+          <p:cNvCxnSpPr>
+            <a:stCxn id="85" idx="3"/>
+            <a:endCxn id="86" idx="1"/>
+          </p:cNvCxnSpPr>
+          <p:nvPr/>
+        </p:nvCxnSpPr>
+        <p:spPr>
+          <a:xfrm>
+            <a:off x="8355127" y="5126382"/>
+            <a:ext cx="411652" cy="1103449"/>
+          </a:xfrm>
+          <a:prstGeom prst="bentConnector3">
+            <a:avLst>
+              <a:gd name="adj1" fmla="val 50000"/>
+            </a:avLst>
+          </a:prstGeom>
+          <a:ln w="19050">
+            <a:headEnd type="none" w="med" len="med"/>
+            <a:tailEnd type="arrow" w="med" len="med"/>
+          </a:ln>
+          <a:effectLst/>
+        </p:spPr>
+        <p:style>
+          <a:lnRef idx="1">
+            <a:schemeClr val="accent4"/>
+          </a:lnRef>
+          <a:fillRef idx="2">
+            <a:schemeClr val="accent4"/>
+          </a:fillRef>
+          <a:effectRef idx="1">
+            <a:schemeClr val="accent4"/>
+          </a:effectRef>
+          <a:fontRef idx="minor">
+            <a:schemeClr val="dk1"/>
+          </a:fontRef>
+        </p:style>
+      </p:cxnSp>
+      <p:cxnSp>
+        <p:nvCxnSpPr>
+          <p:cNvPr id="94" name="Elbow Connector 70"/>
+          <p:cNvCxnSpPr>
+            <a:stCxn id="85" idx="3"/>
+            <a:endCxn id="88" idx="1"/>
+          </p:cNvCxnSpPr>
+          <p:nvPr/>
+        </p:nvCxnSpPr>
+        <p:spPr>
+          <a:xfrm>
+            <a:off x="8355127" y="5126380"/>
+            <a:ext cx="411652" cy="86690"/>
+          </a:xfrm>
+          <a:prstGeom prst="bentConnector3">
+            <a:avLst>
+              <a:gd name="adj1" fmla="val 50000"/>
+            </a:avLst>
+          </a:prstGeom>
+          <a:ln w="19050">
+            <a:headEnd type="none" w="med" len="med"/>
+            <a:tailEnd type="arrow" w="med" len="med"/>
+          </a:ln>
+          <a:effectLst/>
+        </p:spPr>
+        <p:style>
+          <a:lnRef idx="1">
+            <a:schemeClr val="accent4"/>
+          </a:lnRef>
+          <a:fillRef idx="2">
+            <a:schemeClr val="accent4"/>
+          </a:fillRef>
+          <a:effectRef idx="1">
+            <a:schemeClr val="accent4"/>
           </a:effectRef>
           <a:fontRef idx="minor">
             <a:schemeClr val="dk1"/>
@@ -5770,6 +6161,13 @@
   <p:clrMapOvr>
     <a:masterClrMapping/>
   </p:clrMapOvr>
+  <p:timing>
+    <p:tnLst>
+      <p:par>
+        <p:cTn id="1" dur="indefinite" restart="never" nodeType="tmRoot"/>
+      </p:par>
+    </p:tnLst>
+  </p:timing>
 </p:sld>
 </file>
 
@@ -5798,7 +6196,7 @@
         </p:nvSpPr>
         <p:spPr>
           <a:xfrm>
-            <a:off x="1009446" y="3810000"/>
+            <a:off x="1387271" y="3810000"/>
             <a:ext cx="929296" cy="346760"/>
           </a:xfrm>
           <a:prstGeom prst="rect">
@@ -5827,7 +6225,7 @@
           <a:p>
             <a:pPr algn="ctr"/>
             <a:r>
-              <a:rPr lang="en-US" sz="1050" dirty="0" smtClean="0"/>
+              <a:rPr lang="en-US" sz="1050" dirty="0"/>
               <a:t>Address</a:t>
             </a:r>
             <a:endParaRPr lang="en-SG" sz="1050" dirty="0"/>
@@ -5842,7 +6240,7 @@
         </p:nvSpPr>
         <p:spPr>
           <a:xfrm>
-            <a:off x="2600202" y="4414289"/>
+            <a:off x="2978027" y="4414289"/>
             <a:ext cx="929296" cy="346760"/>
           </a:xfrm>
           <a:prstGeom prst="rect">
@@ -5871,7 +6269,7 @@
           <a:p>
             <a:pPr algn="ctr"/>
             <a:r>
-              <a:rPr lang="en-US" sz="1050" dirty="0" smtClean="0"/>
+              <a:rPr lang="en-US" sz="1050" dirty="0"/>
               <a:t>Unit</a:t>
             </a:r>
             <a:endParaRPr lang="en-SG" sz="1050" dirty="0"/>
@@ -5889,7 +6287,7 @@
         </p:nvCxnSpPr>
         <p:spPr>
           <a:xfrm>
-            <a:off x="2188550" y="3983380"/>
+            <a:off x="2566375" y="3983382"/>
             <a:ext cx="411652" cy="604289"/>
           </a:xfrm>
           <a:prstGeom prst="bentConnector3">
@@ -5926,7 +6324,7 @@
         </p:nvSpPr>
         <p:spPr>
           <a:xfrm>
-            <a:off x="1952502" y="3896690"/>
+            <a:off x="2330327" y="3896690"/>
             <a:ext cx="236048" cy="173380"/>
           </a:xfrm>
           <a:prstGeom prst="flowChartDecision">
@@ -5969,7 +6367,7 @@
         </p:nvSpPr>
         <p:spPr>
           <a:xfrm>
-            <a:off x="2600202" y="4913449"/>
+            <a:off x="2978027" y="4913449"/>
             <a:ext cx="929296" cy="346760"/>
           </a:xfrm>
           <a:prstGeom prst="rect">
@@ -5998,7 +6396,7 @@
           <a:p>
             <a:pPr algn="ctr"/>
             <a:r>
-              <a:rPr lang="en-US" sz="1050" dirty="0" smtClean="0"/>
+              <a:rPr lang="en-US" sz="1050" dirty="0"/>
               <a:t>Postal code</a:t>
             </a:r>
             <a:endParaRPr lang="en-SG" sz="1050" dirty="0"/>
@@ -6013,7 +6411,7 @@
         </p:nvSpPr>
         <p:spPr>
           <a:xfrm>
-            <a:off x="2600202" y="3896690"/>
+            <a:off x="2978027" y="3896690"/>
             <a:ext cx="929296" cy="346760"/>
           </a:xfrm>
           <a:prstGeom prst="rect">
@@ -6042,7 +6440,7 @@
           <a:p>
             <a:pPr algn="ctr"/>
             <a:r>
-              <a:rPr lang="en-US" sz="1050" dirty="0" smtClean="0"/>
+              <a:rPr lang="en-US" sz="1050" dirty="0"/>
               <a:t>Street</a:t>
             </a:r>
             <a:endParaRPr lang="en-SG" sz="1050" dirty="0"/>
@@ -6057,7 +6455,7 @@
         </p:nvSpPr>
         <p:spPr>
           <a:xfrm>
-            <a:off x="2600202" y="3352800"/>
+            <a:off x="2978027" y="3352800"/>
             <a:ext cx="929296" cy="346760"/>
           </a:xfrm>
           <a:prstGeom prst="rect">
@@ -6086,7 +6484,7 @@
           <a:p>
             <a:pPr algn="ctr"/>
             <a:r>
-              <a:rPr lang="en-US" sz="1050" dirty="0" smtClean="0"/>
+              <a:rPr lang="en-US" sz="1050" dirty="0"/>
               <a:t>Block</a:t>
             </a:r>
             <a:endParaRPr lang="en-SG" sz="1050" dirty="0"/>
@@ -6104,7 +6502,7 @@
         </p:nvCxnSpPr>
         <p:spPr>
           <a:xfrm flipV="1">
-            <a:off x="2188550" y="3526180"/>
+            <a:off x="2566375" y="3526180"/>
             <a:ext cx="411652" cy="457200"/>
           </a:xfrm>
           <a:prstGeom prst="bentConnector3">
@@ -6144,7 +6542,7 @@
         </p:nvCxnSpPr>
         <p:spPr>
           <a:xfrm>
-            <a:off x="2188550" y="3983380"/>
+            <a:off x="2566375" y="3983382"/>
             <a:ext cx="411652" cy="1103449"/>
           </a:xfrm>
           <a:prstGeom prst="bentConnector3">
@@ -6184,7 +6582,7 @@
         </p:nvCxnSpPr>
         <p:spPr>
           <a:xfrm>
-            <a:off x="2188550" y="3983380"/>
+            <a:off x="2566375" y="3983380"/>
             <a:ext cx="411652" cy="86690"/>
           </a:xfrm>
           <a:prstGeom prst="bentConnector3">
@@ -6221,7 +6619,7 @@
         </p:nvSpPr>
         <p:spPr>
           <a:xfrm>
-            <a:off x="7376135" y="1180514"/>
+            <a:off x="7753960" y="1180516"/>
             <a:ext cx="929296" cy="342611"/>
           </a:xfrm>
           <a:prstGeom prst="rect">
@@ -6250,7 +6648,7 @@
           <a:p>
             <a:pPr algn="ctr"/>
             <a:r>
-              <a:rPr lang="en-SG" sz="1050" dirty="0" smtClean="0"/>
+              <a:rPr lang="en-SG" sz="1050" dirty="0"/>
               <a:t>Contact</a:t>
             </a:r>
             <a:endParaRPr lang="en-SG" sz="1050" dirty="0"/>
@@ -6265,7 +6663,7 @@
         </p:nvSpPr>
         <p:spPr>
           <a:xfrm>
-            <a:off x="6248400" y="1739820"/>
+            <a:off x="6626225" y="1739820"/>
             <a:ext cx="929296" cy="346760"/>
           </a:xfrm>
           <a:prstGeom prst="rect">
@@ -6294,7 +6692,7 @@
           <a:p>
             <a:pPr algn="ctr"/>
             <a:r>
-              <a:rPr lang="en-US" sz="1050" dirty="0" smtClean="0"/>
+              <a:rPr lang="en-US" sz="1050" dirty="0"/>
               <a:t>Phone</a:t>
             </a:r>
             <a:endParaRPr lang="en-SG" sz="1050" dirty="0"/>
@@ -6309,7 +6707,7 @@
         </p:nvSpPr>
         <p:spPr>
           <a:xfrm>
-            <a:off x="6263054" y="2199343"/>
+            <a:off x="6640879" y="2199343"/>
             <a:ext cx="929296" cy="346760"/>
           </a:xfrm>
           <a:prstGeom prst="rect">
@@ -6338,7 +6736,7 @@
           <a:p>
             <a:pPr algn="ctr"/>
             <a:r>
-              <a:rPr lang="en-US" sz="1050" dirty="0" smtClean="0"/>
+              <a:rPr lang="en-US" sz="1050" dirty="0"/>
               <a:t>Email</a:t>
             </a:r>
             <a:endParaRPr lang="en-SG" sz="1050" dirty="0"/>
@@ -6353,7 +6751,7 @@
         </p:nvSpPr>
         <p:spPr>
           <a:xfrm>
-            <a:off x="6263054" y="2656543"/>
+            <a:off x="6640879" y="2656543"/>
             <a:ext cx="929296" cy="346760"/>
           </a:xfrm>
           <a:prstGeom prst="rect">
@@ -6382,7 +6780,7 @@
           <a:p>
             <a:pPr algn="ctr"/>
             <a:r>
-              <a:rPr lang="en-US" sz="1050" dirty="0" smtClean="0"/>
+              <a:rPr lang="en-US" sz="1050" dirty="0"/>
               <a:t>Address</a:t>
             </a:r>
             <a:endParaRPr lang="en-SG" sz="1050" dirty="0"/>
@@ -6397,7 +6795,7 @@
         </p:nvSpPr>
         <p:spPr>
           <a:xfrm>
-            <a:off x="7717912" y="1524660"/>
+            <a:off x="8095737" y="1524662"/>
             <a:ext cx="270504" cy="175523"/>
           </a:xfrm>
           <a:prstGeom prst="triangle">
@@ -6440,7 +6838,7 @@
         </p:nvCxnSpPr>
         <p:spPr>
           <a:xfrm rot="5400000">
-            <a:off x="7186487" y="1706046"/>
+            <a:off x="7564312" y="1706046"/>
             <a:ext cx="672540" cy="660814"/>
           </a:xfrm>
           <a:prstGeom prst="bentConnector2">
@@ -6475,7 +6873,7 @@
         </p:nvCxnSpPr>
         <p:spPr>
           <a:xfrm rot="5400000">
-            <a:off x="7408922" y="1468957"/>
+            <a:off x="7786749" y="1468957"/>
             <a:ext cx="213017" cy="675468"/>
           </a:xfrm>
           <a:prstGeom prst="bentConnector2">
@@ -6510,7 +6908,7 @@
         </p:nvCxnSpPr>
         <p:spPr>
           <a:xfrm rot="5400000">
-            <a:off x="6957887" y="1934646"/>
+            <a:off x="7335712" y="1934646"/>
             <a:ext cx="1129740" cy="660814"/>
           </a:xfrm>
           <a:prstGeom prst="bentConnector2">
@@ -6542,7 +6940,7 @@
         </p:nvSpPr>
         <p:spPr>
           <a:xfrm>
-            <a:off x="6132002" y="4597467"/>
+            <a:off x="6509827" y="4597469"/>
             <a:ext cx="1868998" cy="327923"/>
           </a:xfrm>
           <a:prstGeom prst="rect">
@@ -6571,7 +6969,7 @@
           <a:p>
             <a:pPr algn="ctr"/>
             <a:r>
-              <a:rPr lang="en-SG" sz="1050" dirty="0" smtClean="0"/>
+              <a:rPr lang="en-SG" sz="1050" dirty="0"/>
               <a:t>&lt;&lt;interface&gt;&gt; Printable</a:t>
             </a:r>
             <a:endParaRPr lang="en-SG" sz="1050" dirty="0"/>
@@ -6586,7 +6984,7 @@
         </p:nvSpPr>
         <p:spPr>
           <a:xfrm>
-            <a:off x="4481146" y="4467827"/>
+            <a:off x="4858971" y="4467827"/>
             <a:ext cx="929296" cy="346760"/>
           </a:xfrm>
           <a:prstGeom prst="rect">
@@ -6615,7 +7013,7 @@
           <a:p>
             <a:pPr algn="ctr"/>
             <a:r>
-              <a:rPr lang="en-US" sz="1050" dirty="0" smtClean="0"/>
+              <a:rPr lang="en-US" sz="1050" dirty="0"/>
               <a:t>Phone</a:t>
             </a:r>
             <a:endParaRPr lang="en-SG" sz="1050" dirty="0"/>
@@ -6630,7 +7028,7 @@
         </p:nvSpPr>
         <p:spPr>
           <a:xfrm>
-            <a:off x="4481146" y="4862814"/>
+            <a:off x="4858971" y="4862814"/>
             <a:ext cx="929296" cy="346760"/>
           </a:xfrm>
           <a:prstGeom prst="rect">
@@ -6659,7 +7057,7 @@
           <a:p>
             <a:pPr algn="ctr"/>
             <a:r>
-              <a:rPr lang="en-US" sz="1050" dirty="0" smtClean="0"/>
+              <a:rPr lang="en-US" sz="1050" dirty="0"/>
               <a:t>Email</a:t>
             </a:r>
             <a:endParaRPr lang="en-SG" sz="1050" dirty="0"/>
@@ -6674,7 +7072,7 @@
         </p:nvSpPr>
         <p:spPr>
           <a:xfrm>
-            <a:off x="4481146" y="5257800"/>
+            <a:off x="4858971" y="5257800"/>
             <a:ext cx="929296" cy="346760"/>
           </a:xfrm>
           <a:prstGeom prst="rect">
@@ -6703,7 +7101,7 @@
           <a:p>
             <a:pPr algn="ctr"/>
             <a:r>
-              <a:rPr lang="en-US" sz="1050" dirty="0" smtClean="0"/>
+              <a:rPr lang="en-US" sz="1050" dirty="0"/>
               <a:t>Address</a:t>
             </a:r>
             <a:endParaRPr lang="en-SG" sz="1050" dirty="0"/>
@@ -6718,7 +7116,7 @@
         </p:nvSpPr>
         <p:spPr>
           <a:xfrm rot="5400000">
-            <a:off x="5896110" y="4726825"/>
+            <a:off x="6273935" y="4726827"/>
             <a:ext cx="270504" cy="175523"/>
           </a:xfrm>
           <a:prstGeom prst="triangle">
@@ -6761,7 +7159,7 @@
         </p:nvCxnSpPr>
         <p:spPr>
           <a:xfrm rot="10800000" flipV="1">
-            <a:off x="5410443" y="4814586"/>
+            <a:off x="5788270" y="4814588"/>
             <a:ext cx="533159" cy="221607"/>
           </a:xfrm>
           <a:prstGeom prst="bentConnector3">
@@ -6800,7 +7198,7 @@
         </p:nvCxnSpPr>
         <p:spPr>
           <a:xfrm rot="10800000">
-            <a:off x="5410443" y="4641207"/>
+            <a:off x="5788270" y="4641207"/>
             <a:ext cx="533159" cy="173380"/>
           </a:xfrm>
           <a:prstGeom prst="bentConnector3">
@@ -6839,7 +7237,7 @@
         </p:nvCxnSpPr>
         <p:spPr>
           <a:xfrm rot="10800000" flipV="1">
-            <a:off x="5410443" y="4814586"/>
+            <a:off x="5788270" y="4814588"/>
             <a:ext cx="533159" cy="616593"/>
           </a:xfrm>
           <a:prstGeom prst="bentConnector3">
@@ -6875,7 +7273,7 @@
         </p:nvSpPr>
         <p:spPr>
           <a:xfrm>
-            <a:off x="4481146" y="4072840"/>
+            <a:off x="4858971" y="4072840"/>
             <a:ext cx="929296" cy="346760"/>
           </a:xfrm>
           <a:prstGeom prst="rect">
@@ -6904,7 +7302,7 @@
           <a:p>
             <a:pPr algn="ctr"/>
             <a:r>
-              <a:rPr lang="en-US" sz="1050" dirty="0" smtClean="0"/>
+              <a:rPr lang="en-US" sz="1050" dirty="0"/>
               <a:t>Name</a:t>
             </a:r>
             <a:endParaRPr lang="en-SG" sz="1050" dirty="0"/>
@@ -6922,7 +7320,7 @@
         </p:nvCxnSpPr>
         <p:spPr>
           <a:xfrm rot="10800000">
-            <a:off x="5410443" y="4246221"/>
+            <a:off x="5788270" y="4246223"/>
             <a:ext cx="533159" cy="568367"/>
           </a:xfrm>
           <a:prstGeom prst="bentConnector3">
@@ -6958,7 +7356,7 @@
         </p:nvSpPr>
         <p:spPr>
           <a:xfrm>
-            <a:off x="6132002" y="4925292"/>
+            <a:off x="6509827" y="4925294"/>
             <a:ext cx="1868998" cy="122745"/>
           </a:xfrm>
           <a:prstGeom prst="rect">
@@ -6998,7 +7396,7 @@
         </p:nvSpPr>
         <p:spPr>
           <a:xfrm>
-            <a:off x="6132002" y="5043684"/>
+            <a:off x="6509827" y="5043686"/>
             <a:ext cx="1868998" cy="271943"/>
           </a:xfrm>
           <a:prstGeom prst="rect">
@@ -7027,15 +7425,15 @@
           <a:p>
             <a:pPr algn="ctr"/>
             <a:r>
-              <a:rPr lang="en-US" sz="1050" dirty="0" smtClean="0"/>
+              <a:rPr lang="en-US" sz="1050" dirty="0"/>
               <a:t>+ </a:t>
             </a:r>
             <a:r>
-              <a:rPr lang="en-US" sz="1050" dirty="0" err="1" smtClean="0"/>
+              <a:rPr lang="en-US" sz="1050" dirty="0" err="1"/>
               <a:t>getPrintableString</a:t>
             </a:r>
             <a:r>
-              <a:rPr lang="en-US" sz="1050" dirty="0" smtClean="0"/>
+              <a:rPr lang="en-US" sz="1050" dirty="0"/>
               <a:t>(): String</a:t>
             </a:r>
             <a:endParaRPr lang="en-SG" sz="1050" dirty="0"/>
@@ -7050,7 +7448,7 @@
         </p:nvSpPr>
         <p:spPr>
           <a:xfrm>
-            <a:off x="1031322" y="1206785"/>
+            <a:off x="1409147" y="1206785"/>
             <a:ext cx="929296" cy="346760"/>
           </a:xfrm>
           <a:prstGeom prst="rect">
@@ -7094,7 +7492,7 @@
         </p:nvSpPr>
         <p:spPr>
           <a:xfrm>
-            <a:off x="2647520" y="517686"/>
+            <a:off x="3025345" y="517686"/>
             <a:ext cx="929296" cy="346760"/>
           </a:xfrm>
           <a:prstGeom prst="rect">
@@ -7123,14 +7521,14 @@
           <a:p>
             <a:pPr algn="ctr"/>
             <a:r>
-              <a:rPr lang="en-US" sz="1050" dirty="0" smtClean="0"/>
+              <a:rPr lang="en-US" sz="1050" dirty="0"/>
               <a:t>Unique</a:t>
             </a:r>
             <a:br>
-              <a:rPr lang="en-US" sz="1050" dirty="0" smtClean="0"/>
+              <a:rPr lang="en-US" sz="1050" dirty="0"/>
             </a:br>
             <a:r>
-              <a:rPr lang="en-US" sz="1050" dirty="0" err="1" smtClean="0"/>
+              <a:rPr lang="en-US" sz="1050" dirty="0" err="1"/>
               <a:t>TagList</a:t>
             </a:r>
             <a:endParaRPr lang="en-SG" sz="1050" dirty="0"/>
@@ -7145,7 +7543,7 @@
         </p:nvSpPr>
         <p:spPr>
           <a:xfrm>
-            <a:off x="2621143" y="1837811"/>
+            <a:off x="2998968" y="1837811"/>
             <a:ext cx="929296" cy="346760"/>
           </a:xfrm>
           <a:prstGeom prst="rect">
@@ -7174,14 +7572,14 @@
           <a:p>
             <a:pPr algn="ctr"/>
             <a:r>
-              <a:rPr lang="en-US" sz="1050" dirty="0" smtClean="0"/>
+              <a:rPr lang="en-US" sz="1050" dirty="0"/>
               <a:t>Unique</a:t>
             </a:r>
             <a:br>
-              <a:rPr lang="en-US" sz="1050" dirty="0" smtClean="0"/>
+              <a:rPr lang="en-US" sz="1050" dirty="0"/>
             </a:br>
             <a:r>
-              <a:rPr lang="en-US" sz="1050" dirty="0" err="1" smtClean="0"/>
+              <a:rPr lang="en-US" sz="1050" dirty="0" err="1"/>
               <a:t>PersonList</a:t>
             </a:r>
             <a:endParaRPr lang="en-SG" sz="1050" dirty="0"/>
@@ -7196,7 +7594,7 @@
         </p:nvSpPr>
         <p:spPr>
           <a:xfrm>
-            <a:off x="4190165" y="1837811"/>
+            <a:off x="4567990" y="1837811"/>
             <a:ext cx="929296" cy="346760"/>
           </a:xfrm>
           <a:prstGeom prst="rect">
@@ -7225,7 +7623,7 @@
           <a:p>
             <a:pPr algn="ctr"/>
             <a:r>
-              <a:rPr lang="en-US" sz="1050" dirty="0" smtClean="0"/>
+              <a:rPr lang="en-US" sz="1050" dirty="0"/>
               <a:t>Person</a:t>
             </a:r>
             <a:endParaRPr lang="en-SG" sz="1050" dirty="0"/>
@@ -7243,7 +7641,7 @@
         </p:nvCxnSpPr>
         <p:spPr>
           <a:xfrm flipV="1">
-            <a:off x="2196666" y="691066"/>
+            <a:off x="2574491" y="691068"/>
             <a:ext cx="450854" cy="687145"/>
           </a:xfrm>
           <a:prstGeom prst="bentConnector3">
@@ -7281,7 +7679,7 @@
         </p:nvCxnSpPr>
         <p:spPr>
           <a:xfrm>
-            <a:off x="2196666" y="1378211"/>
+            <a:off x="2574493" y="1378211"/>
             <a:ext cx="424477" cy="632980"/>
           </a:xfrm>
           <a:prstGeom prst="bentConnector3">
@@ -7318,7 +7716,7 @@
         </p:nvSpPr>
         <p:spPr>
           <a:xfrm>
-            <a:off x="4190165" y="517686"/>
+            <a:off x="4567990" y="517686"/>
             <a:ext cx="929296" cy="346760"/>
           </a:xfrm>
           <a:prstGeom prst="rect">
@@ -7362,7 +7760,7 @@
         </p:nvSpPr>
         <p:spPr>
           <a:xfrm>
-            <a:off x="3576816" y="617076"/>
+            <a:off x="3954641" y="617076"/>
             <a:ext cx="236048" cy="173380"/>
           </a:xfrm>
           <a:prstGeom prst="flowChartDecision">
@@ -7403,7 +7801,7 @@
         </p:nvSpPr>
         <p:spPr>
           <a:xfrm>
-            <a:off x="3540415" y="1924501"/>
+            <a:off x="3918240" y="1924501"/>
             <a:ext cx="236048" cy="173380"/>
           </a:xfrm>
           <a:prstGeom prst="flowChartDecision">
@@ -7444,7 +7842,7 @@
         </p:nvSpPr>
         <p:spPr>
           <a:xfrm>
-            <a:off x="1960618" y="1291521"/>
+            <a:off x="2338443" y="1291521"/>
             <a:ext cx="236048" cy="173380"/>
           </a:xfrm>
           <a:prstGeom prst="flowChartDecision">
@@ -7490,7 +7888,7 @@
         </p:nvCxnSpPr>
         <p:spPr>
           <a:xfrm flipV="1">
-            <a:off x="3812864" y="691066"/>
+            <a:off x="4190691" y="691066"/>
             <a:ext cx="377301" cy="12700"/>
           </a:xfrm>
           <a:prstGeom prst="straightConnector1">
@@ -7528,7 +7926,7 @@
         </p:nvCxnSpPr>
         <p:spPr>
           <a:xfrm>
-            <a:off x="3776463" y="2011191"/>
+            <a:off x="4154288" y="2011191"/>
             <a:ext cx="413702" cy="0"/>
           </a:xfrm>
           <a:prstGeom prst="straightConnector1">
@@ -7563,7 +7961,7 @@
         </p:nvSpPr>
         <p:spPr>
           <a:xfrm>
-            <a:off x="3348216" y="1195623"/>
+            <a:off x="3726041" y="1195623"/>
             <a:ext cx="929296" cy="346760"/>
           </a:xfrm>
           <a:prstGeom prst="rect">
@@ -7592,7 +7990,7 @@
           <a:p>
             <a:pPr algn="ctr"/>
             <a:r>
-              <a:rPr lang="en-US" sz="1050" dirty="0" smtClean="0"/>
+              <a:rPr lang="en-US" sz="1050" dirty="0"/>
               <a:t>Tagging</a:t>
             </a:r>
             <a:endParaRPr lang="en-SG" sz="1050" dirty="0"/>
@@ -7610,7 +8008,7 @@
         </p:nvCxnSpPr>
         <p:spPr>
           <a:xfrm flipV="1">
-            <a:off x="4654813" y="864446"/>
+            <a:off x="5032638" y="864448"/>
             <a:ext cx="0" cy="973365"/>
           </a:xfrm>
           <a:prstGeom prst="straightConnector1">
@@ -7647,7 +8045,7 @@
         </p:nvCxnSpPr>
         <p:spPr>
           <a:xfrm>
-            <a:off x="4277512" y="1369003"/>
+            <a:off x="4655339" y="1369003"/>
             <a:ext cx="377301" cy="0"/>
           </a:xfrm>
           <a:prstGeom prst="line">
@@ -7686,7 +8084,7 @@
         </p:nvCxnSpPr>
         <p:spPr>
           <a:xfrm flipV="1">
-            <a:off x="2196666" y="1369003"/>
+            <a:off x="2574491" y="1369003"/>
             <a:ext cx="1151550" cy="9208"/>
           </a:xfrm>
           <a:prstGeom prst="straightConnector1">
@@ -7721,7 +8119,7 @@
         </p:nvSpPr>
         <p:spPr>
           <a:xfrm>
-            <a:off x="3112168" y="1066800"/>
+            <a:off x="3489993" y="1066800"/>
             <a:ext cx="88232" cy="369332"/>
           </a:xfrm>
           <a:prstGeom prst="rect">
@@ -7736,7 +8134,7 @@
           <a:lstStyle/>
           <a:p>
             <a:r>
-              <a:rPr lang="en-US" dirty="0" smtClean="0">
+              <a:rPr lang="en-US" dirty="0">
                 <a:solidFill>
                   <a:schemeClr val="accent6">
                     <a:lumMod val="75000"/>

</xml_diff>

<commit_message>
Update `Developer Guide` UML diagram to show relationship between `TextUi` and `Formatter`
</commit_message>
<xml_diff>
--- a/doc/Diagrams.pptx
+++ b/doc/Diagrams.pptx
@@ -306,7 +306,7 @@
           <a:p>
             <a:fld id="{78C97017-6FC3-485B-9764-EAC9E56C1D49}" type="datetimeFigureOut">
               <a:rPr lang="en-US" smtClean="0"/>
-              <a:t>8/29/16</a:t>
+              <a:t>8/30/16</a:t>
             </a:fld>
             <a:endParaRPr lang="en-US"/>
           </a:p>
@@ -476,7 +476,7 @@
           <a:p>
             <a:fld id="{78C97017-6FC3-485B-9764-EAC9E56C1D49}" type="datetimeFigureOut">
               <a:rPr lang="en-US" smtClean="0"/>
-              <a:t>8/29/16</a:t>
+              <a:t>8/30/16</a:t>
             </a:fld>
             <a:endParaRPr lang="en-US"/>
           </a:p>
@@ -656,7 +656,7 @@
           <a:p>
             <a:fld id="{78C97017-6FC3-485B-9764-EAC9E56C1D49}" type="datetimeFigureOut">
               <a:rPr lang="en-US" smtClean="0"/>
-              <a:t>8/29/16</a:t>
+              <a:t>8/30/16</a:t>
             </a:fld>
             <a:endParaRPr lang="en-US"/>
           </a:p>
@@ -826,7 +826,7 @@
           <a:p>
             <a:fld id="{78C97017-6FC3-485B-9764-EAC9E56C1D49}" type="datetimeFigureOut">
               <a:rPr lang="en-US" smtClean="0"/>
-              <a:t>8/29/16</a:t>
+              <a:t>8/30/16</a:t>
             </a:fld>
             <a:endParaRPr lang="en-US"/>
           </a:p>
@@ -1072,7 +1072,7 @@
           <a:p>
             <a:fld id="{78C97017-6FC3-485B-9764-EAC9E56C1D49}" type="datetimeFigureOut">
               <a:rPr lang="en-US" smtClean="0"/>
-              <a:t>8/29/16</a:t>
+              <a:t>8/30/16</a:t>
             </a:fld>
             <a:endParaRPr lang="en-US"/>
           </a:p>
@@ -1360,7 +1360,7 @@
           <a:p>
             <a:fld id="{78C97017-6FC3-485B-9764-EAC9E56C1D49}" type="datetimeFigureOut">
               <a:rPr lang="en-US" smtClean="0"/>
-              <a:t>8/29/16</a:t>
+              <a:t>8/30/16</a:t>
             </a:fld>
             <a:endParaRPr lang="en-US"/>
           </a:p>
@@ -1782,7 +1782,7 @@
           <a:p>
             <a:fld id="{78C97017-6FC3-485B-9764-EAC9E56C1D49}" type="datetimeFigureOut">
               <a:rPr lang="en-US" smtClean="0"/>
-              <a:t>8/29/16</a:t>
+              <a:t>8/30/16</a:t>
             </a:fld>
             <a:endParaRPr lang="en-US"/>
           </a:p>
@@ -1900,7 +1900,7 @@
           <a:p>
             <a:fld id="{78C97017-6FC3-485B-9764-EAC9E56C1D49}" type="datetimeFigureOut">
               <a:rPr lang="en-US" smtClean="0"/>
-              <a:t>8/29/16</a:t>
+              <a:t>8/30/16</a:t>
             </a:fld>
             <a:endParaRPr lang="en-US"/>
           </a:p>
@@ -1995,7 +1995,7 @@
           <a:p>
             <a:fld id="{78C97017-6FC3-485B-9764-EAC9E56C1D49}" type="datetimeFigureOut">
               <a:rPr lang="en-US" smtClean="0"/>
-              <a:t>8/29/16</a:t>
+              <a:t>8/30/16</a:t>
             </a:fld>
             <a:endParaRPr lang="en-US"/>
           </a:p>
@@ -2272,7 +2272,7 @@
           <a:p>
             <a:fld id="{78C97017-6FC3-485B-9764-EAC9E56C1D49}" type="datetimeFigureOut">
               <a:rPr lang="en-US" smtClean="0"/>
-              <a:t>8/29/16</a:t>
+              <a:t>8/30/16</a:t>
             </a:fld>
             <a:endParaRPr lang="en-US"/>
           </a:p>
@@ -2525,7 +2525,7 @@
           <a:p>
             <a:fld id="{78C97017-6FC3-485B-9764-EAC9E56C1D49}" type="datetimeFigureOut">
               <a:rPr lang="en-US" smtClean="0"/>
-              <a:t>8/29/16</a:t>
+              <a:t>8/30/16</a:t>
             </a:fld>
             <a:endParaRPr lang="en-US"/>
           </a:p>
@@ -2738,7 +2738,7 @@
           <a:p>
             <a:fld id="{78C97017-6FC3-485B-9764-EAC9E56C1D49}" type="datetimeFigureOut">
               <a:rPr lang="en-US" smtClean="0"/>
-              <a:t>8/29/16</a:t>
+              <a:t>8/30/16</a:t>
             </a:fld>
             <a:endParaRPr lang="en-US"/>
           </a:p>
@@ -6151,6 +6151,94 @@
           </a:fontRef>
         </p:style>
       </p:cxnSp>
+      <p:sp>
+        <p:nvSpPr>
+          <p:cNvPr id="72" name="Rectangle 71"/>
+          <p:cNvSpPr/>
+          <p:nvPr/>
+        </p:nvSpPr>
+        <p:spPr>
+          <a:xfrm>
+            <a:off x="1132378" y="5788239"/>
+            <a:ext cx="929296" cy="346760"/>
+          </a:xfrm>
+          <a:prstGeom prst="rect">
+            <a:avLst/>
+          </a:prstGeom>
+          <a:ln w="19050"/>
+          <a:effectLst/>
+        </p:spPr>
+        <p:style>
+          <a:lnRef idx="1">
+            <a:schemeClr val="accent2"/>
+          </a:lnRef>
+          <a:fillRef idx="2">
+            <a:schemeClr val="accent2"/>
+          </a:fillRef>
+          <a:effectRef idx="1">
+            <a:schemeClr val="accent2"/>
+          </a:effectRef>
+          <a:fontRef idx="minor">
+            <a:schemeClr val="dk1"/>
+          </a:fontRef>
+        </p:style>
+        <p:txBody>
+          <a:bodyPr rtlCol="0" anchor="ctr"/>
+          <a:lstStyle/>
+          <a:p>
+            <a:pPr algn="ctr"/>
+            <a:r>
+              <a:rPr lang="en-US" sz="1050" dirty="0" smtClean="0"/>
+              <a:t>Formatter</a:t>
+            </a:r>
+            <a:endParaRPr lang="en-SG" sz="1050" dirty="0"/>
+          </a:p>
+        </p:txBody>
+      </p:sp>
+      <p:cxnSp>
+        <p:nvCxnSpPr>
+          <p:cNvPr id="74" name="Elbow Connector 73"/>
+          <p:cNvCxnSpPr>
+            <a:stCxn id="9" idx="2"/>
+            <a:endCxn id="72" idx="0"/>
+          </p:cNvCxnSpPr>
+          <p:nvPr/>
+        </p:nvCxnSpPr>
+        <p:spPr>
+          <a:xfrm rot="5400000">
+            <a:off x="1450830" y="5634596"/>
+            <a:ext cx="299839" cy="7446"/>
+          </a:xfrm>
+          <a:prstGeom prst="bentConnector3">
+            <a:avLst>
+              <a:gd name="adj1" fmla="val 50000"/>
+            </a:avLst>
+          </a:prstGeom>
+          <a:ln w="19050">
+            <a:solidFill>
+              <a:srgbClr val="C00000"/>
+            </a:solidFill>
+            <a:prstDash val="dash"/>
+            <a:headEnd type="none" w="med" len="med"/>
+            <a:tailEnd type="arrow" w="med" len="med"/>
+          </a:ln>
+          <a:effectLst/>
+        </p:spPr>
+        <p:style>
+          <a:lnRef idx="1">
+            <a:schemeClr val="accent2"/>
+          </a:lnRef>
+          <a:fillRef idx="2">
+            <a:schemeClr val="accent2"/>
+          </a:fillRef>
+          <a:effectRef idx="1">
+            <a:schemeClr val="accent2"/>
+          </a:effectRef>
+          <a:fontRef idx="minor">
+            <a:schemeClr val="dk1"/>
+          </a:fontRef>
+        </p:style>
+      </p:cxnSp>
     </p:spTree>
     <p:extLst>
       <p:ext uri="{BB962C8B-B14F-4D97-AF65-F5344CB8AC3E}">
@@ -6651,7 +6739,6 @@
               <a:rPr lang="en-SG" sz="1050" dirty="0"/>
               <a:t>Contact</a:t>
             </a:r>
-            <a:endParaRPr lang="en-SG" sz="1050" dirty="0"/>
           </a:p>
         </p:txBody>
       </p:sp>
@@ -6972,7 +7059,6 @@
               <a:rPr lang="en-SG" sz="1050" dirty="0"/>
               <a:t>&lt;&lt;interface&gt;&gt; Printable</a:t>
             </a:r>
-            <a:endParaRPr lang="en-SG" sz="1050" dirty="0"/>
           </a:p>
         </p:txBody>
       </p:sp>
@@ -8143,13 +8229,6 @@
               </a:rPr>
               <a:t>*</a:t>
             </a:r>
-            <a:endParaRPr lang="en-US" dirty="0">
-              <a:solidFill>
-                <a:schemeClr val="accent6">
-                  <a:lumMod val="75000"/>
-                </a:schemeClr>
-              </a:solidFill>
-            </a:endParaRPr>
           </a:p>
         </p:txBody>
       </p:sp>

</xml_diff>

<commit_message>
Update developer guide to show extraction of class `Contact`
</commit_message>
<xml_diff>
--- a/doc/Diagrams.pptx
+++ b/doc/Diagrams.pptx
@@ -106,6 +106,22 @@
       </a:defRPr>
     </a:lvl9pPr>
   </p:defaultTextStyle>
+  <p:extLst>
+    <p:ext uri="{EFAFB233-063F-42B5-8137-9DF3F51BA10A}">
+      <p15:sldGuideLst xmlns:p15="http://schemas.microsoft.com/office/powerpoint/2012/main">
+        <p15:guide id="1" orient="horz" pos="2160">
+          <p15:clr>
+            <a:srgbClr val="A4A3A4"/>
+          </p15:clr>
+        </p15:guide>
+        <p15:guide id="2" pos="2880">
+          <p15:clr>
+            <a:srgbClr val="A4A3A4"/>
+          </p15:clr>
+        </p15:guide>
+      </p15:sldGuideLst>
+    </p:ext>
+  </p:extLst>
 </p:presentation>
 </file>
 
@@ -290,7 +306,7 @@
           <a:p>
             <a:fld id="{78C97017-6FC3-485B-9764-EAC9E56C1D49}" type="datetimeFigureOut">
               <a:rPr lang="en-US" smtClean="0"/>
-              <a:t>8/28/2016</a:t>
+              <a:t>9/4/16</a:t>
             </a:fld>
             <a:endParaRPr lang="en-US"/>
           </a:p>
@@ -460,7 +476,7 @@
           <a:p>
             <a:fld id="{78C97017-6FC3-485B-9764-EAC9E56C1D49}" type="datetimeFigureOut">
               <a:rPr lang="en-US" smtClean="0"/>
-              <a:t>8/28/2016</a:t>
+              <a:t>9/4/16</a:t>
             </a:fld>
             <a:endParaRPr lang="en-US"/>
           </a:p>
@@ -640,7 +656,7 @@
           <a:p>
             <a:fld id="{78C97017-6FC3-485B-9764-EAC9E56C1D49}" type="datetimeFigureOut">
               <a:rPr lang="en-US" smtClean="0"/>
-              <a:t>8/28/2016</a:t>
+              <a:t>9/4/16</a:t>
             </a:fld>
             <a:endParaRPr lang="en-US"/>
           </a:p>
@@ -810,7 +826,7 @@
           <a:p>
             <a:fld id="{78C97017-6FC3-485B-9764-EAC9E56C1D49}" type="datetimeFigureOut">
               <a:rPr lang="en-US" smtClean="0"/>
-              <a:t>8/28/2016</a:t>
+              <a:t>9/4/16</a:t>
             </a:fld>
             <a:endParaRPr lang="en-US"/>
           </a:p>
@@ -1056,7 +1072,7 @@
           <a:p>
             <a:fld id="{78C97017-6FC3-485B-9764-EAC9E56C1D49}" type="datetimeFigureOut">
               <a:rPr lang="en-US" smtClean="0"/>
-              <a:t>8/28/2016</a:t>
+              <a:t>9/4/16</a:t>
             </a:fld>
             <a:endParaRPr lang="en-US"/>
           </a:p>
@@ -1344,7 +1360,7 @@
           <a:p>
             <a:fld id="{78C97017-6FC3-485B-9764-EAC9E56C1D49}" type="datetimeFigureOut">
               <a:rPr lang="en-US" smtClean="0"/>
-              <a:t>8/28/2016</a:t>
+              <a:t>9/4/16</a:t>
             </a:fld>
             <a:endParaRPr lang="en-US"/>
           </a:p>
@@ -1766,7 +1782,7 @@
           <a:p>
             <a:fld id="{78C97017-6FC3-485B-9764-EAC9E56C1D49}" type="datetimeFigureOut">
               <a:rPr lang="en-US" smtClean="0"/>
-              <a:t>8/28/2016</a:t>
+              <a:t>9/4/16</a:t>
             </a:fld>
             <a:endParaRPr lang="en-US"/>
           </a:p>
@@ -1884,7 +1900,7 @@
           <a:p>
             <a:fld id="{78C97017-6FC3-485B-9764-EAC9E56C1D49}" type="datetimeFigureOut">
               <a:rPr lang="en-US" smtClean="0"/>
-              <a:t>8/28/2016</a:t>
+              <a:t>9/4/16</a:t>
             </a:fld>
             <a:endParaRPr lang="en-US"/>
           </a:p>
@@ -1979,7 +1995,7 @@
           <a:p>
             <a:fld id="{78C97017-6FC3-485B-9764-EAC9E56C1D49}" type="datetimeFigureOut">
               <a:rPr lang="en-US" smtClean="0"/>
-              <a:t>8/28/2016</a:t>
+              <a:t>9/4/16</a:t>
             </a:fld>
             <a:endParaRPr lang="en-US"/>
           </a:p>
@@ -2256,7 +2272,7 @@
           <a:p>
             <a:fld id="{78C97017-6FC3-485B-9764-EAC9E56C1D49}" type="datetimeFigureOut">
               <a:rPr lang="en-US" smtClean="0"/>
-              <a:t>8/28/2016</a:t>
+              <a:t>9/4/16</a:t>
             </a:fld>
             <a:endParaRPr lang="en-US"/>
           </a:p>
@@ -2509,7 +2525,7 @@
           <a:p>
             <a:fld id="{78C97017-6FC3-485B-9764-EAC9E56C1D49}" type="datetimeFigureOut">
               <a:rPr lang="en-US" smtClean="0"/>
-              <a:t>8/28/2016</a:t>
+              <a:t>9/4/16</a:t>
             </a:fld>
             <a:endParaRPr lang="en-US"/>
           </a:p>
@@ -2722,7 +2738,7 @@
           <a:p>
             <a:fld id="{78C97017-6FC3-485B-9764-EAC9E56C1D49}" type="datetimeFigureOut">
               <a:rPr lang="en-US" smtClean="0"/>
-              <a:t>8/28/2016</a:t>
+              <a:t>9/4/16</a:t>
             </a:fld>
             <a:endParaRPr lang="en-US"/>
           </a:p>
@@ -5754,6 +5770,186 @@
           </a:fillRef>
           <a:effectRef idx="1">
             <a:schemeClr val="accent2"/>
+          </a:effectRef>
+          <a:fontRef idx="minor">
+            <a:schemeClr val="dk1"/>
+          </a:fontRef>
+        </p:style>
+      </p:cxnSp>
+      <p:sp>
+        <p:nvSpPr>
+          <p:cNvPr id="78" name="Rectangle 6"/>
+          <p:cNvSpPr/>
+          <p:nvPr/>
+        </p:nvSpPr>
+        <p:spPr>
+          <a:xfrm>
+            <a:off x="7917388" y="3489185"/>
+            <a:ext cx="929296" cy="342611"/>
+          </a:xfrm>
+          <a:prstGeom prst="rect">
+            <a:avLst/>
+          </a:prstGeom>
+          <a:ln w="19050"/>
+          <a:effectLst/>
+        </p:spPr>
+        <p:style>
+          <a:lnRef idx="1">
+            <a:schemeClr val="accent4"/>
+          </a:lnRef>
+          <a:fillRef idx="2">
+            <a:schemeClr val="accent4"/>
+          </a:fillRef>
+          <a:effectRef idx="1">
+            <a:schemeClr val="accent4"/>
+          </a:effectRef>
+          <a:fontRef idx="minor">
+            <a:schemeClr val="dk1"/>
+          </a:fontRef>
+        </p:style>
+        <p:txBody>
+          <a:bodyPr rtlCol="0" anchor="ctr"/>
+          <a:lstStyle/>
+          <a:p>
+            <a:pPr algn="ctr"/>
+            <a:r>
+              <a:rPr lang="en-SG" sz="1050" dirty="0" smtClean="0"/>
+              <a:t>Contact</a:t>
+            </a:r>
+            <a:endParaRPr lang="en-SG" sz="1050" dirty="0"/>
+          </a:p>
+        </p:txBody>
+      </p:sp>
+      <p:sp>
+        <p:nvSpPr>
+          <p:cNvPr id="80" name="Isosceles Triangle 24"/>
+          <p:cNvSpPr/>
+          <p:nvPr/>
+        </p:nvSpPr>
+        <p:spPr>
+          <a:xfrm>
+            <a:off x="8259165" y="3833331"/>
+            <a:ext cx="270504" cy="175523"/>
+          </a:xfrm>
+          <a:prstGeom prst="triangle">
+            <a:avLst/>
+          </a:prstGeom>
+          <a:ln w="19050"/>
+          <a:effectLst/>
+        </p:spPr>
+        <p:style>
+          <a:lnRef idx="1">
+            <a:schemeClr val="accent4"/>
+          </a:lnRef>
+          <a:fillRef idx="2">
+            <a:schemeClr val="accent4"/>
+          </a:fillRef>
+          <a:effectRef idx="1">
+            <a:schemeClr val="accent4"/>
+          </a:effectRef>
+          <a:fontRef idx="minor">
+            <a:schemeClr val="dk1"/>
+          </a:fontRef>
+        </p:style>
+        <p:txBody>
+          <a:bodyPr rtlCol="0" anchor="ctr"/>
+          <a:lstStyle/>
+          <a:p>
+            <a:pPr algn="ctr"/>
+            <a:endParaRPr lang="en-SG" sz="1050"/>
+          </a:p>
+        </p:txBody>
+      </p:sp>
+      <p:cxnSp>
+        <p:nvCxnSpPr>
+          <p:cNvPr id="83" name="Elbow Connector 25"/>
+          <p:cNvCxnSpPr/>
+          <p:nvPr/>
+        </p:nvCxnSpPr>
+        <p:spPr>
+          <a:xfrm rot="5400000">
+            <a:off x="7727740" y="4014717"/>
+            <a:ext cx="672540" cy="660814"/>
+          </a:xfrm>
+          <a:prstGeom prst="bentConnector2">
+            <a:avLst/>
+          </a:prstGeom>
+          <a:ln w="19050"/>
+          <a:effectLst/>
+        </p:spPr>
+        <p:style>
+          <a:lnRef idx="1">
+            <a:schemeClr val="accent4"/>
+          </a:lnRef>
+          <a:fillRef idx="2">
+            <a:schemeClr val="accent4"/>
+          </a:fillRef>
+          <a:effectRef idx="1">
+            <a:schemeClr val="accent4"/>
+          </a:effectRef>
+          <a:fontRef idx="minor">
+            <a:schemeClr val="dk1"/>
+          </a:fontRef>
+        </p:style>
+      </p:cxnSp>
+      <p:cxnSp>
+        <p:nvCxnSpPr>
+          <p:cNvPr id="85" name="Elbow Connector 26"/>
+          <p:cNvCxnSpPr/>
+          <p:nvPr/>
+        </p:nvCxnSpPr>
+        <p:spPr>
+          <a:xfrm rot="5400000">
+            <a:off x="7950175" y="3777628"/>
+            <a:ext cx="213017" cy="675468"/>
+          </a:xfrm>
+          <a:prstGeom prst="bentConnector2">
+            <a:avLst/>
+          </a:prstGeom>
+          <a:ln w="19050"/>
+          <a:effectLst/>
+        </p:spPr>
+        <p:style>
+          <a:lnRef idx="1">
+            <a:schemeClr val="accent4"/>
+          </a:lnRef>
+          <a:fillRef idx="2">
+            <a:schemeClr val="accent4"/>
+          </a:fillRef>
+          <a:effectRef idx="1">
+            <a:schemeClr val="accent4"/>
+          </a:effectRef>
+          <a:fontRef idx="minor">
+            <a:schemeClr val="dk1"/>
+          </a:fontRef>
+        </p:style>
+      </p:cxnSp>
+      <p:cxnSp>
+        <p:nvCxnSpPr>
+          <p:cNvPr id="86" name="Elbow Connector 29"/>
+          <p:cNvCxnSpPr/>
+          <p:nvPr/>
+        </p:nvCxnSpPr>
+        <p:spPr>
+          <a:xfrm rot="5400000">
+            <a:off x="7499140" y="4243317"/>
+            <a:ext cx="1129740" cy="660814"/>
+          </a:xfrm>
+          <a:prstGeom prst="bentConnector2">
+            <a:avLst/>
+          </a:prstGeom>
+          <a:ln w="19050"/>
+          <a:effectLst/>
+        </p:spPr>
+        <p:style>
+          <a:lnRef idx="1">
+            <a:schemeClr val="accent4"/>
+          </a:lnRef>
+          <a:fillRef idx="2">
+            <a:schemeClr val="accent4"/>
+          </a:fillRef>
+          <a:effectRef idx="1">
+            <a:schemeClr val="accent4"/>
           </a:effectRef>
           <a:fontRef idx="minor">
             <a:schemeClr val="dk1"/>

</xml_diff>

<commit_message>
Update developer guide to show the addtion of `Printable` interface
</commit_message>
<xml_diff>
--- a/doc/Diagrams.pptx
+++ b/doc/Diagrams.pptx
@@ -9,7 +9,7 @@
     <p:sldId id="257" r:id="rId3"/>
     <p:sldId id="258" r:id="rId4"/>
   </p:sldIdLst>
-  <p:sldSz cx="9144000" cy="6858000" type="screen4x3"/>
+  <p:sldSz cx="10799763" cy="6858000"/>
   <p:notesSz cx="6858000" cy="9144000"/>
   <p:defaultTextStyle>
     <a:defPPr>
@@ -106,6 +106,22 @@
       </a:defRPr>
     </a:lvl9pPr>
   </p:defaultTextStyle>
+  <p:extLst>
+    <p:ext uri="{EFAFB233-063F-42B5-8137-9DF3F51BA10A}">
+      <p15:sldGuideLst xmlns:p15="http://schemas.microsoft.com/office/powerpoint/2012/main">
+        <p15:guide id="1" orient="horz" pos="2160" userDrawn="1">
+          <p15:clr>
+            <a:srgbClr val="A4A3A4"/>
+          </p15:clr>
+        </p15:guide>
+        <p15:guide id="2" pos="3402" userDrawn="1">
+          <p15:clr>
+            <a:srgbClr val="A4A3A4"/>
+          </p15:clr>
+        </p15:guide>
+      </p15:sldGuideLst>
+    </p:ext>
+  </p:extLst>
 </p:presentation>
 </file>
 
@@ -138,8 +154,8 @@
         </p:nvSpPr>
         <p:spPr>
           <a:xfrm>
-            <a:off x="685800" y="2130425"/>
-            <a:ext cx="7772400" cy="1470025"/>
+            <a:off x="809982" y="2130428"/>
+            <a:ext cx="9179799" cy="1470025"/>
           </a:xfrm>
         </p:spPr>
         <p:txBody>
@@ -166,8 +182,8 @@
         </p:nvSpPr>
         <p:spPr>
           <a:xfrm>
-            <a:off x="1371600" y="3886200"/>
-            <a:ext cx="6400800" cy="1752600"/>
+            <a:off x="1619965" y="3886200"/>
+            <a:ext cx="7559834" cy="1752600"/>
           </a:xfrm>
         </p:spPr>
         <p:txBody>
@@ -183,7 +199,7 @@
                 </a:solidFill>
               </a:defRPr>
             </a:lvl1pPr>
-            <a:lvl2pPr marL="457200" indent="0" algn="ctr">
+            <a:lvl2pPr marL="457217" indent="0" algn="ctr">
               <a:buNone/>
               <a:defRPr>
                 <a:solidFill>
@@ -193,7 +209,7 @@
                 </a:solidFill>
               </a:defRPr>
             </a:lvl2pPr>
-            <a:lvl3pPr marL="914400" indent="0" algn="ctr">
+            <a:lvl3pPr marL="914434" indent="0" algn="ctr">
               <a:buNone/>
               <a:defRPr>
                 <a:solidFill>
@@ -203,7 +219,7 @@
                 </a:solidFill>
               </a:defRPr>
             </a:lvl3pPr>
-            <a:lvl4pPr marL="1371600" indent="0" algn="ctr">
+            <a:lvl4pPr marL="1371651" indent="0" algn="ctr">
               <a:buNone/>
               <a:defRPr>
                 <a:solidFill>
@@ -213,7 +229,7 @@
                 </a:solidFill>
               </a:defRPr>
             </a:lvl4pPr>
-            <a:lvl5pPr marL="1828800" indent="0" algn="ctr">
+            <a:lvl5pPr marL="1828869" indent="0" algn="ctr">
               <a:buNone/>
               <a:defRPr>
                 <a:solidFill>
@@ -223,7 +239,7 @@
                 </a:solidFill>
               </a:defRPr>
             </a:lvl5pPr>
-            <a:lvl6pPr marL="2286000" indent="0" algn="ctr">
+            <a:lvl6pPr marL="2286086" indent="0" algn="ctr">
               <a:buNone/>
               <a:defRPr>
                 <a:solidFill>
@@ -233,7 +249,7 @@
                 </a:solidFill>
               </a:defRPr>
             </a:lvl6pPr>
-            <a:lvl7pPr marL="2743200" indent="0" algn="ctr">
+            <a:lvl7pPr marL="2743303" indent="0" algn="ctr">
               <a:buNone/>
               <a:defRPr>
                 <a:solidFill>
@@ -243,7 +259,7 @@
                 </a:solidFill>
               </a:defRPr>
             </a:lvl7pPr>
-            <a:lvl8pPr marL="3200400" indent="0" algn="ctr">
+            <a:lvl8pPr marL="3200519" indent="0" algn="ctr">
               <a:buNone/>
               <a:defRPr>
                 <a:solidFill>
@@ -253,7 +269,7 @@
                 </a:solidFill>
               </a:defRPr>
             </a:lvl8pPr>
-            <a:lvl9pPr marL="3657600" indent="0" algn="ctr">
+            <a:lvl9pPr marL="3657736" indent="0" algn="ctr">
               <a:buNone/>
               <a:defRPr>
                 <a:solidFill>
@@ -290,7 +306,7 @@
           <a:p>
             <a:fld id="{78C97017-6FC3-485B-9764-EAC9E56C1D49}" type="datetimeFigureOut">
               <a:rPr lang="en-US" smtClean="0"/>
-              <a:t>8/28/2016</a:t>
+              <a:t>9/4/16</a:t>
             </a:fld>
             <a:endParaRPr lang="en-US"/>
           </a:p>
@@ -460,7 +476,7 @@
           <a:p>
             <a:fld id="{78C97017-6FC3-485B-9764-EAC9E56C1D49}" type="datetimeFigureOut">
               <a:rPr lang="en-US" smtClean="0"/>
-              <a:t>8/28/2016</a:t>
+              <a:t>9/4/16</a:t>
             </a:fld>
             <a:endParaRPr lang="en-US"/>
           </a:p>
@@ -550,8 +566,8 @@
         </p:nvSpPr>
         <p:spPr>
           <a:xfrm>
-            <a:off x="6629400" y="274638"/>
-            <a:ext cx="2057400" cy="5851525"/>
+            <a:off x="7829828" y="274641"/>
+            <a:ext cx="2429947" cy="5851525"/>
           </a:xfrm>
         </p:spPr>
         <p:txBody>
@@ -578,8 +594,8 @@
         </p:nvSpPr>
         <p:spPr>
           <a:xfrm>
-            <a:off x="457200" y="274638"/>
-            <a:ext cx="6019800" cy="5851525"/>
+            <a:off x="539988" y="274641"/>
+            <a:ext cx="7109844" cy="5851525"/>
           </a:xfrm>
         </p:spPr>
         <p:txBody>
@@ -640,7 +656,7 @@
           <a:p>
             <a:fld id="{78C97017-6FC3-485B-9764-EAC9E56C1D49}" type="datetimeFigureOut">
               <a:rPr lang="en-US" smtClean="0"/>
-              <a:t>8/28/2016</a:t>
+              <a:t>9/4/16</a:t>
             </a:fld>
             <a:endParaRPr lang="en-US"/>
           </a:p>
@@ -810,7 +826,7 @@
           <a:p>
             <a:fld id="{78C97017-6FC3-485B-9764-EAC9E56C1D49}" type="datetimeFigureOut">
               <a:rPr lang="en-US" smtClean="0"/>
-              <a:t>8/28/2016</a:t>
+              <a:t>9/4/16</a:t>
             </a:fld>
             <a:endParaRPr lang="en-US"/>
           </a:p>
@@ -900,8 +916,8 @@
         </p:nvSpPr>
         <p:spPr>
           <a:xfrm>
-            <a:off x="722313" y="4406900"/>
-            <a:ext cx="7772400" cy="1362075"/>
+            <a:off x="853108" y="4406903"/>
+            <a:ext cx="9179799" cy="1362075"/>
           </a:xfrm>
         </p:spPr>
         <p:txBody>
@@ -932,8 +948,8 @@
         </p:nvSpPr>
         <p:spPr>
           <a:xfrm>
-            <a:off x="722313" y="2906713"/>
-            <a:ext cx="7772400" cy="1500187"/>
+            <a:off x="853108" y="2906713"/>
+            <a:ext cx="9179799" cy="1500187"/>
           </a:xfrm>
         </p:spPr>
         <p:txBody>
@@ -949,7 +965,7 @@
                 </a:solidFill>
               </a:defRPr>
             </a:lvl1pPr>
-            <a:lvl2pPr marL="457200" indent="0">
+            <a:lvl2pPr marL="457217" indent="0">
               <a:buNone/>
               <a:defRPr sz="1800">
                 <a:solidFill>
@@ -959,7 +975,7 @@
                 </a:solidFill>
               </a:defRPr>
             </a:lvl2pPr>
-            <a:lvl3pPr marL="914400" indent="0">
+            <a:lvl3pPr marL="914434" indent="0">
               <a:buNone/>
               <a:defRPr sz="1600">
                 <a:solidFill>
@@ -969,7 +985,7 @@
                 </a:solidFill>
               </a:defRPr>
             </a:lvl3pPr>
-            <a:lvl4pPr marL="1371600" indent="0">
+            <a:lvl4pPr marL="1371651" indent="0">
               <a:buNone/>
               <a:defRPr sz="1400">
                 <a:solidFill>
@@ -979,7 +995,7 @@
                 </a:solidFill>
               </a:defRPr>
             </a:lvl4pPr>
-            <a:lvl5pPr marL="1828800" indent="0">
+            <a:lvl5pPr marL="1828869" indent="0">
               <a:buNone/>
               <a:defRPr sz="1400">
                 <a:solidFill>
@@ -989,7 +1005,7 @@
                 </a:solidFill>
               </a:defRPr>
             </a:lvl5pPr>
-            <a:lvl6pPr marL="2286000" indent="0">
+            <a:lvl6pPr marL="2286086" indent="0">
               <a:buNone/>
               <a:defRPr sz="1400">
                 <a:solidFill>
@@ -999,7 +1015,7 @@
                 </a:solidFill>
               </a:defRPr>
             </a:lvl6pPr>
-            <a:lvl7pPr marL="2743200" indent="0">
+            <a:lvl7pPr marL="2743303" indent="0">
               <a:buNone/>
               <a:defRPr sz="1400">
                 <a:solidFill>
@@ -1009,7 +1025,7 @@
                 </a:solidFill>
               </a:defRPr>
             </a:lvl7pPr>
-            <a:lvl8pPr marL="3200400" indent="0">
+            <a:lvl8pPr marL="3200519" indent="0">
               <a:buNone/>
               <a:defRPr sz="1400">
                 <a:solidFill>
@@ -1019,7 +1035,7 @@
                 </a:solidFill>
               </a:defRPr>
             </a:lvl8pPr>
-            <a:lvl9pPr marL="3657600" indent="0">
+            <a:lvl9pPr marL="3657736" indent="0">
               <a:buNone/>
               <a:defRPr sz="1400">
                 <a:solidFill>
@@ -1056,7 +1072,7 @@
           <a:p>
             <a:fld id="{78C97017-6FC3-485B-9764-EAC9E56C1D49}" type="datetimeFigureOut">
               <a:rPr lang="en-US" smtClean="0"/>
-              <a:t>8/28/2016</a:t>
+              <a:t>9/4/16</a:t>
             </a:fld>
             <a:endParaRPr lang="en-US"/>
           </a:p>
@@ -1169,8 +1185,8 @@
         </p:nvSpPr>
         <p:spPr>
           <a:xfrm>
-            <a:off x="457200" y="1600200"/>
-            <a:ext cx="4038600" cy="4525963"/>
+            <a:off x="539988" y="1600203"/>
+            <a:ext cx="4769895" cy="4525963"/>
           </a:xfrm>
         </p:spPr>
         <p:txBody>
@@ -1254,8 +1270,8 @@
         </p:nvSpPr>
         <p:spPr>
           <a:xfrm>
-            <a:off x="4648200" y="1600200"/>
-            <a:ext cx="4038600" cy="4525963"/>
+            <a:off x="5489881" y="1600203"/>
+            <a:ext cx="4769895" cy="4525963"/>
           </a:xfrm>
         </p:spPr>
         <p:txBody>
@@ -1344,7 +1360,7 @@
           <a:p>
             <a:fld id="{78C97017-6FC3-485B-9764-EAC9E56C1D49}" type="datetimeFigureOut">
               <a:rPr lang="en-US" smtClean="0"/>
-              <a:t>8/28/2016</a:t>
+              <a:t>9/4/16</a:t>
             </a:fld>
             <a:endParaRPr lang="en-US"/>
           </a:p>
@@ -1461,8 +1477,8 @@
         </p:nvSpPr>
         <p:spPr>
           <a:xfrm>
-            <a:off x="457200" y="1535113"/>
-            <a:ext cx="4040188" cy="639762"/>
+            <a:off x="539988" y="1535113"/>
+            <a:ext cx="4771771" cy="639762"/>
           </a:xfrm>
         </p:spPr>
         <p:txBody>
@@ -1472,35 +1488,35 @@
               <a:buNone/>
               <a:defRPr sz="2400" b="1"/>
             </a:lvl1pPr>
-            <a:lvl2pPr marL="457200" indent="0">
+            <a:lvl2pPr marL="457217" indent="0">
               <a:buNone/>
               <a:defRPr sz="2000" b="1"/>
             </a:lvl2pPr>
-            <a:lvl3pPr marL="914400" indent="0">
+            <a:lvl3pPr marL="914434" indent="0">
               <a:buNone/>
               <a:defRPr sz="1800" b="1"/>
             </a:lvl3pPr>
-            <a:lvl4pPr marL="1371600" indent="0">
+            <a:lvl4pPr marL="1371651" indent="0">
               <a:buNone/>
               <a:defRPr sz="1600" b="1"/>
             </a:lvl4pPr>
-            <a:lvl5pPr marL="1828800" indent="0">
+            <a:lvl5pPr marL="1828869" indent="0">
               <a:buNone/>
               <a:defRPr sz="1600" b="1"/>
             </a:lvl5pPr>
-            <a:lvl6pPr marL="2286000" indent="0">
+            <a:lvl6pPr marL="2286086" indent="0">
               <a:buNone/>
               <a:defRPr sz="1600" b="1"/>
             </a:lvl6pPr>
-            <a:lvl7pPr marL="2743200" indent="0">
+            <a:lvl7pPr marL="2743303" indent="0">
               <a:buNone/>
               <a:defRPr sz="1600" b="1"/>
             </a:lvl7pPr>
-            <a:lvl8pPr marL="3200400" indent="0">
+            <a:lvl8pPr marL="3200519" indent="0">
               <a:buNone/>
               <a:defRPr sz="1600" b="1"/>
             </a:lvl8pPr>
-            <a:lvl9pPr marL="3657600" indent="0">
+            <a:lvl9pPr marL="3657736" indent="0">
               <a:buNone/>
               <a:defRPr sz="1600" b="1"/>
             </a:lvl9pPr>
@@ -1526,8 +1542,8 @@
         </p:nvSpPr>
         <p:spPr>
           <a:xfrm>
-            <a:off x="457200" y="2174875"/>
-            <a:ext cx="4040188" cy="3951288"/>
+            <a:off x="539988" y="2174875"/>
+            <a:ext cx="4771771" cy="3951288"/>
           </a:xfrm>
         </p:spPr>
         <p:txBody>
@@ -1611,8 +1627,8 @@
         </p:nvSpPr>
         <p:spPr>
           <a:xfrm>
-            <a:off x="4645025" y="1535113"/>
-            <a:ext cx="4041775" cy="639762"/>
+            <a:off x="5486132" y="1535113"/>
+            <a:ext cx="4773645" cy="639762"/>
           </a:xfrm>
         </p:spPr>
         <p:txBody>
@@ -1622,35 +1638,35 @@
               <a:buNone/>
               <a:defRPr sz="2400" b="1"/>
             </a:lvl1pPr>
-            <a:lvl2pPr marL="457200" indent="0">
+            <a:lvl2pPr marL="457217" indent="0">
               <a:buNone/>
               <a:defRPr sz="2000" b="1"/>
             </a:lvl2pPr>
-            <a:lvl3pPr marL="914400" indent="0">
+            <a:lvl3pPr marL="914434" indent="0">
               <a:buNone/>
               <a:defRPr sz="1800" b="1"/>
             </a:lvl3pPr>
-            <a:lvl4pPr marL="1371600" indent="0">
+            <a:lvl4pPr marL="1371651" indent="0">
               <a:buNone/>
               <a:defRPr sz="1600" b="1"/>
             </a:lvl4pPr>
-            <a:lvl5pPr marL="1828800" indent="0">
+            <a:lvl5pPr marL="1828869" indent="0">
               <a:buNone/>
               <a:defRPr sz="1600" b="1"/>
             </a:lvl5pPr>
-            <a:lvl6pPr marL="2286000" indent="0">
+            <a:lvl6pPr marL="2286086" indent="0">
               <a:buNone/>
               <a:defRPr sz="1600" b="1"/>
             </a:lvl6pPr>
-            <a:lvl7pPr marL="2743200" indent="0">
+            <a:lvl7pPr marL="2743303" indent="0">
               <a:buNone/>
               <a:defRPr sz="1600" b="1"/>
             </a:lvl7pPr>
-            <a:lvl8pPr marL="3200400" indent="0">
+            <a:lvl8pPr marL="3200519" indent="0">
               <a:buNone/>
               <a:defRPr sz="1600" b="1"/>
             </a:lvl8pPr>
-            <a:lvl9pPr marL="3657600" indent="0">
+            <a:lvl9pPr marL="3657736" indent="0">
               <a:buNone/>
               <a:defRPr sz="1600" b="1"/>
             </a:lvl9pPr>
@@ -1676,8 +1692,8 @@
         </p:nvSpPr>
         <p:spPr>
           <a:xfrm>
-            <a:off x="4645025" y="2174875"/>
-            <a:ext cx="4041775" cy="3951288"/>
+            <a:off x="5486132" y="2174875"/>
+            <a:ext cx="4773645" cy="3951288"/>
           </a:xfrm>
         </p:spPr>
         <p:txBody>
@@ -1766,7 +1782,7 @@
           <a:p>
             <a:fld id="{78C97017-6FC3-485B-9764-EAC9E56C1D49}" type="datetimeFigureOut">
               <a:rPr lang="en-US" smtClean="0"/>
-              <a:t>8/28/2016</a:t>
+              <a:t>9/4/16</a:t>
             </a:fld>
             <a:endParaRPr lang="en-US"/>
           </a:p>
@@ -1884,7 +1900,7 @@
           <a:p>
             <a:fld id="{78C97017-6FC3-485B-9764-EAC9E56C1D49}" type="datetimeFigureOut">
               <a:rPr lang="en-US" smtClean="0"/>
-              <a:t>8/28/2016</a:t>
+              <a:t>9/4/16</a:t>
             </a:fld>
             <a:endParaRPr lang="en-US"/>
           </a:p>
@@ -1979,7 +1995,7 @@
           <a:p>
             <a:fld id="{78C97017-6FC3-485B-9764-EAC9E56C1D49}" type="datetimeFigureOut">
               <a:rPr lang="en-US" smtClean="0"/>
-              <a:t>8/28/2016</a:t>
+              <a:t>9/4/16</a:t>
             </a:fld>
             <a:endParaRPr lang="en-US"/>
           </a:p>
@@ -2069,8 +2085,8 @@
         </p:nvSpPr>
         <p:spPr>
           <a:xfrm>
-            <a:off x="457200" y="273050"/>
-            <a:ext cx="3008313" cy="1162050"/>
+            <a:off x="539990" y="273050"/>
+            <a:ext cx="3553048" cy="1162050"/>
           </a:xfrm>
         </p:spPr>
         <p:txBody>
@@ -2101,15 +2117,15 @@
         </p:nvSpPr>
         <p:spPr>
           <a:xfrm>
-            <a:off x="3575050" y="273050"/>
-            <a:ext cx="5111750" cy="5853113"/>
+            <a:off x="4222407" y="273053"/>
+            <a:ext cx="6037368" cy="5853113"/>
           </a:xfrm>
         </p:spPr>
         <p:txBody>
           <a:bodyPr/>
           <a:lstStyle>
             <a:lvl1pPr>
-              <a:defRPr sz="3200"/>
+              <a:defRPr sz="3201"/>
             </a:lvl1pPr>
             <a:lvl2pPr>
               <a:defRPr sz="2800"/>
@@ -2186,8 +2202,8 @@
         </p:nvSpPr>
         <p:spPr>
           <a:xfrm>
-            <a:off x="457200" y="1435100"/>
-            <a:ext cx="3008313" cy="4691063"/>
+            <a:off x="539990" y="1435103"/>
+            <a:ext cx="3553048" cy="4691063"/>
           </a:xfrm>
         </p:spPr>
         <p:txBody>
@@ -2197,35 +2213,35 @@
               <a:buNone/>
               <a:defRPr sz="1400"/>
             </a:lvl1pPr>
-            <a:lvl2pPr marL="457200" indent="0">
+            <a:lvl2pPr marL="457217" indent="0">
               <a:buNone/>
               <a:defRPr sz="1200"/>
             </a:lvl2pPr>
-            <a:lvl3pPr marL="914400" indent="0">
+            <a:lvl3pPr marL="914434" indent="0">
               <a:buNone/>
               <a:defRPr sz="1000"/>
             </a:lvl3pPr>
-            <a:lvl4pPr marL="1371600" indent="0">
+            <a:lvl4pPr marL="1371651" indent="0">
               <a:buNone/>
               <a:defRPr sz="900"/>
             </a:lvl4pPr>
-            <a:lvl5pPr marL="1828800" indent="0">
+            <a:lvl5pPr marL="1828869" indent="0">
               <a:buNone/>
               <a:defRPr sz="900"/>
             </a:lvl5pPr>
-            <a:lvl6pPr marL="2286000" indent="0">
+            <a:lvl6pPr marL="2286086" indent="0">
               <a:buNone/>
               <a:defRPr sz="900"/>
             </a:lvl6pPr>
-            <a:lvl7pPr marL="2743200" indent="0">
+            <a:lvl7pPr marL="2743303" indent="0">
               <a:buNone/>
               <a:defRPr sz="900"/>
             </a:lvl7pPr>
-            <a:lvl8pPr marL="3200400" indent="0">
+            <a:lvl8pPr marL="3200519" indent="0">
               <a:buNone/>
               <a:defRPr sz="900"/>
             </a:lvl8pPr>
-            <a:lvl9pPr marL="3657600" indent="0">
+            <a:lvl9pPr marL="3657736" indent="0">
               <a:buNone/>
               <a:defRPr sz="900"/>
             </a:lvl9pPr>
@@ -2256,7 +2272,7 @@
           <a:p>
             <a:fld id="{78C97017-6FC3-485B-9764-EAC9E56C1D49}" type="datetimeFigureOut">
               <a:rPr lang="en-US" smtClean="0"/>
-              <a:t>8/28/2016</a:t>
+              <a:t>9/4/16</a:t>
             </a:fld>
             <a:endParaRPr lang="en-US"/>
           </a:p>
@@ -2346,8 +2362,8 @@
         </p:nvSpPr>
         <p:spPr>
           <a:xfrm>
-            <a:off x="1792288" y="4800600"/>
-            <a:ext cx="5486400" cy="566738"/>
+            <a:off x="2116829" y="4800600"/>
+            <a:ext cx="6479858" cy="566738"/>
           </a:xfrm>
         </p:spPr>
         <p:txBody>
@@ -2378,8 +2394,8 @@
         </p:nvSpPr>
         <p:spPr>
           <a:xfrm>
-            <a:off x="1792288" y="612775"/>
-            <a:ext cx="5486400" cy="4114800"/>
+            <a:off x="2116829" y="612775"/>
+            <a:ext cx="6479858" cy="4114800"/>
           </a:xfrm>
         </p:spPr>
         <p:txBody>
@@ -2387,37 +2403,37 @@
           <a:lstStyle>
             <a:lvl1pPr marL="0" indent="0">
               <a:buNone/>
-              <a:defRPr sz="3200"/>
+              <a:defRPr sz="3201"/>
             </a:lvl1pPr>
-            <a:lvl2pPr marL="457200" indent="0">
+            <a:lvl2pPr marL="457217" indent="0">
               <a:buNone/>
               <a:defRPr sz="2800"/>
             </a:lvl2pPr>
-            <a:lvl3pPr marL="914400" indent="0">
+            <a:lvl3pPr marL="914434" indent="0">
               <a:buNone/>
               <a:defRPr sz="2400"/>
             </a:lvl3pPr>
-            <a:lvl4pPr marL="1371600" indent="0">
+            <a:lvl4pPr marL="1371651" indent="0">
               <a:buNone/>
               <a:defRPr sz="2000"/>
             </a:lvl4pPr>
-            <a:lvl5pPr marL="1828800" indent="0">
+            <a:lvl5pPr marL="1828869" indent="0">
               <a:buNone/>
               <a:defRPr sz="2000"/>
             </a:lvl5pPr>
-            <a:lvl6pPr marL="2286000" indent="0">
+            <a:lvl6pPr marL="2286086" indent="0">
               <a:buNone/>
               <a:defRPr sz="2000"/>
             </a:lvl6pPr>
-            <a:lvl7pPr marL="2743200" indent="0">
+            <a:lvl7pPr marL="2743303" indent="0">
               <a:buNone/>
               <a:defRPr sz="2000"/>
             </a:lvl7pPr>
-            <a:lvl8pPr marL="3200400" indent="0">
+            <a:lvl8pPr marL="3200519" indent="0">
               <a:buNone/>
               <a:defRPr sz="2000"/>
             </a:lvl8pPr>
-            <a:lvl9pPr marL="3657600" indent="0">
+            <a:lvl9pPr marL="3657736" indent="0">
               <a:buNone/>
               <a:defRPr sz="2000"/>
             </a:lvl9pPr>
@@ -2439,8 +2455,8 @@
         </p:nvSpPr>
         <p:spPr>
           <a:xfrm>
-            <a:off x="1792288" y="5367338"/>
-            <a:ext cx="5486400" cy="804862"/>
+            <a:off x="2116829" y="5367338"/>
+            <a:ext cx="6479858" cy="804862"/>
           </a:xfrm>
         </p:spPr>
         <p:txBody>
@@ -2450,35 +2466,35 @@
               <a:buNone/>
               <a:defRPr sz="1400"/>
             </a:lvl1pPr>
-            <a:lvl2pPr marL="457200" indent="0">
+            <a:lvl2pPr marL="457217" indent="0">
               <a:buNone/>
               <a:defRPr sz="1200"/>
             </a:lvl2pPr>
-            <a:lvl3pPr marL="914400" indent="0">
+            <a:lvl3pPr marL="914434" indent="0">
               <a:buNone/>
               <a:defRPr sz="1000"/>
             </a:lvl3pPr>
-            <a:lvl4pPr marL="1371600" indent="0">
+            <a:lvl4pPr marL="1371651" indent="0">
               <a:buNone/>
               <a:defRPr sz="900"/>
             </a:lvl4pPr>
-            <a:lvl5pPr marL="1828800" indent="0">
+            <a:lvl5pPr marL="1828869" indent="0">
               <a:buNone/>
               <a:defRPr sz="900"/>
             </a:lvl5pPr>
-            <a:lvl6pPr marL="2286000" indent="0">
+            <a:lvl6pPr marL="2286086" indent="0">
               <a:buNone/>
               <a:defRPr sz="900"/>
             </a:lvl6pPr>
-            <a:lvl7pPr marL="2743200" indent="0">
+            <a:lvl7pPr marL="2743303" indent="0">
               <a:buNone/>
               <a:defRPr sz="900"/>
             </a:lvl7pPr>
-            <a:lvl8pPr marL="3200400" indent="0">
+            <a:lvl8pPr marL="3200519" indent="0">
               <a:buNone/>
               <a:defRPr sz="900"/>
             </a:lvl8pPr>
-            <a:lvl9pPr marL="3657600" indent="0">
+            <a:lvl9pPr marL="3657736" indent="0">
               <a:buNone/>
               <a:defRPr sz="900"/>
             </a:lvl9pPr>
@@ -2509,7 +2525,7 @@
           <a:p>
             <a:fld id="{78C97017-6FC3-485B-9764-EAC9E56C1D49}" type="datetimeFigureOut">
               <a:rPr lang="en-US" smtClean="0"/>
-              <a:t>8/28/2016</a:t>
+              <a:t>9/4/16</a:t>
             </a:fld>
             <a:endParaRPr lang="en-US"/>
           </a:p>
@@ -2604,8 +2620,8 @@
         </p:nvSpPr>
         <p:spPr>
           <a:xfrm>
-            <a:off x="457200" y="274638"/>
-            <a:ext cx="8229600" cy="1143000"/>
+            <a:off x="539988" y="274638"/>
+            <a:ext cx="9719787" cy="1143000"/>
           </a:xfrm>
           <a:prstGeom prst="rect">
             <a:avLst/>
@@ -2637,8 +2653,8 @@
         </p:nvSpPr>
         <p:spPr>
           <a:xfrm>
-            <a:off x="457200" y="1600200"/>
-            <a:ext cx="8229600" cy="4525963"/>
+            <a:off x="539988" y="1600203"/>
+            <a:ext cx="9719787" cy="4525963"/>
           </a:xfrm>
           <a:prstGeom prst="rect">
             <a:avLst/>
@@ -2699,8 +2715,8 @@
         </p:nvSpPr>
         <p:spPr>
           <a:xfrm>
-            <a:off x="457200" y="6356350"/>
-            <a:ext cx="2133600" cy="365125"/>
+            <a:off x="539988" y="6356353"/>
+            <a:ext cx="2519945" cy="365125"/>
           </a:xfrm>
           <a:prstGeom prst="rect">
             <a:avLst/>
@@ -2722,7 +2738,7 @@
           <a:p>
             <a:fld id="{78C97017-6FC3-485B-9764-EAC9E56C1D49}" type="datetimeFigureOut">
               <a:rPr lang="en-US" smtClean="0"/>
-              <a:t>8/28/2016</a:t>
+              <a:t>9/4/16</a:t>
             </a:fld>
             <a:endParaRPr lang="en-US"/>
           </a:p>
@@ -2740,8 +2756,8 @@
         </p:nvSpPr>
         <p:spPr>
           <a:xfrm>
-            <a:off x="3124200" y="6356350"/>
-            <a:ext cx="2895600" cy="365125"/>
+            <a:off x="3689919" y="6356353"/>
+            <a:ext cx="3419925" cy="365125"/>
           </a:xfrm>
           <a:prstGeom prst="rect">
             <a:avLst/>
@@ -2777,8 +2793,8 @@
         </p:nvSpPr>
         <p:spPr>
           <a:xfrm>
-            <a:off x="6553200" y="6356350"/>
-            <a:ext cx="2133600" cy="365125"/>
+            <a:off x="7739830" y="6356353"/>
+            <a:ext cx="2519945" cy="365125"/>
           </a:xfrm>
           <a:prstGeom prst="rect">
             <a:avLst/>
@@ -2829,7 +2845,7 @@
   </p:sldLayoutIdLst>
   <p:txStyles>
     <p:titleStyle>
-      <a:lvl1pPr algn="ctr" defTabSz="914400" rtl="0" eaLnBrk="1" latinLnBrk="0" hangingPunct="1">
+      <a:lvl1pPr algn="ctr" defTabSz="914434" rtl="0" eaLnBrk="1" latinLnBrk="0" hangingPunct="1">
         <a:spcBef>
           <a:spcPct val="0"/>
         </a:spcBef>
@@ -2845,13 +2861,13 @@
       </a:lvl1pPr>
     </p:titleStyle>
     <p:bodyStyle>
-      <a:lvl1pPr marL="342900" indent="-342900" algn="l" defTabSz="914400" rtl="0" eaLnBrk="1" latinLnBrk="0" hangingPunct="1">
+      <a:lvl1pPr marL="342913" indent="-342913" algn="l" defTabSz="914434" rtl="0" eaLnBrk="1" latinLnBrk="0" hangingPunct="1">
         <a:spcBef>
           <a:spcPct val="20000"/>
         </a:spcBef>
         <a:buFont typeface="Arial" panose="020B0604020202020204" pitchFamily="34" charset="0"/>
         <a:buChar char="•"/>
-        <a:defRPr sz="3200" kern="1200">
+        <a:defRPr sz="3201" kern="1200">
           <a:solidFill>
             <a:schemeClr val="tx1"/>
           </a:solidFill>
@@ -2860,7 +2876,7 @@
           <a:cs typeface="+mn-cs"/>
         </a:defRPr>
       </a:lvl1pPr>
-      <a:lvl2pPr marL="742950" indent="-285750" algn="l" defTabSz="914400" rtl="0" eaLnBrk="1" latinLnBrk="0" hangingPunct="1">
+      <a:lvl2pPr marL="742978" indent="-285760" algn="l" defTabSz="914434" rtl="0" eaLnBrk="1" latinLnBrk="0" hangingPunct="1">
         <a:spcBef>
           <a:spcPct val="20000"/>
         </a:spcBef>
@@ -2875,7 +2891,7 @@
           <a:cs typeface="+mn-cs"/>
         </a:defRPr>
       </a:lvl2pPr>
-      <a:lvl3pPr marL="1143000" indent="-228600" algn="l" defTabSz="914400" rtl="0" eaLnBrk="1" latinLnBrk="0" hangingPunct="1">
+      <a:lvl3pPr marL="1143042" indent="-228608" algn="l" defTabSz="914434" rtl="0" eaLnBrk="1" latinLnBrk="0" hangingPunct="1">
         <a:spcBef>
           <a:spcPct val="20000"/>
         </a:spcBef>
@@ -2890,7 +2906,7 @@
           <a:cs typeface="+mn-cs"/>
         </a:defRPr>
       </a:lvl3pPr>
-      <a:lvl4pPr marL="1600200" indent="-228600" algn="l" defTabSz="914400" rtl="0" eaLnBrk="1" latinLnBrk="0" hangingPunct="1">
+      <a:lvl4pPr marL="1600260" indent="-228608" algn="l" defTabSz="914434" rtl="0" eaLnBrk="1" latinLnBrk="0" hangingPunct="1">
         <a:spcBef>
           <a:spcPct val="20000"/>
         </a:spcBef>
@@ -2905,7 +2921,7 @@
           <a:cs typeface="+mn-cs"/>
         </a:defRPr>
       </a:lvl4pPr>
-      <a:lvl5pPr marL="2057400" indent="-228600" algn="l" defTabSz="914400" rtl="0" eaLnBrk="1" latinLnBrk="0" hangingPunct="1">
+      <a:lvl5pPr marL="2057477" indent="-228608" algn="l" defTabSz="914434" rtl="0" eaLnBrk="1" latinLnBrk="0" hangingPunct="1">
         <a:spcBef>
           <a:spcPct val="20000"/>
         </a:spcBef>
@@ -2920,7 +2936,7 @@
           <a:cs typeface="+mn-cs"/>
         </a:defRPr>
       </a:lvl5pPr>
-      <a:lvl6pPr marL="2514600" indent="-228600" algn="l" defTabSz="914400" rtl="0" eaLnBrk="1" latinLnBrk="0" hangingPunct="1">
+      <a:lvl6pPr marL="2514694" indent="-228608" algn="l" defTabSz="914434" rtl="0" eaLnBrk="1" latinLnBrk="0" hangingPunct="1">
         <a:spcBef>
           <a:spcPct val="20000"/>
         </a:spcBef>
@@ -2935,7 +2951,7 @@
           <a:cs typeface="+mn-cs"/>
         </a:defRPr>
       </a:lvl6pPr>
-      <a:lvl7pPr marL="2971800" indent="-228600" algn="l" defTabSz="914400" rtl="0" eaLnBrk="1" latinLnBrk="0" hangingPunct="1">
+      <a:lvl7pPr marL="2971911" indent="-228608" algn="l" defTabSz="914434" rtl="0" eaLnBrk="1" latinLnBrk="0" hangingPunct="1">
         <a:spcBef>
           <a:spcPct val="20000"/>
         </a:spcBef>
@@ -2950,7 +2966,7 @@
           <a:cs typeface="+mn-cs"/>
         </a:defRPr>
       </a:lvl7pPr>
-      <a:lvl8pPr marL="3429000" indent="-228600" algn="l" defTabSz="914400" rtl="0" eaLnBrk="1" latinLnBrk="0" hangingPunct="1">
+      <a:lvl8pPr marL="3429128" indent="-228608" algn="l" defTabSz="914434" rtl="0" eaLnBrk="1" latinLnBrk="0" hangingPunct="1">
         <a:spcBef>
           <a:spcPct val="20000"/>
         </a:spcBef>
@@ -2965,7 +2981,7 @@
           <a:cs typeface="+mn-cs"/>
         </a:defRPr>
       </a:lvl8pPr>
-      <a:lvl9pPr marL="3886200" indent="-228600" algn="l" defTabSz="914400" rtl="0" eaLnBrk="1" latinLnBrk="0" hangingPunct="1">
+      <a:lvl9pPr marL="3886345" indent="-228608" algn="l" defTabSz="914434" rtl="0" eaLnBrk="1" latinLnBrk="0" hangingPunct="1">
         <a:spcBef>
           <a:spcPct val="20000"/>
         </a:spcBef>
@@ -2985,7 +3001,7 @@
       <a:defPPr>
         <a:defRPr lang="en-US"/>
       </a:defPPr>
-      <a:lvl1pPr marL="0" algn="l" defTabSz="914400" rtl="0" eaLnBrk="1" latinLnBrk="0" hangingPunct="1">
+      <a:lvl1pPr marL="0" algn="l" defTabSz="914434" rtl="0" eaLnBrk="1" latinLnBrk="0" hangingPunct="1">
         <a:defRPr sz="1800" kern="1200">
           <a:solidFill>
             <a:schemeClr val="tx1"/>
@@ -2995,7 +3011,7 @@
           <a:cs typeface="+mn-cs"/>
         </a:defRPr>
       </a:lvl1pPr>
-      <a:lvl2pPr marL="457200" algn="l" defTabSz="914400" rtl="0" eaLnBrk="1" latinLnBrk="0" hangingPunct="1">
+      <a:lvl2pPr marL="457217" algn="l" defTabSz="914434" rtl="0" eaLnBrk="1" latinLnBrk="0" hangingPunct="1">
         <a:defRPr sz="1800" kern="1200">
           <a:solidFill>
             <a:schemeClr val="tx1"/>
@@ -3005,7 +3021,7 @@
           <a:cs typeface="+mn-cs"/>
         </a:defRPr>
       </a:lvl2pPr>
-      <a:lvl3pPr marL="914400" algn="l" defTabSz="914400" rtl="0" eaLnBrk="1" latinLnBrk="0" hangingPunct="1">
+      <a:lvl3pPr marL="914434" algn="l" defTabSz="914434" rtl="0" eaLnBrk="1" latinLnBrk="0" hangingPunct="1">
         <a:defRPr sz="1800" kern="1200">
           <a:solidFill>
             <a:schemeClr val="tx1"/>
@@ -3015,7 +3031,7 @@
           <a:cs typeface="+mn-cs"/>
         </a:defRPr>
       </a:lvl3pPr>
-      <a:lvl4pPr marL="1371600" algn="l" defTabSz="914400" rtl="0" eaLnBrk="1" latinLnBrk="0" hangingPunct="1">
+      <a:lvl4pPr marL="1371651" algn="l" defTabSz="914434" rtl="0" eaLnBrk="1" latinLnBrk="0" hangingPunct="1">
         <a:defRPr sz="1800" kern="1200">
           <a:solidFill>
             <a:schemeClr val="tx1"/>
@@ -3025,7 +3041,7 @@
           <a:cs typeface="+mn-cs"/>
         </a:defRPr>
       </a:lvl4pPr>
-      <a:lvl5pPr marL="1828800" algn="l" defTabSz="914400" rtl="0" eaLnBrk="1" latinLnBrk="0" hangingPunct="1">
+      <a:lvl5pPr marL="1828869" algn="l" defTabSz="914434" rtl="0" eaLnBrk="1" latinLnBrk="0" hangingPunct="1">
         <a:defRPr sz="1800" kern="1200">
           <a:solidFill>
             <a:schemeClr val="tx1"/>
@@ -3035,7 +3051,7 @@
           <a:cs typeface="+mn-cs"/>
         </a:defRPr>
       </a:lvl5pPr>
-      <a:lvl6pPr marL="2286000" algn="l" defTabSz="914400" rtl="0" eaLnBrk="1" latinLnBrk="0" hangingPunct="1">
+      <a:lvl6pPr marL="2286086" algn="l" defTabSz="914434" rtl="0" eaLnBrk="1" latinLnBrk="0" hangingPunct="1">
         <a:defRPr sz="1800" kern="1200">
           <a:solidFill>
             <a:schemeClr val="tx1"/>
@@ -3045,7 +3061,7 @@
           <a:cs typeface="+mn-cs"/>
         </a:defRPr>
       </a:lvl6pPr>
-      <a:lvl7pPr marL="2743200" algn="l" defTabSz="914400" rtl="0" eaLnBrk="1" latinLnBrk="0" hangingPunct="1">
+      <a:lvl7pPr marL="2743303" algn="l" defTabSz="914434" rtl="0" eaLnBrk="1" latinLnBrk="0" hangingPunct="1">
         <a:defRPr sz="1800" kern="1200">
           <a:solidFill>
             <a:schemeClr val="tx1"/>
@@ -3055,7 +3071,7 @@
           <a:cs typeface="+mn-cs"/>
         </a:defRPr>
       </a:lvl7pPr>
-      <a:lvl8pPr marL="3200400" algn="l" defTabSz="914400" rtl="0" eaLnBrk="1" latinLnBrk="0" hangingPunct="1">
+      <a:lvl8pPr marL="3200519" algn="l" defTabSz="914434" rtl="0" eaLnBrk="1" latinLnBrk="0" hangingPunct="1">
         <a:defRPr sz="1800" kern="1200">
           <a:solidFill>
             <a:schemeClr val="tx1"/>
@@ -3065,7 +3081,7 @@
           <a:cs typeface="+mn-cs"/>
         </a:defRPr>
       </a:lvl8pPr>
-      <a:lvl9pPr marL="3657600" algn="l" defTabSz="914400" rtl="0" eaLnBrk="1" latinLnBrk="0" hangingPunct="1">
+      <a:lvl9pPr marL="3657736" algn="l" defTabSz="914434" rtl="0" eaLnBrk="1" latinLnBrk="0" hangingPunct="1">
         <a:defRPr sz="1800" kern="1200">
           <a:solidFill>
             <a:schemeClr val="tx1"/>
@@ -3185,7 +3201,7 @@
         </p:nvSpPr>
         <p:spPr>
           <a:xfrm>
-            <a:off x="761999" y="5141640"/>
+            <a:off x="792119" y="5353725"/>
             <a:ext cx="929296" cy="346760"/>
           </a:xfrm>
           <a:prstGeom prst="rect">
@@ -3214,7 +3230,7 @@
           <a:p>
             <a:pPr algn="ctr"/>
             <a:r>
-              <a:rPr lang="en-US" sz="1050" dirty="0" err="1" smtClean="0"/>
+              <a:rPr lang="en-US" sz="1050" dirty="0" err="1"/>
               <a:t>TextUi</a:t>
             </a:r>
             <a:endParaRPr lang="en-SG" sz="1050" dirty="0"/>
@@ -3229,7 +3245,7 @@
         </p:nvSpPr>
         <p:spPr>
           <a:xfrm>
-            <a:off x="762000" y="3747060"/>
+            <a:off x="792120" y="3959145"/>
             <a:ext cx="929296" cy="346760"/>
           </a:xfrm>
           <a:prstGeom prst="rect">
@@ -3265,7 +3281,7 @@
           <a:p>
             <a:pPr algn="ctr"/>
             <a:r>
-              <a:rPr lang="en-US" sz="1050" dirty="0" smtClean="0">
+              <a:rPr lang="en-US" sz="1050" dirty="0">
                 <a:solidFill>
                   <a:schemeClr val="bg1"/>
                 </a:solidFill>
@@ -3288,7 +3304,7 @@
         </p:nvSpPr>
         <p:spPr>
           <a:xfrm>
-            <a:off x="2064848" y="3747060"/>
+            <a:off x="2094968" y="3959145"/>
             <a:ext cx="929296" cy="346760"/>
           </a:xfrm>
           <a:prstGeom prst="rect">
@@ -3332,7 +3348,7 @@
         </p:nvSpPr>
         <p:spPr>
           <a:xfrm>
-            <a:off x="1447800" y="3006040"/>
+            <a:off x="1477922" y="3218125"/>
             <a:ext cx="634723" cy="346760"/>
           </a:xfrm>
           <a:prstGeom prst="rect">
@@ -3361,7 +3377,7 @@
           <a:p>
             <a:pPr algn="ctr"/>
             <a:r>
-              <a:rPr lang="en-US" sz="1050" dirty="0" smtClean="0"/>
+              <a:rPr lang="en-US" sz="1050" dirty="0"/>
               <a:t>Parser</a:t>
             </a:r>
             <a:endParaRPr lang="en-SG" sz="1050" dirty="0"/>
@@ -3376,7 +3392,7 @@
         </p:nvSpPr>
         <p:spPr>
           <a:xfrm>
-            <a:off x="3681046" y="3032560"/>
+            <a:off x="3711166" y="3244645"/>
             <a:ext cx="929296" cy="346760"/>
           </a:xfrm>
           <a:prstGeom prst="rect">
@@ -3405,14 +3421,14 @@
           <a:p>
             <a:pPr algn="ctr"/>
             <a:r>
-              <a:rPr lang="en-US" sz="1050" dirty="0" smtClean="0"/>
+              <a:rPr lang="en-US" sz="1050" dirty="0"/>
               <a:t>Unique</a:t>
             </a:r>
             <a:br>
-              <a:rPr lang="en-US" sz="1050" dirty="0" smtClean="0"/>
+              <a:rPr lang="en-US" sz="1050" dirty="0"/>
             </a:br>
             <a:r>
-              <a:rPr lang="en-US" sz="1050" dirty="0" err="1" smtClean="0"/>
+              <a:rPr lang="en-US" sz="1050" dirty="0" err="1"/>
               <a:t>TagList</a:t>
             </a:r>
             <a:endParaRPr lang="en-SG" sz="1050" dirty="0"/>
@@ -3427,7 +3443,7 @@
         </p:nvSpPr>
         <p:spPr>
           <a:xfrm>
-            <a:off x="3654669" y="4352685"/>
+            <a:off x="3684789" y="4564770"/>
             <a:ext cx="929296" cy="346760"/>
           </a:xfrm>
           <a:prstGeom prst="rect">
@@ -3456,14 +3472,14 @@
           <a:p>
             <a:pPr algn="ctr"/>
             <a:r>
-              <a:rPr lang="en-US" sz="1050" dirty="0" smtClean="0"/>
+              <a:rPr lang="en-US" sz="1050" dirty="0"/>
               <a:t>Unique</a:t>
             </a:r>
             <a:br>
-              <a:rPr lang="en-US" sz="1050" dirty="0" smtClean="0"/>
+              <a:rPr lang="en-US" sz="1050" dirty="0"/>
             </a:br>
             <a:r>
-              <a:rPr lang="en-US" sz="1050" dirty="0" err="1" smtClean="0"/>
+              <a:rPr lang="en-US" sz="1050" dirty="0" err="1"/>
               <a:t>PersonList</a:t>
             </a:r>
             <a:endParaRPr lang="en-SG" sz="1050" dirty="0"/>
@@ -3478,7 +3494,7 @@
         </p:nvSpPr>
         <p:spPr>
           <a:xfrm>
-            <a:off x="5219458" y="4352685"/>
+            <a:off x="5249578" y="4564770"/>
             <a:ext cx="929296" cy="346760"/>
           </a:xfrm>
           <a:prstGeom prst="rect">
@@ -3507,7 +3523,7 @@
           <a:p>
             <a:pPr algn="ctr"/>
             <a:r>
-              <a:rPr lang="en-US" sz="1050" dirty="0" smtClean="0"/>
+              <a:rPr lang="en-US" sz="1050" dirty="0"/>
               <a:t>Person</a:t>
             </a:r>
             <a:endParaRPr lang="en-SG" sz="1050" dirty="0"/>
@@ -3522,7 +3538,7 @@
         </p:nvSpPr>
         <p:spPr>
           <a:xfrm>
-            <a:off x="6781800" y="4036277"/>
+            <a:off x="6811920" y="4248362"/>
             <a:ext cx="929296" cy="346760"/>
           </a:xfrm>
           <a:prstGeom prst="rect">
@@ -3551,7 +3567,7 @@
           <a:p>
             <a:pPr algn="ctr"/>
             <a:r>
-              <a:rPr lang="en-US" sz="1050" dirty="0" smtClean="0"/>
+              <a:rPr lang="en-US" sz="1050" dirty="0"/>
               <a:t>Phone</a:t>
             </a:r>
             <a:endParaRPr lang="en-SG" sz="1050" dirty="0"/>
@@ -3566,7 +3582,7 @@
         </p:nvSpPr>
         <p:spPr>
           <a:xfrm>
-            <a:off x="6796454" y="4495800"/>
+            <a:off x="6826574" y="4707885"/>
             <a:ext cx="929296" cy="346760"/>
           </a:xfrm>
           <a:prstGeom prst="rect">
@@ -3595,7 +3611,7 @@
           <a:p>
             <a:pPr algn="ctr"/>
             <a:r>
-              <a:rPr lang="en-US" sz="1050" dirty="0" smtClean="0"/>
+              <a:rPr lang="en-US" sz="1050" dirty="0"/>
               <a:t>Email</a:t>
             </a:r>
             <a:endParaRPr lang="en-SG" sz="1050" dirty="0"/>
@@ -3610,7 +3626,7 @@
         </p:nvSpPr>
         <p:spPr>
           <a:xfrm>
-            <a:off x="6796454" y="4953000"/>
+            <a:off x="6826574" y="5165085"/>
             <a:ext cx="929296" cy="346760"/>
           </a:xfrm>
           <a:prstGeom prst="rect">
@@ -3639,7 +3655,7 @@
           <a:p>
             <a:pPr algn="ctr"/>
             <a:r>
-              <a:rPr lang="en-US" sz="1050" dirty="0" smtClean="0"/>
+              <a:rPr lang="en-US" sz="1050" dirty="0"/>
               <a:t>Address</a:t>
             </a:r>
             <a:endParaRPr lang="en-SG" sz="1050" dirty="0"/>
@@ -3654,7 +3670,7 @@
         </p:nvSpPr>
         <p:spPr>
           <a:xfrm>
-            <a:off x="1153227" y="4460471"/>
+            <a:off x="1183347" y="4672556"/>
             <a:ext cx="929296" cy="346760"/>
           </a:xfrm>
           <a:prstGeom prst="rect">
@@ -3683,7 +3699,7 @@
           <a:p>
             <a:pPr algn="ctr"/>
             <a:r>
-              <a:rPr lang="en-US" sz="1050" dirty="0" err="1" smtClean="0"/>
+              <a:rPr lang="en-US" sz="1050" dirty="0" err="1"/>
               <a:t>StorageFile</a:t>
             </a:r>
             <a:endParaRPr lang="en-SG" sz="1050" dirty="0"/>
@@ -3698,7 +3714,7 @@
         </p:nvCxnSpPr>
         <p:spPr>
           <a:xfrm rot="5400000">
-            <a:off x="321738" y="4617731"/>
+            <a:off x="351858" y="4829818"/>
             <a:ext cx="1047820" cy="1"/>
           </a:xfrm>
           <a:prstGeom prst="bentConnector3">
@@ -3741,7 +3757,7 @@
         </p:nvCxnSpPr>
         <p:spPr>
           <a:xfrm rot="5400000" flipH="1" flipV="1">
-            <a:off x="1053404" y="3352664"/>
+            <a:off x="1083524" y="3564750"/>
             <a:ext cx="567640" cy="221152"/>
           </a:xfrm>
           <a:prstGeom prst="bentConnector2">
@@ -3780,7 +3796,7 @@
         </p:nvCxnSpPr>
         <p:spPr>
           <a:xfrm rot="16200000" flipH="1">
-            <a:off x="809847" y="4297627"/>
+            <a:off x="839967" y="4509713"/>
             <a:ext cx="530702" cy="141745"/>
           </a:xfrm>
           <a:prstGeom prst="bentConnector2">
@@ -3821,7 +3837,7 @@
         </p:nvCxnSpPr>
         <p:spPr>
           <a:xfrm flipV="1">
-            <a:off x="3230192" y="3205940"/>
+            <a:off x="3260312" y="3418025"/>
             <a:ext cx="450854" cy="712546"/>
           </a:xfrm>
           <a:prstGeom prst="bentConnector3">
@@ -3859,7 +3875,7 @@
         </p:nvCxnSpPr>
         <p:spPr>
           <a:xfrm>
-            <a:off x="3230192" y="3918486"/>
+            <a:off x="3260314" y="4130573"/>
             <a:ext cx="424477" cy="607579"/>
           </a:xfrm>
           <a:prstGeom prst="bentConnector3">
@@ -3899,7 +3915,7 @@
         </p:nvCxnSpPr>
         <p:spPr>
           <a:xfrm rot="5400000" flipH="1" flipV="1">
-            <a:off x="5197424" y="3866003"/>
+            <a:off x="5227545" y="4078088"/>
             <a:ext cx="973365" cy="12700"/>
           </a:xfrm>
           <a:prstGeom prst="bentConnector3">
@@ -3939,7 +3955,7 @@
         </p:nvCxnSpPr>
         <p:spPr>
           <a:xfrm flipV="1">
-            <a:off x="6384802" y="4209657"/>
+            <a:off x="6414923" y="4421742"/>
             <a:ext cx="396998" cy="312434"/>
           </a:xfrm>
           <a:prstGeom prst="bentConnector3">
@@ -3979,7 +3995,7 @@
         </p:nvCxnSpPr>
         <p:spPr>
           <a:xfrm>
-            <a:off x="6384802" y="4522091"/>
+            <a:off x="6414922" y="4734178"/>
             <a:ext cx="411652" cy="147089"/>
           </a:xfrm>
           <a:prstGeom prst="bentConnector3">
@@ -4019,7 +4035,7 @@
         </p:nvCxnSpPr>
         <p:spPr>
           <a:xfrm>
-            <a:off x="6384802" y="4522091"/>
+            <a:off x="6414922" y="4734178"/>
             <a:ext cx="411652" cy="604289"/>
           </a:xfrm>
           <a:prstGeom prst="bentConnector3">
@@ -4056,7 +4072,7 @@
         </p:nvSpPr>
         <p:spPr>
           <a:xfrm>
-            <a:off x="5219458" y="3032560"/>
+            <a:off x="5249578" y="3244645"/>
             <a:ext cx="929296" cy="346760"/>
           </a:xfrm>
           <a:prstGeom prst="rect">
@@ -4100,7 +4116,7 @@
         </p:nvSpPr>
         <p:spPr>
           <a:xfrm>
-            <a:off x="6148754" y="4435401"/>
+            <a:off x="6178875" y="4647486"/>
             <a:ext cx="236048" cy="173380"/>
           </a:xfrm>
           <a:prstGeom prst="flowChartDecision">
@@ -4131,11 +4147,7 @@
           <a:lstStyle/>
           <a:p>
             <a:pPr algn="ctr"/>
-            <a:endParaRPr lang="en-US" sz="1050">
-              <a:solidFill>
-                <a:schemeClr val="dk1"/>
-              </a:solidFill>
-            </a:endParaRPr>
+            <a:endParaRPr lang="en-US" sz="1050"/>
           </a:p>
         </p:txBody>
       </p:sp>
@@ -4147,7 +4159,7 @@
         </p:nvSpPr>
         <p:spPr>
           <a:xfrm>
-            <a:off x="4610342" y="3131950"/>
+            <a:off x="4640463" y="3344035"/>
             <a:ext cx="236048" cy="173380"/>
           </a:xfrm>
           <a:prstGeom prst="flowChartDecision">
@@ -4188,7 +4200,7 @@
         </p:nvSpPr>
         <p:spPr>
           <a:xfrm>
-            <a:off x="4573941" y="4439375"/>
+            <a:off x="4604061" y="4651460"/>
             <a:ext cx="236048" cy="173380"/>
           </a:xfrm>
           <a:prstGeom prst="flowChartDecision">
@@ -4229,7 +4241,7 @@
         </p:nvSpPr>
         <p:spPr>
           <a:xfrm>
-            <a:off x="2994144" y="3831796"/>
+            <a:off x="3024264" y="4043882"/>
             <a:ext cx="236048" cy="173380"/>
           </a:xfrm>
           <a:prstGeom prst="flowChartDecision">
@@ -4275,7 +4287,7 @@
         </p:nvCxnSpPr>
         <p:spPr>
           <a:xfrm flipV="1">
-            <a:off x="4846390" y="3205940"/>
+            <a:off x="4876510" y="3418025"/>
             <a:ext cx="373068" cy="12700"/>
           </a:xfrm>
           <a:prstGeom prst="straightConnector1">
@@ -4313,7 +4325,7 @@
         </p:nvCxnSpPr>
         <p:spPr>
           <a:xfrm>
-            <a:off x="4809989" y="4526065"/>
+            <a:off x="4840111" y="4738150"/>
             <a:ext cx="409469" cy="0"/>
           </a:xfrm>
           <a:prstGeom prst="straightConnector1">
@@ -4351,7 +4363,7 @@
         </p:nvCxnSpPr>
         <p:spPr>
           <a:xfrm>
-            <a:off x="1691296" y="3920440"/>
+            <a:off x="1721417" y="4132525"/>
             <a:ext cx="373552" cy="0"/>
           </a:xfrm>
           <a:prstGeom prst="straightConnector1">
@@ -4389,7 +4401,7 @@
         </p:nvSpPr>
         <p:spPr>
           <a:xfrm>
-            <a:off x="2258278" y="5140408"/>
+            <a:off x="2288398" y="5352493"/>
             <a:ext cx="1408598" cy="346760"/>
           </a:xfrm>
           <a:prstGeom prst="rect">
@@ -4418,14 +4430,14 @@
           <a:p>
             <a:pPr algn="ctr"/>
             <a:r>
-              <a:rPr lang="en-US" sz="1050" dirty="0" smtClean="0"/>
+              <a:rPr lang="en-US" sz="1050" dirty="0"/>
               <a:t>&lt;&lt;interface&gt;&gt;</a:t>
             </a:r>
           </a:p>
           <a:p>
             <a:pPr algn="ctr"/>
             <a:r>
-              <a:rPr lang="en-US" sz="1050" dirty="0" err="1" smtClean="0"/>
+              <a:rPr lang="en-US" sz="1050" dirty="0" err="1"/>
               <a:t>ReadOnlyPerson</a:t>
             </a:r>
             <a:endParaRPr lang="en-SG" sz="1050" dirty="0"/>
@@ -4443,7 +4455,7 @@
         </p:nvCxnSpPr>
         <p:spPr>
           <a:xfrm flipV="1">
-            <a:off x="1691295" y="5313788"/>
+            <a:off x="1721416" y="5525874"/>
             <a:ext cx="566983" cy="1232"/>
           </a:xfrm>
           <a:prstGeom prst="bentConnector3">
@@ -4484,7 +4496,7 @@
         </p:nvSpPr>
         <p:spPr>
           <a:xfrm rot="16200000">
-            <a:off x="3619386" y="5226026"/>
+            <a:off x="3649506" y="5438113"/>
             <a:ext cx="270504" cy="175523"/>
           </a:xfrm>
           <a:prstGeom prst="triangle">
@@ -4527,7 +4539,7 @@
         </p:nvCxnSpPr>
         <p:spPr>
           <a:xfrm rot="5400000">
-            <a:off x="4456082" y="4085763"/>
+            <a:off x="4486204" y="4297849"/>
             <a:ext cx="614343" cy="1841706"/>
           </a:xfrm>
           <a:prstGeom prst="bentConnector2">
@@ -4563,7 +4575,7 @@
         </p:nvSpPr>
         <p:spPr>
           <a:xfrm>
-            <a:off x="2566828" y="1356188"/>
+            <a:off x="2596949" y="1568273"/>
             <a:ext cx="1611867" cy="444640"/>
           </a:xfrm>
           <a:prstGeom prst="rect">
@@ -4614,7 +4626,7 @@
         </p:nvSpPr>
         <p:spPr>
           <a:xfrm flipH="1">
-            <a:off x="4724400" y="1059080"/>
+            <a:off x="4754522" y="1271165"/>
             <a:ext cx="1404109" cy="346760"/>
           </a:xfrm>
           <a:prstGeom prst="rect">
@@ -4658,7 +4670,7 @@
         </p:nvSpPr>
         <p:spPr>
           <a:xfrm flipH="1">
-            <a:off x="4724400" y="1454067"/>
+            <a:off x="4754522" y="1666152"/>
             <a:ext cx="1404109" cy="346760"/>
           </a:xfrm>
           <a:prstGeom prst="rect">
@@ -4702,7 +4714,7 @@
         </p:nvSpPr>
         <p:spPr>
           <a:xfrm flipH="1">
-            <a:off x="4724400" y="1849054"/>
+            <a:off x="4754522" y="2061139"/>
             <a:ext cx="1404109" cy="346760"/>
           </a:xfrm>
           <a:prstGeom prst="rect">
@@ -4746,7 +4758,7 @@
         </p:nvSpPr>
         <p:spPr>
           <a:xfrm rot="16200000">
-            <a:off x="4131203" y="1571491"/>
+            <a:off x="4161323" y="1783578"/>
             <a:ext cx="270504" cy="175523"/>
           </a:xfrm>
           <a:prstGeom prst="triangle">
@@ -4789,7 +4801,7 @@
         </p:nvCxnSpPr>
         <p:spPr>
           <a:xfrm flipV="1">
-            <a:off x="4354217" y="1627447"/>
+            <a:off x="4384338" y="1839532"/>
             <a:ext cx="370183" cy="31806"/>
           </a:xfrm>
           <a:prstGeom prst="bentConnector3">
@@ -4827,7 +4839,7 @@
         </p:nvCxnSpPr>
         <p:spPr>
           <a:xfrm flipV="1">
-            <a:off x="4354217" y="1232460"/>
+            <a:off x="4384338" y="1444547"/>
             <a:ext cx="370183" cy="426793"/>
           </a:xfrm>
           <a:prstGeom prst="bentConnector3">
@@ -4865,7 +4877,7 @@
         </p:nvCxnSpPr>
         <p:spPr>
           <a:xfrm>
-            <a:off x="4354217" y="1659253"/>
+            <a:off x="4384338" y="1871340"/>
             <a:ext cx="370183" cy="363181"/>
           </a:xfrm>
           <a:prstGeom prst="bentConnector3">
@@ -4900,7 +4912,7 @@
         </p:nvSpPr>
         <p:spPr>
           <a:xfrm flipH="1">
-            <a:off x="4724400" y="2244040"/>
+            <a:off x="4754522" y="2456125"/>
             <a:ext cx="1404109" cy="346760"/>
           </a:xfrm>
           <a:prstGeom prst="rect">
@@ -4929,7 +4941,7 @@
           <a:p>
             <a:pPr algn="ctr"/>
             <a:r>
-              <a:rPr lang="en-US" sz="1050" dirty="0" smtClean="0"/>
+              <a:rPr lang="en-US" sz="1050" dirty="0"/>
               <a:t>…Command</a:t>
             </a:r>
             <a:endParaRPr lang="en-SG" sz="1050" dirty="0"/>
@@ -4947,7 +4959,7 @@
         </p:nvCxnSpPr>
         <p:spPr>
           <a:xfrm>
-            <a:off x="4354217" y="1659253"/>
+            <a:off x="4384338" y="1871340"/>
             <a:ext cx="370183" cy="758167"/>
           </a:xfrm>
           <a:prstGeom prst="bentConnector3">
@@ -4985,7 +4997,7 @@
         </p:nvCxnSpPr>
         <p:spPr>
           <a:xfrm rot="5400000" flipH="1" flipV="1">
-            <a:off x="1452229" y="1891441"/>
+            <a:off x="1482349" y="2103526"/>
             <a:ext cx="1427532" cy="801666"/>
           </a:xfrm>
           <a:prstGeom prst="bentConnector2">
@@ -5021,7 +5033,7 @@
         </p:nvCxnSpPr>
         <p:spPr>
           <a:xfrm rot="5400000" flipH="1" flipV="1">
-            <a:off x="632132" y="1812364"/>
+            <a:off x="662252" y="2024451"/>
             <a:ext cx="2293164" cy="1576229"/>
           </a:xfrm>
           <a:prstGeom prst="bentConnector3">
@@ -5062,7 +5074,7 @@
         </p:nvCxnSpPr>
         <p:spPr>
           <a:xfrm rot="5400000">
-            <a:off x="1795164" y="2790743"/>
+            <a:off x="1825284" y="3002828"/>
             <a:ext cx="1889726" cy="6348"/>
           </a:xfrm>
           <a:prstGeom prst="bentConnector3">
@@ -5103,7 +5115,7 @@
         </p:nvSpPr>
         <p:spPr>
           <a:xfrm flipH="1">
-            <a:off x="1219200" y="720040"/>
+            <a:off x="1249322" y="932125"/>
             <a:ext cx="1404109" cy="346760"/>
           </a:xfrm>
           <a:prstGeom prst="rect">
@@ -5150,7 +5162,7 @@
         </p:nvCxnSpPr>
         <p:spPr>
           <a:xfrm rot="16200000" flipV="1">
-            <a:off x="2766652" y="750077"/>
+            <a:off x="2796772" y="962164"/>
             <a:ext cx="462768" cy="749453"/>
           </a:xfrm>
           <a:prstGeom prst="bentConnector2">
@@ -5191,7 +5203,7 @@
         </p:nvCxnSpPr>
         <p:spPr>
           <a:xfrm rot="5400000" flipH="1" flipV="1">
-            <a:off x="-394396" y="2133468"/>
+            <a:off x="-364275" y="2345554"/>
             <a:ext cx="2853643" cy="373549"/>
           </a:xfrm>
           <a:prstGeom prst="bentConnector2">
@@ -5230,7 +5242,7 @@
         </p:nvSpPr>
         <p:spPr>
           <a:xfrm>
-            <a:off x="6781800" y="3539440"/>
+            <a:off x="6811920" y="3751525"/>
             <a:ext cx="929296" cy="346760"/>
           </a:xfrm>
           <a:prstGeom prst="rect">
@@ -5277,7 +5289,7 @@
         </p:nvCxnSpPr>
         <p:spPr>
           <a:xfrm flipV="1">
-            <a:off x="6384802" y="3712820"/>
+            <a:off x="6414923" y="3924907"/>
             <a:ext cx="396998" cy="809271"/>
           </a:xfrm>
           <a:prstGeom prst="bentConnector3">
@@ -5314,7 +5326,7 @@
         </p:nvSpPr>
         <p:spPr>
           <a:xfrm>
-            <a:off x="6384802" y="874142"/>
+            <a:off x="6414922" y="1086227"/>
             <a:ext cx="929296" cy="346760"/>
           </a:xfrm>
           <a:prstGeom prst="rect">
@@ -5343,7 +5355,7 @@
           <a:p>
             <a:pPr algn="ctr"/>
             <a:r>
-              <a:rPr lang="en-US" sz="1050" dirty="0" smtClean="0"/>
+              <a:rPr lang="en-US" sz="1050" dirty="0"/>
               <a:t>Messages</a:t>
             </a:r>
             <a:endParaRPr lang="en-SG" sz="1050" dirty="0"/>
@@ -5358,7 +5370,7 @@
         </p:nvSpPr>
         <p:spPr>
           <a:xfrm>
-            <a:off x="7592520" y="874142"/>
+            <a:off x="7622640" y="1086227"/>
             <a:ext cx="929296" cy="346760"/>
           </a:xfrm>
           <a:prstGeom prst="rect">
@@ -5387,7 +5399,7 @@
           <a:p>
             <a:pPr algn="ctr"/>
             <a:r>
-              <a:rPr lang="en-US" sz="1050" dirty="0" err="1" smtClean="0"/>
+              <a:rPr lang="en-US" sz="1050" dirty="0" err="1"/>
               <a:t>Utils</a:t>
             </a:r>
             <a:endParaRPr lang="en-SG" sz="1050" dirty="0"/>
@@ -5402,7 +5414,7 @@
         </p:nvSpPr>
         <p:spPr>
           <a:xfrm>
-            <a:off x="3666876" y="3710497"/>
+            <a:off x="3696996" y="3922582"/>
             <a:ext cx="929296" cy="346760"/>
           </a:xfrm>
           <a:prstGeom prst="rect">
@@ -5446,7 +5458,7 @@
         </p:nvSpPr>
         <p:spPr>
           <a:xfrm>
-            <a:off x="2356763" y="4455640"/>
+            <a:off x="2386883" y="4667725"/>
             <a:ext cx="929296" cy="346760"/>
           </a:xfrm>
           <a:prstGeom prst="rect">
@@ -5475,7 +5487,7 @@
           <a:p>
             <a:pPr algn="ctr"/>
             <a:r>
-              <a:rPr lang="en-US" sz="1050" dirty="0" smtClean="0"/>
+              <a:rPr lang="en-US" sz="1050" dirty="0"/>
               <a:t>Adapted…</a:t>
             </a:r>
             <a:endParaRPr lang="en-SG" sz="1050" dirty="0"/>
@@ -5493,7 +5505,7 @@
         </p:nvCxnSpPr>
         <p:spPr>
           <a:xfrm flipV="1">
-            <a:off x="2082523" y="4629020"/>
+            <a:off x="2112643" y="4841107"/>
             <a:ext cx="274240" cy="4831"/>
           </a:xfrm>
           <a:prstGeom prst="bentConnector3">
@@ -5534,7 +5546,7 @@
         </p:nvCxnSpPr>
         <p:spPr>
           <a:xfrm flipV="1">
-            <a:off x="6689603" y="1199445"/>
+            <a:off x="6719723" y="1411530"/>
             <a:ext cx="0" cy="304800"/>
           </a:xfrm>
           <a:prstGeom prst="straightConnector1">
@@ -5573,7 +5585,7 @@
         </p:nvCxnSpPr>
         <p:spPr>
           <a:xfrm flipV="1">
-            <a:off x="6842003" y="1199445"/>
+            <a:off x="6872123" y="1411530"/>
             <a:ext cx="0" cy="304800"/>
           </a:xfrm>
           <a:prstGeom prst="straightConnector1">
@@ -5612,7 +5624,7 @@
         </p:nvCxnSpPr>
         <p:spPr>
           <a:xfrm flipV="1">
-            <a:off x="6994403" y="1199445"/>
+            <a:off x="7024523" y="1411530"/>
             <a:ext cx="0" cy="304800"/>
           </a:xfrm>
           <a:prstGeom prst="straightConnector1">
@@ -5651,7 +5663,7 @@
         </p:nvCxnSpPr>
         <p:spPr>
           <a:xfrm flipV="1">
-            <a:off x="7864446" y="1199445"/>
+            <a:off x="7894566" y="1411530"/>
             <a:ext cx="0" cy="304800"/>
           </a:xfrm>
           <a:prstGeom prst="straightConnector1">
@@ -5690,7 +5702,7 @@
         </p:nvCxnSpPr>
         <p:spPr>
           <a:xfrm flipV="1">
-            <a:off x="8016846" y="1199445"/>
+            <a:off x="8046966" y="1411530"/>
             <a:ext cx="0" cy="304800"/>
           </a:xfrm>
           <a:prstGeom prst="straightConnector1">
@@ -5729,7 +5741,7 @@
         </p:nvCxnSpPr>
         <p:spPr>
           <a:xfrm flipV="1">
-            <a:off x="8169246" y="1199445"/>
+            <a:off x="8199366" y="1411530"/>
             <a:ext cx="0" cy="304800"/>
           </a:xfrm>
           <a:prstGeom prst="straightConnector1">
@@ -5760,6 +5772,330 @@
           </a:fontRef>
         </p:style>
       </p:cxnSp>
+      <p:sp>
+        <p:nvSpPr>
+          <p:cNvPr id="63" name="Rectangle 6"/>
+          <p:cNvSpPr/>
+          <p:nvPr/>
+        </p:nvSpPr>
+        <p:spPr>
+          <a:xfrm>
+            <a:off x="8447881" y="4267200"/>
+            <a:ext cx="1868998" cy="327923"/>
+          </a:xfrm>
+          <a:prstGeom prst="rect">
+            <a:avLst/>
+          </a:prstGeom>
+          <a:ln w="19050"/>
+          <a:effectLst/>
+        </p:spPr>
+        <p:style>
+          <a:lnRef idx="1">
+            <a:schemeClr val="accent4"/>
+          </a:lnRef>
+          <a:fillRef idx="2">
+            <a:schemeClr val="accent4"/>
+          </a:fillRef>
+          <a:effectRef idx="1">
+            <a:schemeClr val="accent4"/>
+          </a:effectRef>
+          <a:fontRef idx="minor">
+            <a:schemeClr val="dk1"/>
+          </a:fontRef>
+        </p:style>
+        <p:txBody>
+          <a:bodyPr rtlCol="0" anchor="ctr"/>
+          <a:lstStyle/>
+          <a:p>
+            <a:pPr algn="ctr"/>
+            <a:r>
+              <a:rPr lang="en-SG" sz="1050" dirty="0"/>
+              <a:t>&lt;&lt;interface&gt;&gt; Printable</a:t>
+            </a:r>
+            <a:endParaRPr lang="en-SG" sz="1050" dirty="0"/>
+          </a:p>
+        </p:txBody>
+      </p:sp>
+      <p:sp>
+        <p:nvSpPr>
+          <p:cNvPr id="64" name="Isosceles Triangle 24"/>
+          <p:cNvSpPr/>
+          <p:nvPr/>
+        </p:nvSpPr>
+        <p:spPr>
+          <a:xfrm rot="5400000">
+            <a:off x="8211988" y="4396559"/>
+            <a:ext cx="270504" cy="175523"/>
+          </a:xfrm>
+          <a:prstGeom prst="triangle">
+            <a:avLst/>
+          </a:prstGeom>
+          <a:ln w="19050"/>
+          <a:effectLst/>
+        </p:spPr>
+        <p:style>
+          <a:lnRef idx="1">
+            <a:schemeClr val="accent4"/>
+          </a:lnRef>
+          <a:fillRef idx="2">
+            <a:schemeClr val="accent4"/>
+          </a:fillRef>
+          <a:effectRef idx="1">
+            <a:schemeClr val="accent4"/>
+          </a:effectRef>
+          <a:fontRef idx="minor">
+            <a:schemeClr val="dk1"/>
+          </a:fontRef>
+        </p:style>
+        <p:txBody>
+          <a:bodyPr rtlCol="0" anchor="ctr"/>
+          <a:lstStyle/>
+          <a:p>
+            <a:pPr algn="ctr"/>
+            <a:endParaRPr lang="en-SG" sz="1050"/>
+          </a:p>
+        </p:txBody>
+      </p:sp>
+      <p:cxnSp>
+        <p:nvCxnSpPr>
+          <p:cNvPr id="66" name="Elbow Connector 25"/>
+          <p:cNvCxnSpPr>
+            <a:endCxn id="21" idx="3"/>
+          </p:cNvCxnSpPr>
+          <p:nvPr/>
+        </p:nvCxnSpPr>
+        <p:spPr>
+          <a:xfrm rot="10800000" flipV="1">
+            <a:off x="7755873" y="4484319"/>
+            <a:ext cx="503611" cy="396947"/>
+          </a:xfrm>
+          <a:prstGeom prst="bentConnector3">
+            <a:avLst>
+              <a:gd name="adj1" fmla="val 50000"/>
+            </a:avLst>
+          </a:prstGeom>
+          <a:ln w="19050">
+            <a:prstDash val="dash"/>
+          </a:ln>
+          <a:effectLst/>
+        </p:spPr>
+        <p:style>
+          <a:lnRef idx="1">
+            <a:schemeClr val="accent4"/>
+          </a:lnRef>
+          <a:fillRef idx="2">
+            <a:schemeClr val="accent4"/>
+          </a:fillRef>
+          <a:effectRef idx="1">
+            <a:schemeClr val="accent4"/>
+          </a:effectRef>
+          <a:fontRef idx="minor">
+            <a:schemeClr val="dk1"/>
+          </a:fontRef>
+        </p:style>
+      </p:cxnSp>
+      <p:cxnSp>
+        <p:nvCxnSpPr>
+          <p:cNvPr id="69" name="Elbow Connector 26"/>
+          <p:cNvCxnSpPr>
+            <a:endCxn id="20" idx="3"/>
+          </p:cNvCxnSpPr>
+          <p:nvPr/>
+        </p:nvCxnSpPr>
+        <p:spPr>
+          <a:xfrm rot="10800000">
+            <a:off x="7741219" y="4421744"/>
+            <a:ext cx="518265" cy="62577"/>
+          </a:xfrm>
+          <a:prstGeom prst="bentConnector3">
+            <a:avLst>
+              <a:gd name="adj1" fmla="val 50000"/>
+            </a:avLst>
+          </a:prstGeom>
+          <a:ln w="19050">
+            <a:prstDash val="dash"/>
+          </a:ln>
+          <a:effectLst/>
+        </p:spPr>
+        <p:style>
+          <a:lnRef idx="1">
+            <a:schemeClr val="accent4"/>
+          </a:lnRef>
+          <a:fillRef idx="2">
+            <a:schemeClr val="accent4"/>
+          </a:fillRef>
+          <a:effectRef idx="1">
+            <a:schemeClr val="accent4"/>
+          </a:effectRef>
+          <a:fontRef idx="minor">
+            <a:schemeClr val="dk1"/>
+          </a:fontRef>
+        </p:style>
+      </p:cxnSp>
+      <p:cxnSp>
+        <p:nvCxnSpPr>
+          <p:cNvPr id="72" name="Elbow Connector 29"/>
+          <p:cNvCxnSpPr/>
+          <p:nvPr/>
+        </p:nvCxnSpPr>
+        <p:spPr>
+          <a:xfrm rot="5400000">
+            <a:off x="7664642" y="5002758"/>
+            <a:ext cx="426936" cy="244478"/>
+          </a:xfrm>
+          <a:prstGeom prst="bentConnector3">
+            <a:avLst>
+              <a:gd name="adj1" fmla="val 103544"/>
+            </a:avLst>
+          </a:prstGeom>
+          <a:ln w="19050">
+            <a:prstDash val="dash"/>
+          </a:ln>
+          <a:effectLst/>
+        </p:spPr>
+        <p:style>
+          <a:lnRef idx="1">
+            <a:schemeClr val="accent4"/>
+          </a:lnRef>
+          <a:fillRef idx="2">
+            <a:schemeClr val="accent4"/>
+          </a:fillRef>
+          <a:effectRef idx="1">
+            <a:schemeClr val="accent4"/>
+          </a:effectRef>
+          <a:fontRef idx="minor">
+            <a:schemeClr val="dk1"/>
+          </a:fontRef>
+        </p:style>
+      </p:cxnSp>
+      <p:cxnSp>
+        <p:nvCxnSpPr>
+          <p:cNvPr id="74" name="Elbow Connector 26"/>
+          <p:cNvCxnSpPr/>
+          <p:nvPr/>
+        </p:nvCxnSpPr>
+        <p:spPr>
+          <a:xfrm rot="10800000">
+            <a:off x="7726322" y="3915955"/>
+            <a:ext cx="533159" cy="568367"/>
+          </a:xfrm>
+          <a:prstGeom prst="bentConnector3">
+            <a:avLst>
+              <a:gd name="adj1" fmla="val 50000"/>
+            </a:avLst>
+          </a:prstGeom>
+          <a:ln w="19050">
+            <a:prstDash val="dash"/>
+          </a:ln>
+          <a:effectLst/>
+        </p:spPr>
+        <p:style>
+          <a:lnRef idx="1">
+            <a:schemeClr val="accent4"/>
+          </a:lnRef>
+          <a:fillRef idx="2">
+            <a:schemeClr val="accent4"/>
+          </a:fillRef>
+          <a:effectRef idx="1">
+            <a:schemeClr val="accent4"/>
+          </a:effectRef>
+          <a:fontRef idx="minor">
+            <a:schemeClr val="dk1"/>
+          </a:fontRef>
+        </p:style>
+      </p:cxnSp>
+      <p:sp>
+        <p:nvSpPr>
+          <p:cNvPr id="75" name="Rectangle 6"/>
+          <p:cNvSpPr/>
+          <p:nvPr/>
+        </p:nvSpPr>
+        <p:spPr>
+          <a:xfrm>
+            <a:off x="8447881" y="4595026"/>
+            <a:ext cx="1868998" cy="122745"/>
+          </a:xfrm>
+          <a:prstGeom prst="rect">
+            <a:avLst/>
+          </a:prstGeom>
+          <a:ln w="19050"/>
+          <a:effectLst/>
+        </p:spPr>
+        <p:style>
+          <a:lnRef idx="1">
+            <a:schemeClr val="accent4"/>
+          </a:lnRef>
+          <a:fillRef idx="2">
+            <a:schemeClr val="accent4"/>
+          </a:fillRef>
+          <a:effectRef idx="1">
+            <a:schemeClr val="accent4"/>
+          </a:effectRef>
+          <a:fontRef idx="minor">
+            <a:schemeClr val="dk1"/>
+          </a:fontRef>
+        </p:style>
+        <p:txBody>
+          <a:bodyPr rtlCol="0" anchor="ctr"/>
+          <a:lstStyle/>
+          <a:p>
+            <a:pPr algn="ctr"/>
+            <a:endParaRPr lang="en-SG" sz="1050" dirty="0"/>
+          </a:p>
+        </p:txBody>
+      </p:sp>
+      <p:sp>
+        <p:nvSpPr>
+          <p:cNvPr id="76" name="Rectangle 6"/>
+          <p:cNvSpPr/>
+          <p:nvPr/>
+        </p:nvSpPr>
+        <p:spPr>
+          <a:xfrm>
+            <a:off x="8447881" y="4713418"/>
+            <a:ext cx="1868998" cy="271943"/>
+          </a:xfrm>
+          <a:prstGeom prst="rect">
+            <a:avLst/>
+          </a:prstGeom>
+          <a:ln w="19050"/>
+          <a:effectLst/>
+        </p:spPr>
+        <p:style>
+          <a:lnRef idx="1">
+            <a:schemeClr val="accent4"/>
+          </a:lnRef>
+          <a:fillRef idx="2">
+            <a:schemeClr val="accent4"/>
+          </a:fillRef>
+          <a:effectRef idx="1">
+            <a:schemeClr val="accent4"/>
+          </a:effectRef>
+          <a:fontRef idx="minor">
+            <a:schemeClr val="dk1"/>
+          </a:fontRef>
+        </p:style>
+        <p:txBody>
+          <a:bodyPr rtlCol="0" anchor="ctr"/>
+          <a:lstStyle/>
+          <a:p>
+            <a:pPr algn="ctr"/>
+            <a:r>
+              <a:rPr lang="en-US" sz="1050" dirty="0"/>
+              <a:t>+ </a:t>
+            </a:r>
+            <a:r>
+              <a:rPr lang="en-US" sz="1050" dirty="0" err="1"/>
+              <a:t>getPrintableString</a:t>
+            </a:r>
+            <a:r>
+              <a:rPr lang="en-US" sz="1050" dirty="0"/>
+              <a:t>(): String</a:t>
+            </a:r>
+            <a:endParaRPr lang="en-SG" sz="1050" dirty="0"/>
+          </a:p>
+        </p:txBody>
+      </p:sp>
     </p:spTree>
     <p:extLst>
       <p:ext uri="{BB962C8B-B14F-4D97-AF65-F5344CB8AC3E}">
@@ -5798,7 +6134,7 @@
         </p:nvSpPr>
         <p:spPr>
           <a:xfrm>
-            <a:off x="1009446" y="3810000"/>
+            <a:off x="1837327" y="3810000"/>
             <a:ext cx="929296" cy="346760"/>
           </a:xfrm>
           <a:prstGeom prst="rect">
@@ -5827,7 +6163,7 @@
           <a:p>
             <a:pPr algn="ctr"/>
             <a:r>
-              <a:rPr lang="en-US" sz="1050" dirty="0" smtClean="0"/>
+              <a:rPr lang="en-US" sz="1050" dirty="0"/>
               <a:t>Address</a:t>
             </a:r>
             <a:endParaRPr lang="en-SG" sz="1050" dirty="0"/>
@@ -5842,7 +6178,7 @@
         </p:nvSpPr>
         <p:spPr>
           <a:xfrm>
-            <a:off x="2600202" y="4414289"/>
+            <a:off x="3428083" y="4414289"/>
             <a:ext cx="929296" cy="346760"/>
           </a:xfrm>
           <a:prstGeom prst="rect">
@@ -5871,7 +6207,7 @@
           <a:p>
             <a:pPr algn="ctr"/>
             <a:r>
-              <a:rPr lang="en-US" sz="1050" dirty="0" smtClean="0"/>
+              <a:rPr lang="en-US" sz="1050" dirty="0"/>
               <a:t>Unit</a:t>
             </a:r>
             <a:endParaRPr lang="en-SG" sz="1050" dirty="0"/>
@@ -5889,7 +6225,7 @@
         </p:nvCxnSpPr>
         <p:spPr>
           <a:xfrm>
-            <a:off x="2188550" y="3983380"/>
+            <a:off x="3016431" y="3983382"/>
             <a:ext cx="411652" cy="604289"/>
           </a:xfrm>
           <a:prstGeom prst="bentConnector3">
@@ -5926,7 +6262,7 @@
         </p:nvSpPr>
         <p:spPr>
           <a:xfrm>
-            <a:off x="1952502" y="3896690"/>
+            <a:off x="2780384" y="3896691"/>
             <a:ext cx="236048" cy="173380"/>
           </a:xfrm>
           <a:prstGeom prst="flowChartDecision">
@@ -5969,7 +6305,7 @@
         </p:nvSpPr>
         <p:spPr>
           <a:xfrm>
-            <a:off x="2600202" y="4913449"/>
+            <a:off x="3428083" y="4913449"/>
             <a:ext cx="929296" cy="346760"/>
           </a:xfrm>
           <a:prstGeom prst="rect">
@@ -5998,7 +6334,7 @@
           <a:p>
             <a:pPr algn="ctr"/>
             <a:r>
-              <a:rPr lang="en-US" sz="1050" dirty="0" smtClean="0"/>
+              <a:rPr lang="en-US" sz="1050" dirty="0"/>
               <a:t>Postal code</a:t>
             </a:r>
             <a:endParaRPr lang="en-SG" sz="1050" dirty="0"/>
@@ -6013,7 +6349,7 @@
         </p:nvSpPr>
         <p:spPr>
           <a:xfrm>
-            <a:off x="2600202" y="3896690"/>
+            <a:off x="3428083" y="3896690"/>
             <a:ext cx="929296" cy="346760"/>
           </a:xfrm>
           <a:prstGeom prst="rect">
@@ -6042,7 +6378,7 @@
           <a:p>
             <a:pPr algn="ctr"/>
             <a:r>
-              <a:rPr lang="en-US" sz="1050" dirty="0" smtClean="0"/>
+              <a:rPr lang="en-US" sz="1050" dirty="0"/>
               <a:t>Street</a:t>
             </a:r>
             <a:endParaRPr lang="en-SG" sz="1050" dirty="0"/>
@@ -6057,7 +6393,7 @@
         </p:nvSpPr>
         <p:spPr>
           <a:xfrm>
-            <a:off x="2600202" y="3352800"/>
+            <a:off x="3428083" y="3352800"/>
             <a:ext cx="929296" cy="346760"/>
           </a:xfrm>
           <a:prstGeom prst="rect">
@@ -6086,7 +6422,7 @@
           <a:p>
             <a:pPr algn="ctr"/>
             <a:r>
-              <a:rPr lang="en-US" sz="1050" dirty="0" smtClean="0"/>
+              <a:rPr lang="en-US" sz="1050" dirty="0"/>
               <a:t>Block</a:t>
             </a:r>
             <a:endParaRPr lang="en-SG" sz="1050" dirty="0"/>
@@ -6104,7 +6440,7 @@
         </p:nvCxnSpPr>
         <p:spPr>
           <a:xfrm flipV="1">
-            <a:off x="2188550" y="3526180"/>
+            <a:off x="3016431" y="3526180"/>
             <a:ext cx="411652" cy="457200"/>
           </a:xfrm>
           <a:prstGeom prst="bentConnector3">
@@ -6144,7 +6480,7 @@
         </p:nvCxnSpPr>
         <p:spPr>
           <a:xfrm>
-            <a:off x="2188550" y="3983380"/>
+            <a:off x="3016431" y="3983381"/>
             <a:ext cx="411652" cy="1103449"/>
           </a:xfrm>
           <a:prstGeom prst="bentConnector3">
@@ -6184,7 +6520,7 @@
         </p:nvCxnSpPr>
         <p:spPr>
           <a:xfrm>
-            <a:off x="2188550" y="3983380"/>
+            <a:off x="3016431" y="3983380"/>
             <a:ext cx="411652" cy="86690"/>
           </a:xfrm>
           <a:prstGeom prst="bentConnector3">
@@ -6221,7 +6557,7 @@
         </p:nvSpPr>
         <p:spPr>
           <a:xfrm>
-            <a:off x="7376135" y="1180514"/>
+            <a:off x="8204016" y="1180516"/>
             <a:ext cx="929296" cy="342611"/>
           </a:xfrm>
           <a:prstGeom prst="rect">
@@ -6250,7 +6586,7 @@
           <a:p>
             <a:pPr algn="ctr"/>
             <a:r>
-              <a:rPr lang="en-SG" sz="1050" dirty="0" smtClean="0"/>
+              <a:rPr lang="en-SG" sz="1050" dirty="0"/>
               <a:t>Contact</a:t>
             </a:r>
             <a:endParaRPr lang="en-SG" sz="1050" dirty="0"/>
@@ -6265,7 +6601,7 @@
         </p:nvSpPr>
         <p:spPr>
           <a:xfrm>
-            <a:off x="6248400" y="1739820"/>
+            <a:off x="7076281" y="1739820"/>
             <a:ext cx="929296" cy="346760"/>
           </a:xfrm>
           <a:prstGeom prst="rect">
@@ -6294,7 +6630,7 @@
           <a:p>
             <a:pPr algn="ctr"/>
             <a:r>
-              <a:rPr lang="en-US" sz="1050" dirty="0" smtClean="0"/>
+              <a:rPr lang="en-US" sz="1050" dirty="0"/>
               <a:t>Phone</a:t>
             </a:r>
             <a:endParaRPr lang="en-SG" sz="1050" dirty="0"/>
@@ -6309,7 +6645,7 @@
         </p:nvSpPr>
         <p:spPr>
           <a:xfrm>
-            <a:off x="6263054" y="2199343"/>
+            <a:off x="7090935" y="2199343"/>
             <a:ext cx="929296" cy="346760"/>
           </a:xfrm>
           <a:prstGeom prst="rect">
@@ -6338,7 +6674,7 @@
           <a:p>
             <a:pPr algn="ctr"/>
             <a:r>
-              <a:rPr lang="en-US" sz="1050" dirty="0" smtClean="0"/>
+              <a:rPr lang="en-US" sz="1050" dirty="0"/>
               <a:t>Email</a:t>
             </a:r>
             <a:endParaRPr lang="en-SG" sz="1050" dirty="0"/>
@@ -6353,7 +6689,7 @@
         </p:nvSpPr>
         <p:spPr>
           <a:xfrm>
-            <a:off x="6263054" y="2656543"/>
+            <a:off x="7090935" y="2656543"/>
             <a:ext cx="929296" cy="346760"/>
           </a:xfrm>
           <a:prstGeom prst="rect">
@@ -6382,7 +6718,7 @@
           <a:p>
             <a:pPr algn="ctr"/>
             <a:r>
-              <a:rPr lang="en-US" sz="1050" dirty="0" smtClean="0"/>
+              <a:rPr lang="en-US" sz="1050" dirty="0"/>
               <a:t>Address</a:t>
             </a:r>
             <a:endParaRPr lang="en-SG" sz="1050" dirty="0"/>
@@ -6397,7 +6733,7 @@
         </p:nvSpPr>
         <p:spPr>
           <a:xfrm>
-            <a:off x="7717912" y="1524660"/>
+            <a:off x="8545793" y="1524662"/>
             <a:ext cx="270504" cy="175523"/>
           </a:xfrm>
           <a:prstGeom prst="triangle">
@@ -6440,7 +6776,7 @@
         </p:nvCxnSpPr>
         <p:spPr>
           <a:xfrm rot="5400000">
-            <a:off x="7186487" y="1706046"/>
+            <a:off x="8014368" y="1706046"/>
             <a:ext cx="672540" cy="660814"/>
           </a:xfrm>
           <a:prstGeom prst="bentConnector2">
@@ -6475,7 +6811,7 @@
         </p:nvCxnSpPr>
         <p:spPr>
           <a:xfrm rot="5400000">
-            <a:off x="7408922" y="1468957"/>
+            <a:off x="8236805" y="1468958"/>
             <a:ext cx="213017" cy="675468"/>
           </a:xfrm>
           <a:prstGeom prst="bentConnector2">
@@ -6510,7 +6846,7 @@
         </p:nvCxnSpPr>
         <p:spPr>
           <a:xfrm rot="5400000">
-            <a:off x="6957887" y="1934646"/>
+            <a:off x="7785768" y="1934646"/>
             <a:ext cx="1129740" cy="660814"/>
           </a:xfrm>
           <a:prstGeom prst="bentConnector2">
@@ -6542,7 +6878,7 @@
         </p:nvSpPr>
         <p:spPr>
           <a:xfrm>
-            <a:off x="6132002" y="4597467"/>
+            <a:off x="6959884" y="4597468"/>
             <a:ext cx="1868998" cy="327923"/>
           </a:xfrm>
           <a:prstGeom prst="rect">
@@ -6571,7 +6907,7 @@
           <a:p>
             <a:pPr algn="ctr"/>
             <a:r>
-              <a:rPr lang="en-SG" sz="1050" dirty="0" smtClean="0"/>
+              <a:rPr lang="en-SG" sz="1050" dirty="0"/>
               <a:t>&lt;&lt;interface&gt;&gt; Printable</a:t>
             </a:r>
             <a:endParaRPr lang="en-SG" sz="1050" dirty="0"/>
@@ -6586,7 +6922,7 @@
         </p:nvSpPr>
         <p:spPr>
           <a:xfrm>
-            <a:off x="4481146" y="4467827"/>
+            <a:off x="5309027" y="4467827"/>
             <a:ext cx="929296" cy="346760"/>
           </a:xfrm>
           <a:prstGeom prst="rect">
@@ -6615,7 +6951,7 @@
           <a:p>
             <a:pPr algn="ctr"/>
             <a:r>
-              <a:rPr lang="en-US" sz="1050" dirty="0" smtClean="0"/>
+              <a:rPr lang="en-US" sz="1050" dirty="0"/>
               <a:t>Phone</a:t>
             </a:r>
             <a:endParaRPr lang="en-SG" sz="1050" dirty="0"/>
@@ -6630,7 +6966,7 @@
         </p:nvSpPr>
         <p:spPr>
           <a:xfrm>
-            <a:off x="4481146" y="4862814"/>
+            <a:off x="5309027" y="4862814"/>
             <a:ext cx="929296" cy="346760"/>
           </a:xfrm>
           <a:prstGeom prst="rect">
@@ -6659,7 +6995,7 @@
           <a:p>
             <a:pPr algn="ctr"/>
             <a:r>
-              <a:rPr lang="en-US" sz="1050" dirty="0" smtClean="0"/>
+              <a:rPr lang="en-US" sz="1050" dirty="0"/>
               <a:t>Email</a:t>
             </a:r>
             <a:endParaRPr lang="en-SG" sz="1050" dirty="0"/>
@@ -6674,7 +7010,7 @@
         </p:nvSpPr>
         <p:spPr>
           <a:xfrm>
-            <a:off x="4481146" y="5257800"/>
+            <a:off x="5309027" y="5257800"/>
             <a:ext cx="929296" cy="346760"/>
           </a:xfrm>
           <a:prstGeom prst="rect">
@@ -6703,7 +7039,7 @@
           <a:p>
             <a:pPr algn="ctr"/>
             <a:r>
-              <a:rPr lang="en-US" sz="1050" dirty="0" smtClean="0"/>
+              <a:rPr lang="en-US" sz="1050" dirty="0"/>
               <a:t>Address</a:t>
             </a:r>
             <a:endParaRPr lang="en-SG" sz="1050" dirty="0"/>
@@ -6718,7 +7054,7 @@
         </p:nvSpPr>
         <p:spPr>
           <a:xfrm rot="5400000">
-            <a:off x="5896110" y="4726825"/>
+            <a:off x="6723991" y="4726826"/>
             <a:ext cx="270504" cy="175523"/>
           </a:xfrm>
           <a:prstGeom prst="triangle">
@@ -6761,7 +7097,7 @@
         </p:nvCxnSpPr>
         <p:spPr>
           <a:xfrm rot="10800000" flipV="1">
-            <a:off x="5410443" y="4814586"/>
+            <a:off x="6238326" y="4814588"/>
             <a:ext cx="533159" cy="221607"/>
           </a:xfrm>
           <a:prstGeom prst="bentConnector3">
@@ -6800,7 +7136,7 @@
         </p:nvCxnSpPr>
         <p:spPr>
           <a:xfrm rot="10800000">
-            <a:off x="5410443" y="4641207"/>
+            <a:off x="6238326" y="4641207"/>
             <a:ext cx="533159" cy="173380"/>
           </a:xfrm>
           <a:prstGeom prst="bentConnector3">
@@ -6839,7 +7175,7 @@
         </p:nvCxnSpPr>
         <p:spPr>
           <a:xfrm rot="10800000" flipV="1">
-            <a:off x="5410443" y="4814586"/>
+            <a:off x="6238326" y="4814588"/>
             <a:ext cx="533159" cy="616593"/>
           </a:xfrm>
           <a:prstGeom prst="bentConnector3">
@@ -6875,7 +7211,7 @@
         </p:nvSpPr>
         <p:spPr>
           <a:xfrm>
-            <a:off x="4481146" y="4072840"/>
+            <a:off x="5309027" y="4072840"/>
             <a:ext cx="929296" cy="346760"/>
           </a:xfrm>
           <a:prstGeom prst="rect">
@@ -6904,7 +7240,7 @@
           <a:p>
             <a:pPr algn="ctr"/>
             <a:r>
-              <a:rPr lang="en-US" sz="1050" dirty="0" smtClean="0"/>
+              <a:rPr lang="en-US" sz="1050" dirty="0"/>
               <a:t>Name</a:t>
             </a:r>
             <a:endParaRPr lang="en-SG" sz="1050" dirty="0"/>
@@ -6922,7 +7258,7 @@
         </p:nvCxnSpPr>
         <p:spPr>
           <a:xfrm rot="10800000">
-            <a:off x="5410443" y="4246221"/>
+            <a:off x="6238326" y="4246223"/>
             <a:ext cx="533159" cy="568367"/>
           </a:xfrm>
           <a:prstGeom prst="bentConnector3">
@@ -6958,7 +7294,7 @@
         </p:nvSpPr>
         <p:spPr>
           <a:xfrm>
-            <a:off x="6132002" y="4925292"/>
+            <a:off x="6959884" y="4925294"/>
             <a:ext cx="1868998" cy="122745"/>
           </a:xfrm>
           <a:prstGeom prst="rect">
@@ -6998,7 +7334,7 @@
         </p:nvSpPr>
         <p:spPr>
           <a:xfrm>
-            <a:off x="6132002" y="5043684"/>
+            <a:off x="6959884" y="5043686"/>
             <a:ext cx="1868998" cy="271943"/>
           </a:xfrm>
           <a:prstGeom prst="rect">
@@ -7027,15 +7363,15 @@
           <a:p>
             <a:pPr algn="ctr"/>
             <a:r>
-              <a:rPr lang="en-US" sz="1050" dirty="0" smtClean="0"/>
+              <a:rPr lang="en-US" sz="1050" dirty="0"/>
               <a:t>+ </a:t>
             </a:r>
             <a:r>
-              <a:rPr lang="en-US" sz="1050" dirty="0" err="1" smtClean="0"/>
+              <a:rPr lang="en-US" sz="1050" dirty="0" err="1"/>
               <a:t>getPrintableString</a:t>
             </a:r>
             <a:r>
-              <a:rPr lang="en-US" sz="1050" dirty="0" smtClean="0"/>
+              <a:rPr lang="en-US" sz="1050" dirty="0"/>
               <a:t>(): String</a:t>
             </a:r>
             <a:endParaRPr lang="en-SG" sz="1050" dirty="0"/>
@@ -7050,7 +7386,7 @@
         </p:nvSpPr>
         <p:spPr>
           <a:xfrm>
-            <a:off x="1031322" y="1206785"/>
+            <a:off x="1859203" y="1206785"/>
             <a:ext cx="929296" cy="346760"/>
           </a:xfrm>
           <a:prstGeom prst="rect">
@@ -7094,7 +7430,7 @@
         </p:nvSpPr>
         <p:spPr>
           <a:xfrm>
-            <a:off x="2647520" y="517686"/>
+            <a:off x="3475401" y="517686"/>
             <a:ext cx="929296" cy="346760"/>
           </a:xfrm>
           <a:prstGeom prst="rect">
@@ -7123,14 +7459,14 @@
           <a:p>
             <a:pPr algn="ctr"/>
             <a:r>
-              <a:rPr lang="en-US" sz="1050" dirty="0" smtClean="0"/>
+              <a:rPr lang="en-US" sz="1050" dirty="0"/>
               <a:t>Unique</a:t>
             </a:r>
             <a:br>
-              <a:rPr lang="en-US" sz="1050" dirty="0" smtClean="0"/>
+              <a:rPr lang="en-US" sz="1050" dirty="0"/>
             </a:br>
             <a:r>
-              <a:rPr lang="en-US" sz="1050" dirty="0" err="1" smtClean="0"/>
+              <a:rPr lang="en-US" sz="1050" dirty="0" err="1"/>
               <a:t>TagList</a:t>
             </a:r>
             <a:endParaRPr lang="en-SG" sz="1050" dirty="0"/>
@@ -7145,7 +7481,7 @@
         </p:nvSpPr>
         <p:spPr>
           <a:xfrm>
-            <a:off x="2621143" y="1837811"/>
+            <a:off x="3449024" y="1837811"/>
             <a:ext cx="929296" cy="346760"/>
           </a:xfrm>
           <a:prstGeom prst="rect">
@@ -7174,14 +7510,14 @@
           <a:p>
             <a:pPr algn="ctr"/>
             <a:r>
-              <a:rPr lang="en-US" sz="1050" dirty="0" smtClean="0"/>
+              <a:rPr lang="en-US" sz="1050" dirty="0"/>
               <a:t>Unique</a:t>
             </a:r>
             <a:br>
-              <a:rPr lang="en-US" sz="1050" dirty="0" smtClean="0"/>
+              <a:rPr lang="en-US" sz="1050" dirty="0"/>
             </a:br>
             <a:r>
-              <a:rPr lang="en-US" sz="1050" dirty="0" err="1" smtClean="0"/>
+              <a:rPr lang="en-US" sz="1050" dirty="0" err="1"/>
               <a:t>PersonList</a:t>
             </a:r>
             <a:endParaRPr lang="en-SG" sz="1050" dirty="0"/>
@@ -7196,7 +7532,7 @@
         </p:nvSpPr>
         <p:spPr>
           <a:xfrm>
-            <a:off x="4190165" y="1837811"/>
+            <a:off x="5018046" y="1837811"/>
             <a:ext cx="929296" cy="346760"/>
           </a:xfrm>
           <a:prstGeom prst="rect">
@@ -7225,7 +7561,7 @@
           <a:p>
             <a:pPr algn="ctr"/>
             <a:r>
-              <a:rPr lang="en-US" sz="1050" dirty="0" smtClean="0"/>
+              <a:rPr lang="en-US" sz="1050" dirty="0"/>
               <a:t>Person</a:t>
             </a:r>
             <a:endParaRPr lang="en-SG" sz="1050" dirty="0"/>
@@ -7243,7 +7579,7 @@
         </p:nvCxnSpPr>
         <p:spPr>
           <a:xfrm flipV="1">
-            <a:off x="2196666" y="691066"/>
+            <a:off x="3024547" y="691068"/>
             <a:ext cx="450854" cy="687145"/>
           </a:xfrm>
           <a:prstGeom prst="bentConnector3">
@@ -7281,7 +7617,7 @@
         </p:nvCxnSpPr>
         <p:spPr>
           <a:xfrm>
-            <a:off x="2196666" y="1378211"/>
+            <a:off x="3024549" y="1378211"/>
             <a:ext cx="424477" cy="632980"/>
           </a:xfrm>
           <a:prstGeom prst="bentConnector3">
@@ -7318,7 +7654,7 @@
         </p:nvSpPr>
         <p:spPr>
           <a:xfrm>
-            <a:off x="4190165" y="517686"/>
+            <a:off x="5018046" y="517686"/>
             <a:ext cx="929296" cy="346760"/>
           </a:xfrm>
           <a:prstGeom prst="rect">
@@ -7362,7 +7698,7 @@
         </p:nvSpPr>
         <p:spPr>
           <a:xfrm>
-            <a:off x="3576816" y="617076"/>
+            <a:off x="4404698" y="617076"/>
             <a:ext cx="236048" cy="173380"/>
           </a:xfrm>
           <a:prstGeom prst="flowChartDecision">
@@ -7403,7 +7739,7 @@
         </p:nvSpPr>
         <p:spPr>
           <a:xfrm>
-            <a:off x="3540415" y="1924501"/>
+            <a:off x="4368296" y="1924502"/>
             <a:ext cx="236048" cy="173380"/>
           </a:xfrm>
           <a:prstGeom prst="flowChartDecision">
@@ -7444,7 +7780,7 @@
         </p:nvSpPr>
         <p:spPr>
           <a:xfrm>
-            <a:off x="1960618" y="1291521"/>
+            <a:off x="2788499" y="1291521"/>
             <a:ext cx="236048" cy="173380"/>
           </a:xfrm>
           <a:prstGeom prst="flowChartDecision">
@@ -7490,7 +7826,7 @@
         </p:nvCxnSpPr>
         <p:spPr>
           <a:xfrm flipV="1">
-            <a:off x="3812864" y="691066"/>
+            <a:off x="4640747" y="691066"/>
             <a:ext cx="377301" cy="12700"/>
           </a:xfrm>
           <a:prstGeom prst="straightConnector1">
@@ -7528,7 +7864,7 @@
         </p:nvCxnSpPr>
         <p:spPr>
           <a:xfrm>
-            <a:off x="3776463" y="2011191"/>
+            <a:off x="4604344" y="2011191"/>
             <a:ext cx="413702" cy="0"/>
           </a:xfrm>
           <a:prstGeom prst="straightConnector1">
@@ -7563,7 +7899,7 @@
         </p:nvSpPr>
         <p:spPr>
           <a:xfrm>
-            <a:off x="3348216" y="1195623"/>
+            <a:off x="4176097" y="1195623"/>
             <a:ext cx="929296" cy="346760"/>
           </a:xfrm>
           <a:prstGeom prst="rect">
@@ -7592,7 +7928,7 @@
           <a:p>
             <a:pPr algn="ctr"/>
             <a:r>
-              <a:rPr lang="en-US" sz="1050" dirty="0" smtClean="0"/>
+              <a:rPr lang="en-US" sz="1050" dirty="0"/>
               <a:t>Tagging</a:t>
             </a:r>
             <a:endParaRPr lang="en-SG" sz="1050" dirty="0"/>
@@ -7610,7 +7946,7 @@
         </p:nvCxnSpPr>
         <p:spPr>
           <a:xfrm flipV="1">
-            <a:off x="4654813" y="864446"/>
+            <a:off x="5482694" y="864448"/>
             <a:ext cx="0" cy="973365"/>
           </a:xfrm>
           <a:prstGeom prst="straightConnector1">
@@ -7647,7 +7983,7 @@
         </p:nvCxnSpPr>
         <p:spPr>
           <a:xfrm>
-            <a:off x="4277512" y="1369003"/>
+            <a:off x="5105395" y="1369003"/>
             <a:ext cx="377301" cy="0"/>
           </a:xfrm>
           <a:prstGeom prst="line">
@@ -7686,7 +8022,7 @@
         </p:nvCxnSpPr>
         <p:spPr>
           <a:xfrm flipV="1">
-            <a:off x="2196666" y="1369003"/>
+            <a:off x="3024548" y="1369003"/>
             <a:ext cx="1151550" cy="9208"/>
           </a:xfrm>
           <a:prstGeom prst="straightConnector1">
@@ -7721,7 +8057,7 @@
         </p:nvSpPr>
         <p:spPr>
           <a:xfrm>
-            <a:off x="3112168" y="1066800"/>
+            <a:off x="3940050" y="1066800"/>
             <a:ext cx="88232" cy="369332"/>
           </a:xfrm>
           <a:prstGeom prst="rect">
@@ -7736,7 +8072,7 @@
           <a:lstStyle/>
           <a:p>
             <a:r>
-              <a:rPr lang="en-US" dirty="0" smtClean="0">
+              <a:rPr lang="en-US" dirty="0">
                 <a:solidFill>
                   <a:schemeClr val="accent6">
                     <a:lumMod val="75000"/>

</xml_diff>

<commit_message>
update developer guide to show an association class `Tagging`
</commit_message>
<xml_diff>
--- a/doc/Diagrams.pptx
+++ b/doc/Diagrams.pptx
@@ -106,6 +106,22 @@
       </a:defRPr>
     </a:lvl9pPr>
   </p:defaultTextStyle>
+  <p:extLst>
+    <p:ext uri="{EFAFB233-063F-42B5-8137-9DF3F51BA10A}">
+      <p15:sldGuideLst xmlns:p15="http://schemas.microsoft.com/office/powerpoint/2012/main">
+        <p15:guide id="1" orient="horz" pos="2160">
+          <p15:clr>
+            <a:srgbClr val="A4A3A4"/>
+          </p15:clr>
+        </p15:guide>
+        <p15:guide id="2" pos="2880">
+          <p15:clr>
+            <a:srgbClr val="A4A3A4"/>
+          </p15:clr>
+        </p15:guide>
+      </p15:sldGuideLst>
+    </p:ext>
+  </p:extLst>
 </p:presentation>
 </file>
 
@@ -290,7 +306,7 @@
           <a:p>
             <a:fld id="{78C97017-6FC3-485B-9764-EAC9E56C1D49}" type="datetimeFigureOut">
               <a:rPr lang="en-US" smtClean="0"/>
-              <a:t>8/28/2016</a:t>
+              <a:t>9/4/16</a:t>
             </a:fld>
             <a:endParaRPr lang="en-US"/>
           </a:p>
@@ -460,7 +476,7 @@
           <a:p>
             <a:fld id="{78C97017-6FC3-485B-9764-EAC9E56C1D49}" type="datetimeFigureOut">
               <a:rPr lang="en-US" smtClean="0"/>
-              <a:t>8/28/2016</a:t>
+              <a:t>9/4/16</a:t>
             </a:fld>
             <a:endParaRPr lang="en-US"/>
           </a:p>
@@ -640,7 +656,7 @@
           <a:p>
             <a:fld id="{78C97017-6FC3-485B-9764-EAC9E56C1D49}" type="datetimeFigureOut">
               <a:rPr lang="en-US" smtClean="0"/>
-              <a:t>8/28/2016</a:t>
+              <a:t>9/4/16</a:t>
             </a:fld>
             <a:endParaRPr lang="en-US"/>
           </a:p>
@@ -810,7 +826,7 @@
           <a:p>
             <a:fld id="{78C97017-6FC3-485B-9764-EAC9E56C1D49}" type="datetimeFigureOut">
               <a:rPr lang="en-US" smtClean="0"/>
-              <a:t>8/28/2016</a:t>
+              <a:t>9/4/16</a:t>
             </a:fld>
             <a:endParaRPr lang="en-US"/>
           </a:p>
@@ -1056,7 +1072,7 @@
           <a:p>
             <a:fld id="{78C97017-6FC3-485B-9764-EAC9E56C1D49}" type="datetimeFigureOut">
               <a:rPr lang="en-US" smtClean="0"/>
-              <a:t>8/28/2016</a:t>
+              <a:t>9/4/16</a:t>
             </a:fld>
             <a:endParaRPr lang="en-US"/>
           </a:p>
@@ -1344,7 +1360,7 @@
           <a:p>
             <a:fld id="{78C97017-6FC3-485B-9764-EAC9E56C1D49}" type="datetimeFigureOut">
               <a:rPr lang="en-US" smtClean="0"/>
-              <a:t>8/28/2016</a:t>
+              <a:t>9/4/16</a:t>
             </a:fld>
             <a:endParaRPr lang="en-US"/>
           </a:p>
@@ -1766,7 +1782,7 @@
           <a:p>
             <a:fld id="{78C97017-6FC3-485B-9764-EAC9E56C1D49}" type="datetimeFigureOut">
               <a:rPr lang="en-US" smtClean="0"/>
-              <a:t>8/28/2016</a:t>
+              <a:t>9/4/16</a:t>
             </a:fld>
             <a:endParaRPr lang="en-US"/>
           </a:p>
@@ -1884,7 +1900,7 @@
           <a:p>
             <a:fld id="{78C97017-6FC3-485B-9764-EAC9E56C1D49}" type="datetimeFigureOut">
               <a:rPr lang="en-US" smtClean="0"/>
-              <a:t>8/28/2016</a:t>
+              <a:t>9/4/16</a:t>
             </a:fld>
             <a:endParaRPr lang="en-US"/>
           </a:p>
@@ -1979,7 +1995,7 @@
           <a:p>
             <a:fld id="{78C97017-6FC3-485B-9764-EAC9E56C1D49}" type="datetimeFigureOut">
               <a:rPr lang="en-US" smtClean="0"/>
-              <a:t>8/28/2016</a:t>
+              <a:t>9/4/16</a:t>
             </a:fld>
             <a:endParaRPr lang="en-US"/>
           </a:p>
@@ -2256,7 +2272,7 @@
           <a:p>
             <a:fld id="{78C97017-6FC3-485B-9764-EAC9E56C1D49}" type="datetimeFigureOut">
               <a:rPr lang="en-US" smtClean="0"/>
-              <a:t>8/28/2016</a:t>
+              <a:t>9/4/16</a:t>
             </a:fld>
             <a:endParaRPr lang="en-US"/>
           </a:p>
@@ -2509,7 +2525,7 @@
           <a:p>
             <a:fld id="{78C97017-6FC3-485B-9764-EAC9E56C1D49}" type="datetimeFigureOut">
               <a:rPr lang="en-US" smtClean="0"/>
-              <a:t>8/28/2016</a:t>
+              <a:t>9/4/16</a:t>
             </a:fld>
             <a:endParaRPr lang="en-US"/>
           </a:p>
@@ -2722,7 +2738,7 @@
           <a:p>
             <a:fld id="{78C97017-6FC3-485B-9764-EAC9E56C1D49}" type="datetimeFigureOut">
               <a:rPr lang="en-US" smtClean="0"/>
-              <a:t>8/28/2016</a:t>
+              <a:t>9/4/16</a:t>
             </a:fld>
             <a:endParaRPr lang="en-US"/>
           </a:p>
@@ -5402,7 +5418,7 @@
         </p:nvSpPr>
         <p:spPr>
           <a:xfrm>
-            <a:off x="3666876" y="3710497"/>
+            <a:off x="3681046" y="2595250"/>
             <a:ext cx="929296" cy="346760"/>
           </a:xfrm>
           <a:prstGeom prst="rect">
@@ -5760,6 +5776,165 @@
           </a:fontRef>
         </p:style>
       </p:cxnSp>
+      <p:sp>
+        <p:nvSpPr>
+          <p:cNvPr id="63" name="Rectangle 98"/>
+          <p:cNvSpPr/>
+          <p:nvPr/>
+        </p:nvSpPr>
+        <p:spPr>
+          <a:xfrm>
+            <a:off x="4523047" y="3733800"/>
+            <a:ext cx="929296" cy="346760"/>
+          </a:xfrm>
+          <a:prstGeom prst="rect">
+            <a:avLst/>
+          </a:prstGeom>
+          <a:ln w="19050"/>
+          <a:effectLst/>
+        </p:spPr>
+        <p:style>
+          <a:lnRef idx="1">
+            <a:schemeClr val="accent6"/>
+          </a:lnRef>
+          <a:fillRef idx="2">
+            <a:schemeClr val="accent6"/>
+          </a:fillRef>
+          <a:effectRef idx="1">
+            <a:schemeClr val="accent6"/>
+          </a:effectRef>
+          <a:fontRef idx="minor">
+            <a:schemeClr val="dk1"/>
+          </a:fontRef>
+        </p:style>
+        <p:txBody>
+          <a:bodyPr rtlCol="0" anchor="ctr"/>
+          <a:lstStyle/>
+          <a:p>
+            <a:pPr algn="ctr"/>
+            <a:r>
+              <a:rPr lang="en-US" sz="1050" dirty="0" smtClean="0"/>
+              <a:t>Tagging</a:t>
+            </a:r>
+            <a:endParaRPr lang="en-SG" sz="1050" dirty="0"/>
+          </a:p>
+        </p:txBody>
+      </p:sp>
+      <p:cxnSp>
+        <p:nvCxnSpPr>
+          <p:cNvPr id="64" name="Straight Connector 63"/>
+          <p:cNvCxnSpPr/>
+          <p:nvPr/>
+        </p:nvCxnSpPr>
+        <p:spPr>
+          <a:xfrm flipV="1">
+            <a:off x="5438112" y="3880358"/>
+            <a:ext cx="266021" cy="1573"/>
+          </a:xfrm>
+          <a:prstGeom prst="line">
+            <a:avLst/>
+          </a:prstGeom>
+          <a:ln w="19050">
+            <a:prstDash val="dash"/>
+            <a:headEnd type="none" w="med" len="med"/>
+            <a:tailEnd type="none" w="med" len="med"/>
+          </a:ln>
+          <a:effectLst/>
+        </p:spPr>
+        <p:style>
+          <a:lnRef idx="1">
+            <a:schemeClr val="accent6"/>
+          </a:lnRef>
+          <a:fillRef idx="2">
+            <a:schemeClr val="accent6"/>
+          </a:fillRef>
+          <a:effectRef idx="1">
+            <a:schemeClr val="accent6"/>
+          </a:effectRef>
+          <a:fontRef idx="minor">
+            <a:schemeClr val="dk1"/>
+          </a:fontRef>
+        </p:style>
+      </p:cxnSp>
+      <p:cxnSp>
+        <p:nvCxnSpPr>
+          <p:cNvPr id="66" name="Straight Arrow Connector 65"/>
+          <p:cNvCxnSpPr>
+            <a:endCxn id="63" idx="1"/>
+          </p:cNvCxnSpPr>
+          <p:nvPr/>
+        </p:nvCxnSpPr>
+        <p:spPr>
+          <a:xfrm>
+            <a:off x="3367696" y="3907180"/>
+            <a:ext cx="1155351" cy="0"/>
+          </a:xfrm>
+          <a:prstGeom prst="straightConnector1">
+            <a:avLst/>
+          </a:prstGeom>
+          <a:ln w="19050">
+            <a:headEnd type="none" w="med" len="med"/>
+            <a:tailEnd type="arrow" w="med" len="med"/>
+          </a:ln>
+          <a:effectLst/>
+        </p:spPr>
+        <p:style>
+          <a:lnRef idx="1">
+            <a:schemeClr val="accent6"/>
+          </a:lnRef>
+          <a:fillRef idx="2">
+            <a:schemeClr val="accent6"/>
+          </a:fillRef>
+          <a:effectRef idx="1">
+            <a:schemeClr val="accent6"/>
+          </a:effectRef>
+          <a:fontRef idx="minor">
+            <a:schemeClr val="dk1"/>
+          </a:fontRef>
+        </p:style>
+      </p:cxnSp>
+      <p:sp>
+        <p:nvSpPr>
+          <p:cNvPr id="69" name="TextBox 68"/>
+          <p:cNvSpPr txBox="1"/>
+          <p:nvPr/>
+        </p:nvSpPr>
+        <p:spPr>
+          <a:xfrm>
+            <a:off x="4272768" y="3579728"/>
+            <a:ext cx="88232" cy="369332"/>
+          </a:xfrm>
+          <a:prstGeom prst="rect">
+            <a:avLst/>
+          </a:prstGeom>
+          <a:noFill/>
+        </p:spPr>
+        <p:txBody>
+          <a:bodyPr wrap="square" rtlCol="0">
+            <a:spAutoFit/>
+          </a:bodyPr>
+          <a:lstStyle/>
+          <a:p>
+            <a:r>
+              <a:rPr lang="en-US" dirty="0" smtClean="0">
+                <a:solidFill>
+                  <a:schemeClr val="accent6">
+                    <a:lumMod val="75000"/>
+                  </a:schemeClr>
+                </a:solidFill>
+              </a:rPr>
+              <a:t>*</a:t>
+            </a:r>
+            <a:endParaRPr lang="en-US" dirty="0">
+              <a:solidFill>
+                <a:schemeClr val="accent6">
+                  <a:lumMod val="75000"/>
+                </a:schemeClr>
+              </a:solidFill>
+            </a:endParaRPr>
+          </a:p>
+        </p:txBody>
+      </p:sp>
     </p:spTree>
     <p:extLst>
       <p:ext uri="{BB962C8B-B14F-4D97-AF65-F5344CB8AC3E}">

</xml_diff>